<commit_message>
Updated slides and added notebook
</commit_message>
<xml_diff>
--- a/Presentation/Project4_presentation_draft.pptx
+++ b/Presentation/Project4_presentation_draft.pptx
@@ -5,10 +5,10 @@
     <p:sldMasterId id="2147483686" r:id="rId4"/>
   </p:sldMasterIdLst>
   <p:notesMasterIdLst>
-    <p:notesMasterId r:id="rId30"/>
+    <p:notesMasterId r:id="rId29"/>
   </p:notesMasterIdLst>
   <p:handoutMasterIdLst>
-    <p:handoutMasterId r:id="rId31"/>
+    <p:handoutMasterId r:id="rId30"/>
   </p:handoutMasterIdLst>
   <p:sldIdLst>
     <p:sldId id="285" r:id="rId5"/>
@@ -28,14 +28,13 @@
     <p:sldId id="298" r:id="rId19"/>
     <p:sldId id="299" r:id="rId20"/>
     <p:sldId id="300" r:id="rId21"/>
-    <p:sldId id="301" r:id="rId22"/>
-    <p:sldId id="302" r:id="rId23"/>
-    <p:sldId id="303" r:id="rId24"/>
-    <p:sldId id="304" r:id="rId25"/>
-    <p:sldId id="305" r:id="rId26"/>
-    <p:sldId id="306" r:id="rId27"/>
-    <p:sldId id="286" r:id="rId28"/>
-    <p:sldId id="276" r:id="rId29"/>
+    <p:sldId id="302" r:id="rId22"/>
+    <p:sldId id="303" r:id="rId23"/>
+    <p:sldId id="304" r:id="rId24"/>
+    <p:sldId id="305" r:id="rId25"/>
+    <p:sldId id="306" r:id="rId26"/>
+    <p:sldId id="286" r:id="rId27"/>
+    <p:sldId id="276" r:id="rId28"/>
   </p:sldIdLst>
   <p:sldSz cx="10058400" cy="7772400"/>
   <p:notesSz cx="6858000" cy="9144000"/>
@@ -268,7 +267,7 @@
           <a:p>
             <a:fld id="{BE668B7C-E4CD-4872-B084-44133F808FCE}" type="datetimeFigureOut">
               <a:rPr lang="en-US" smtClean="0"/>
-              <a:t>1/23/24</a:t>
+              <a:t>1/24/24</a:t>
             </a:fld>
             <a:endParaRPr lang="en-US" dirty="0"/>
           </a:p>
@@ -445,7 +444,7 @@
           <a:p>
             <a:fld id="{6733D5BD-E30B-48AB-B24F-3878C333D518}" type="datetimeFigureOut">
               <a:rPr lang="en-US" smtClean="0"/>
-              <a:t>1/23/24</a:t>
+              <a:t>1/24/24</a:t>
             </a:fld>
             <a:endParaRPr lang="en-US" dirty="0"/>
           </a:p>
@@ -1692,114 +1691,6 @@
         <p:cNvPr id="1" name="">
           <a:extLst>
             <a:ext uri="{FF2B5EF4-FFF2-40B4-BE49-F238E27FC236}">
-              <a16:creationId xmlns:a16="http://schemas.microsoft.com/office/drawing/2014/main" id="{C95A472B-492C-C1F2-83AE-DAF6363FCD61}"/>
-            </a:ext>
-          </a:extLst>
-        </p:cNvPr>
-        <p:cNvGrpSpPr/>
-        <p:nvPr/>
-      </p:nvGrpSpPr>
-      <p:grpSpPr>
-        <a:xfrm>
-          <a:off x="0" y="0"/>
-          <a:ext cx="0" cy="0"/>
-          <a:chOff x="0" y="0"/>
-          <a:chExt cx="0" cy="0"/>
-        </a:xfrm>
-      </p:grpSpPr>
-      <p:sp>
-        <p:nvSpPr>
-          <p:cNvPr id="2" name="Slide Image Placeholder 1">
-            <a:extLst>
-              <a:ext uri="{FF2B5EF4-FFF2-40B4-BE49-F238E27FC236}">
-                <a16:creationId xmlns:a16="http://schemas.microsoft.com/office/drawing/2014/main" id="{6EC15AFD-DD45-AA0A-476F-DE320D927E8E}"/>
-              </a:ext>
-            </a:extLst>
-          </p:cNvPr>
-          <p:cNvSpPr>
-            <a:spLocks noGrp="1" noRot="1" noChangeAspect="1"/>
-          </p:cNvSpPr>
-          <p:nvPr>
-            <p:ph type="sldImg"/>
-          </p:nvPr>
-        </p:nvSpPr>
-        <p:spPr/>
-      </p:sp>
-      <p:sp>
-        <p:nvSpPr>
-          <p:cNvPr id="3" name="Notes Placeholder 2">
-            <a:extLst>
-              <a:ext uri="{FF2B5EF4-FFF2-40B4-BE49-F238E27FC236}">
-                <a16:creationId xmlns:a16="http://schemas.microsoft.com/office/drawing/2014/main" id="{5F8CBB17-7BC0-8AFD-8184-D27E9136F0C2}"/>
-              </a:ext>
-            </a:extLst>
-          </p:cNvPr>
-          <p:cNvSpPr>
-            <a:spLocks noGrp="1"/>
-          </p:cNvSpPr>
-          <p:nvPr>
-            <p:ph type="body" idx="1"/>
-          </p:nvPr>
-        </p:nvSpPr>
-        <p:spPr/>
-        <p:txBody>
-          <a:bodyPr/>
-          <a:lstStyle/>
-          <a:p>
-            <a:endParaRPr lang="en-US" dirty="0"/>
-          </a:p>
-        </p:txBody>
-      </p:sp>
-      <p:sp>
-        <p:nvSpPr>
-          <p:cNvPr id="4" name="Slide Number Placeholder 3">
-            <a:extLst>
-              <a:ext uri="{FF2B5EF4-FFF2-40B4-BE49-F238E27FC236}">
-                <a16:creationId xmlns:a16="http://schemas.microsoft.com/office/drawing/2014/main" id="{DDC40FA9-4782-3A4C-B617-27B52746B48C}"/>
-              </a:ext>
-            </a:extLst>
-          </p:cNvPr>
-          <p:cNvSpPr>
-            <a:spLocks noGrp="1"/>
-          </p:cNvSpPr>
-          <p:nvPr>
-            <p:ph type="sldNum" sz="quarter" idx="5"/>
-          </p:nvPr>
-        </p:nvSpPr>
-        <p:spPr/>
-        <p:txBody>
-          <a:bodyPr/>
-          <a:lstStyle/>
-          <a:p>
-            <a:fld id="{2481A707-0A4C-444E-BBAC-8F56E4534DF7}" type="slidenum">
-              <a:rPr lang="en-US" smtClean="0"/>
-              <a:t>18</a:t>
-            </a:fld>
-            <a:endParaRPr lang="en-US" dirty="0"/>
-          </a:p>
-        </p:txBody>
-      </p:sp>
-    </p:spTree>
-    <p:extLst>
-      <p:ext uri="{BB962C8B-B14F-4D97-AF65-F5344CB8AC3E}">
-        <p14:creationId xmlns:p14="http://schemas.microsoft.com/office/powerpoint/2010/main" val="826080744"/>
-      </p:ext>
-    </p:extLst>
-  </p:cSld>
-  <p:clrMapOvr>
-    <a:masterClrMapping/>
-  </p:clrMapOvr>
-</p:notes>
-</file>
-
-<file path=ppt/notesSlides/notesSlide19.xml><?xml version="1.0" encoding="utf-8"?>
-<p:notes xmlns:a="http://schemas.openxmlformats.org/drawingml/2006/main" xmlns:r="http://schemas.openxmlformats.org/officeDocument/2006/relationships" xmlns:p="http://schemas.openxmlformats.org/presentationml/2006/main">
-  <p:cSld>
-    <p:spTree>
-      <p:nvGrpSpPr>
-        <p:cNvPr id="1" name="">
-          <a:extLst>
-            <a:ext uri="{FF2B5EF4-FFF2-40B4-BE49-F238E27FC236}">
               <a16:creationId xmlns:a16="http://schemas.microsoft.com/office/drawing/2014/main" id="{2FE89939-ACBE-F2AD-EE24-5880FA41CFA0}"/>
             </a:ext>
           </a:extLst>
@@ -1881,7 +1772,7 @@
           <a:p>
             <a:fld id="{2481A707-0A4C-444E-BBAC-8F56E4534DF7}" type="slidenum">
               <a:rPr lang="en-US" smtClean="0"/>
-              <a:t>19</a:t>
+              <a:t>18</a:t>
             </a:fld>
             <a:endParaRPr lang="en-US" dirty="0"/>
           </a:p>
@@ -1891,6 +1782,114 @@
     <p:extLst>
       <p:ext uri="{BB962C8B-B14F-4D97-AF65-F5344CB8AC3E}">
         <p14:creationId xmlns:p14="http://schemas.microsoft.com/office/powerpoint/2010/main" val="2850319429"/>
+      </p:ext>
+    </p:extLst>
+  </p:cSld>
+  <p:clrMapOvr>
+    <a:masterClrMapping/>
+  </p:clrMapOvr>
+</p:notes>
+</file>
+
+<file path=ppt/notesSlides/notesSlide19.xml><?xml version="1.0" encoding="utf-8"?>
+<p:notes xmlns:a="http://schemas.openxmlformats.org/drawingml/2006/main" xmlns:r="http://schemas.openxmlformats.org/officeDocument/2006/relationships" xmlns:p="http://schemas.openxmlformats.org/presentationml/2006/main">
+  <p:cSld>
+    <p:spTree>
+      <p:nvGrpSpPr>
+        <p:cNvPr id="1" name="">
+          <a:extLst>
+            <a:ext uri="{FF2B5EF4-FFF2-40B4-BE49-F238E27FC236}">
+              <a16:creationId xmlns:a16="http://schemas.microsoft.com/office/drawing/2014/main" id="{F867F575-13CF-2FBE-49FC-AFCC23C2EC06}"/>
+            </a:ext>
+          </a:extLst>
+        </p:cNvPr>
+        <p:cNvGrpSpPr/>
+        <p:nvPr/>
+      </p:nvGrpSpPr>
+      <p:grpSpPr>
+        <a:xfrm>
+          <a:off x="0" y="0"/>
+          <a:ext cx="0" cy="0"/>
+          <a:chOff x="0" y="0"/>
+          <a:chExt cx="0" cy="0"/>
+        </a:xfrm>
+      </p:grpSpPr>
+      <p:sp>
+        <p:nvSpPr>
+          <p:cNvPr id="2" name="Slide Image Placeholder 1">
+            <a:extLst>
+              <a:ext uri="{FF2B5EF4-FFF2-40B4-BE49-F238E27FC236}">
+                <a16:creationId xmlns:a16="http://schemas.microsoft.com/office/drawing/2014/main" id="{74E8810E-7BCF-47A8-4721-A9188B21171B}"/>
+              </a:ext>
+            </a:extLst>
+          </p:cNvPr>
+          <p:cNvSpPr>
+            <a:spLocks noGrp="1" noRot="1" noChangeAspect="1"/>
+          </p:cNvSpPr>
+          <p:nvPr>
+            <p:ph type="sldImg"/>
+          </p:nvPr>
+        </p:nvSpPr>
+        <p:spPr/>
+      </p:sp>
+      <p:sp>
+        <p:nvSpPr>
+          <p:cNvPr id="3" name="Notes Placeholder 2">
+            <a:extLst>
+              <a:ext uri="{FF2B5EF4-FFF2-40B4-BE49-F238E27FC236}">
+                <a16:creationId xmlns:a16="http://schemas.microsoft.com/office/drawing/2014/main" id="{31A1E4B0-AF81-943B-B6F4-71965DB15E7A}"/>
+              </a:ext>
+            </a:extLst>
+          </p:cNvPr>
+          <p:cNvSpPr>
+            <a:spLocks noGrp="1"/>
+          </p:cNvSpPr>
+          <p:nvPr>
+            <p:ph type="body" idx="1"/>
+          </p:nvPr>
+        </p:nvSpPr>
+        <p:spPr/>
+        <p:txBody>
+          <a:bodyPr/>
+          <a:lstStyle/>
+          <a:p>
+            <a:endParaRPr lang="en-US" dirty="0"/>
+          </a:p>
+        </p:txBody>
+      </p:sp>
+      <p:sp>
+        <p:nvSpPr>
+          <p:cNvPr id="4" name="Slide Number Placeholder 3">
+            <a:extLst>
+              <a:ext uri="{FF2B5EF4-FFF2-40B4-BE49-F238E27FC236}">
+                <a16:creationId xmlns:a16="http://schemas.microsoft.com/office/drawing/2014/main" id="{AA291FED-1B38-3151-F19D-964E9F07B4F7}"/>
+              </a:ext>
+            </a:extLst>
+          </p:cNvPr>
+          <p:cNvSpPr>
+            <a:spLocks noGrp="1"/>
+          </p:cNvSpPr>
+          <p:nvPr>
+            <p:ph type="sldNum" sz="quarter" idx="5"/>
+          </p:nvPr>
+        </p:nvSpPr>
+        <p:spPr/>
+        <p:txBody>
+          <a:bodyPr/>
+          <a:lstStyle/>
+          <a:p>
+            <a:fld id="{2481A707-0A4C-444E-BBAC-8F56E4534DF7}" type="slidenum">
+              <a:rPr lang="en-US" smtClean="0"/>
+              <a:t>19</a:t>
+            </a:fld>
+            <a:endParaRPr lang="en-US" dirty="0"/>
+          </a:p>
+        </p:txBody>
+      </p:sp>
+    </p:spTree>
+    <p:extLst>
+      <p:ext uri="{BB962C8B-B14F-4D97-AF65-F5344CB8AC3E}">
+        <p14:creationId xmlns:p14="http://schemas.microsoft.com/office/powerpoint/2010/main" val="34158124"/>
       </p:ext>
     </p:extLst>
   </p:cSld>
@@ -2016,114 +2015,6 @@
         <p:cNvPr id="1" name="">
           <a:extLst>
             <a:ext uri="{FF2B5EF4-FFF2-40B4-BE49-F238E27FC236}">
-              <a16:creationId xmlns:a16="http://schemas.microsoft.com/office/drawing/2014/main" id="{F867F575-13CF-2FBE-49FC-AFCC23C2EC06}"/>
-            </a:ext>
-          </a:extLst>
-        </p:cNvPr>
-        <p:cNvGrpSpPr/>
-        <p:nvPr/>
-      </p:nvGrpSpPr>
-      <p:grpSpPr>
-        <a:xfrm>
-          <a:off x="0" y="0"/>
-          <a:ext cx="0" cy="0"/>
-          <a:chOff x="0" y="0"/>
-          <a:chExt cx="0" cy="0"/>
-        </a:xfrm>
-      </p:grpSpPr>
-      <p:sp>
-        <p:nvSpPr>
-          <p:cNvPr id="2" name="Slide Image Placeholder 1">
-            <a:extLst>
-              <a:ext uri="{FF2B5EF4-FFF2-40B4-BE49-F238E27FC236}">
-                <a16:creationId xmlns:a16="http://schemas.microsoft.com/office/drawing/2014/main" id="{74E8810E-7BCF-47A8-4721-A9188B21171B}"/>
-              </a:ext>
-            </a:extLst>
-          </p:cNvPr>
-          <p:cNvSpPr>
-            <a:spLocks noGrp="1" noRot="1" noChangeAspect="1"/>
-          </p:cNvSpPr>
-          <p:nvPr>
-            <p:ph type="sldImg"/>
-          </p:nvPr>
-        </p:nvSpPr>
-        <p:spPr/>
-      </p:sp>
-      <p:sp>
-        <p:nvSpPr>
-          <p:cNvPr id="3" name="Notes Placeholder 2">
-            <a:extLst>
-              <a:ext uri="{FF2B5EF4-FFF2-40B4-BE49-F238E27FC236}">
-                <a16:creationId xmlns:a16="http://schemas.microsoft.com/office/drawing/2014/main" id="{31A1E4B0-AF81-943B-B6F4-71965DB15E7A}"/>
-              </a:ext>
-            </a:extLst>
-          </p:cNvPr>
-          <p:cNvSpPr>
-            <a:spLocks noGrp="1"/>
-          </p:cNvSpPr>
-          <p:nvPr>
-            <p:ph type="body" idx="1"/>
-          </p:nvPr>
-        </p:nvSpPr>
-        <p:spPr/>
-        <p:txBody>
-          <a:bodyPr/>
-          <a:lstStyle/>
-          <a:p>
-            <a:endParaRPr lang="en-US" dirty="0"/>
-          </a:p>
-        </p:txBody>
-      </p:sp>
-      <p:sp>
-        <p:nvSpPr>
-          <p:cNvPr id="4" name="Slide Number Placeholder 3">
-            <a:extLst>
-              <a:ext uri="{FF2B5EF4-FFF2-40B4-BE49-F238E27FC236}">
-                <a16:creationId xmlns:a16="http://schemas.microsoft.com/office/drawing/2014/main" id="{AA291FED-1B38-3151-F19D-964E9F07B4F7}"/>
-              </a:ext>
-            </a:extLst>
-          </p:cNvPr>
-          <p:cNvSpPr>
-            <a:spLocks noGrp="1"/>
-          </p:cNvSpPr>
-          <p:nvPr>
-            <p:ph type="sldNum" sz="quarter" idx="5"/>
-          </p:nvPr>
-        </p:nvSpPr>
-        <p:spPr/>
-        <p:txBody>
-          <a:bodyPr/>
-          <a:lstStyle/>
-          <a:p>
-            <a:fld id="{2481A707-0A4C-444E-BBAC-8F56E4534DF7}" type="slidenum">
-              <a:rPr lang="en-US" smtClean="0"/>
-              <a:t>20</a:t>
-            </a:fld>
-            <a:endParaRPr lang="en-US" dirty="0"/>
-          </a:p>
-        </p:txBody>
-      </p:sp>
-    </p:spTree>
-    <p:extLst>
-      <p:ext uri="{BB962C8B-B14F-4D97-AF65-F5344CB8AC3E}">
-        <p14:creationId xmlns:p14="http://schemas.microsoft.com/office/powerpoint/2010/main" val="34158124"/>
-      </p:ext>
-    </p:extLst>
-  </p:cSld>
-  <p:clrMapOvr>
-    <a:masterClrMapping/>
-  </p:clrMapOvr>
-</p:notes>
-</file>
-
-<file path=ppt/notesSlides/notesSlide21.xml><?xml version="1.0" encoding="utf-8"?>
-<p:notes xmlns:a="http://schemas.openxmlformats.org/drawingml/2006/main" xmlns:r="http://schemas.openxmlformats.org/officeDocument/2006/relationships" xmlns:p="http://schemas.openxmlformats.org/presentationml/2006/main">
-  <p:cSld>
-    <p:spTree>
-      <p:nvGrpSpPr>
-        <p:cNvPr id="1" name="">
-          <a:extLst>
-            <a:ext uri="{FF2B5EF4-FFF2-40B4-BE49-F238E27FC236}">
               <a16:creationId xmlns:a16="http://schemas.microsoft.com/office/drawing/2014/main" id="{31CED5DF-CAF3-6E6E-3212-0A00341D9ECD}"/>
             </a:ext>
           </a:extLst>
@@ -2205,7 +2096,7 @@
           <a:p>
             <a:fld id="{2481A707-0A4C-444E-BBAC-8F56E4534DF7}" type="slidenum">
               <a:rPr lang="en-US" smtClean="0"/>
-              <a:t>21</a:t>
+              <a:t>20</a:t>
             </a:fld>
             <a:endParaRPr lang="en-US" dirty="0"/>
           </a:p>
@@ -2224,7 +2115,7 @@
 </p:notes>
 </file>
 
-<file path=ppt/notesSlides/notesSlide22.xml><?xml version="1.0" encoding="utf-8"?>
+<file path=ppt/notesSlides/notesSlide21.xml><?xml version="1.0" encoding="utf-8"?>
 <p:notes xmlns:a="http://schemas.openxmlformats.org/drawingml/2006/main" xmlns:r="http://schemas.openxmlformats.org/officeDocument/2006/relationships" xmlns:p="http://schemas.openxmlformats.org/presentationml/2006/main">
   <p:cSld>
     <p:spTree>
@@ -2313,7 +2204,7 @@
           <a:p>
             <a:fld id="{2481A707-0A4C-444E-BBAC-8F56E4534DF7}" type="slidenum">
               <a:rPr lang="en-US" smtClean="0"/>
-              <a:t>22</a:t>
+              <a:t>21</a:t>
             </a:fld>
             <a:endParaRPr lang="en-US" dirty="0"/>
           </a:p>
@@ -2332,7 +2223,7 @@
 </p:notes>
 </file>
 
-<file path=ppt/notesSlides/notesSlide23.xml><?xml version="1.0" encoding="utf-8"?>
+<file path=ppt/notesSlides/notesSlide22.xml><?xml version="1.0" encoding="utf-8"?>
 <p:notes xmlns:a="http://schemas.openxmlformats.org/drawingml/2006/main" xmlns:r="http://schemas.openxmlformats.org/officeDocument/2006/relationships" xmlns:p="http://schemas.openxmlformats.org/presentationml/2006/main">
   <p:cSld>
     <p:spTree>
@@ -2421,7 +2312,7 @@
           <a:p>
             <a:fld id="{2481A707-0A4C-444E-BBAC-8F56E4534DF7}" type="slidenum">
               <a:rPr lang="en-US" smtClean="0"/>
-              <a:t>23</a:t>
+              <a:t>22</a:t>
             </a:fld>
             <a:endParaRPr lang="en-US" dirty="0"/>
           </a:p>
@@ -2440,7 +2331,7 @@
 </p:notes>
 </file>
 
-<file path=ppt/notesSlides/notesSlide24.xml><?xml version="1.0" encoding="utf-8"?>
+<file path=ppt/notesSlides/notesSlide23.xml><?xml version="1.0" encoding="utf-8"?>
 <p:notes xmlns:a="http://schemas.openxmlformats.org/drawingml/2006/main" xmlns:r="http://schemas.openxmlformats.org/officeDocument/2006/relationships" xmlns:p="http://schemas.openxmlformats.org/presentationml/2006/main">
   <p:cSld>
     <p:spTree>
@@ -2529,7 +2420,7 @@
           <a:p>
             <a:fld id="{2481A707-0A4C-444E-BBAC-8F56E4534DF7}" type="slidenum">
               <a:rPr lang="en-US" smtClean="0"/>
-              <a:t>24</a:t>
+              <a:t>23</a:t>
             </a:fld>
             <a:endParaRPr lang="en-US" dirty="0"/>
           </a:p>
@@ -2548,7 +2439,7 @@
 </p:notes>
 </file>
 
-<file path=ppt/notesSlides/notesSlide25.xml><?xml version="1.0" encoding="utf-8"?>
+<file path=ppt/notesSlides/notesSlide24.xml><?xml version="1.0" encoding="utf-8"?>
 <p:notes xmlns:a="http://schemas.openxmlformats.org/drawingml/2006/main" xmlns:r="http://schemas.openxmlformats.org/officeDocument/2006/relationships" xmlns:p="http://schemas.openxmlformats.org/presentationml/2006/main">
   <p:cSld>
     <p:spTree>
@@ -2613,7 +2504,7 @@
           <a:p>
             <a:fld id="{2481A707-0A4C-444E-BBAC-8F56E4534DF7}" type="slidenum">
               <a:rPr lang="en-US" smtClean="0"/>
-              <a:t>25</a:t>
+              <a:t>24</a:t>
             </a:fld>
             <a:endParaRPr lang="en-US" dirty="0"/>
           </a:p>
@@ -11290,8 +11181,8 @@
         </p:nvSpPr>
         <p:spPr>
           <a:xfrm>
-            <a:off x="1867078" y="2262055"/>
-            <a:ext cx="8055856" cy="2677656"/>
+            <a:off x="2151809" y="2270320"/>
+            <a:ext cx="6226387" cy="2369880"/>
           </a:xfrm>
           <a:prstGeom prst="rect">
             <a:avLst/>
@@ -11305,123 +11196,123 @@
           <a:lstStyle/>
           <a:p>
             <a:r>
-              <a:rPr lang="en-GB" sz="2800" dirty="0"/>
+              <a:rPr lang="en-GB" sz="2400" dirty="0"/>
               <a:t>Step 1: Filling the Null Values with Median:</a:t>
             </a:r>
           </a:p>
           <a:p>
             <a:r>
-              <a:rPr lang="en-GB" sz="2800" dirty="0"/>
+              <a:rPr lang="en-GB" sz="2400" dirty="0"/>
               <a:t>         </a:t>
             </a:r>
             <a:r>
-              <a:rPr lang="en-GB" sz="2800" dirty="0" err="1"/>
+              <a:rPr lang="en-GB" sz="2400" dirty="0" err="1"/>
               <a:t>median_bmi</a:t>
             </a:r>
             <a:r>
-              <a:rPr lang="en-GB" sz="2800" dirty="0"/>
+              <a:rPr lang="en-GB" sz="2400" dirty="0"/>
               <a:t> = </a:t>
             </a:r>
             <a:r>
-              <a:rPr lang="en-GB" sz="2800" dirty="0" err="1"/>
+              <a:rPr lang="en-GB" sz="2400" dirty="0" err="1"/>
               <a:t>df</a:t>
             </a:r>
             <a:r>
-              <a:rPr lang="en-GB" sz="2800" dirty="0"/>
+              <a:rPr lang="en-GB" sz="2400" dirty="0"/>
               <a:t>['</a:t>
             </a:r>
             <a:r>
-              <a:rPr lang="en-GB" sz="2800" dirty="0" err="1"/>
+              <a:rPr lang="en-GB" sz="2400" dirty="0" err="1"/>
               <a:t>bmi</a:t>
             </a:r>
             <a:r>
-              <a:rPr lang="en-GB" sz="2800" dirty="0"/>
+              <a:rPr lang="en-GB" sz="2400" dirty="0"/>
               <a:t>'].median()</a:t>
             </a:r>
           </a:p>
           <a:p>
             <a:r>
-              <a:rPr lang="en-GB" sz="2800" dirty="0"/>
+              <a:rPr lang="en-GB" sz="2400" dirty="0"/>
               <a:t>          </a:t>
             </a:r>
             <a:r>
-              <a:rPr lang="en-GB" sz="2800" dirty="0" err="1"/>
+              <a:rPr lang="en-GB" sz="2400" dirty="0" err="1"/>
               <a:t>df</a:t>
             </a:r>
             <a:r>
-              <a:rPr lang="en-GB" sz="2800" dirty="0"/>
+              <a:rPr lang="en-GB" sz="2400" dirty="0"/>
               <a:t>['</a:t>
             </a:r>
             <a:r>
-              <a:rPr lang="en-GB" sz="2800" dirty="0" err="1"/>
+              <a:rPr lang="en-GB" sz="2400" dirty="0" err="1"/>
               <a:t>bmi</a:t>
             </a:r>
             <a:r>
-              <a:rPr lang="en-GB" sz="2800" dirty="0"/>
+              <a:rPr lang="en-GB" sz="2400" dirty="0"/>
               <a:t>'] = </a:t>
             </a:r>
             <a:r>
-              <a:rPr lang="en-GB" sz="2800" dirty="0" err="1"/>
+              <a:rPr lang="en-GB" sz="2400" dirty="0" err="1"/>
               <a:t>df</a:t>
             </a:r>
             <a:r>
-              <a:rPr lang="en-GB" sz="2800" dirty="0"/>
+              <a:rPr lang="en-GB" sz="2400" dirty="0"/>
               <a:t>['</a:t>
             </a:r>
             <a:r>
-              <a:rPr lang="en-GB" sz="2800" dirty="0" err="1"/>
+              <a:rPr lang="en-GB" sz="2400" dirty="0" err="1"/>
               <a:t>bmi</a:t>
             </a:r>
             <a:r>
-              <a:rPr lang="en-GB" sz="2800" dirty="0"/>
+              <a:rPr lang="en-GB" sz="2400" dirty="0"/>
               <a:t>'].</a:t>
             </a:r>
             <a:r>
-              <a:rPr lang="en-GB" sz="2800" dirty="0" err="1"/>
+              <a:rPr lang="en-GB" sz="2400" dirty="0" err="1"/>
               <a:t>fillna</a:t>
             </a:r>
             <a:r>
-              <a:rPr lang="en-GB" sz="2800" dirty="0"/>
+              <a:rPr lang="en-GB" sz="2400" dirty="0"/>
               <a:t>(</a:t>
             </a:r>
             <a:r>
-              <a:rPr lang="en-GB" sz="2800" dirty="0" err="1"/>
+              <a:rPr lang="en-GB" sz="2400" dirty="0" err="1"/>
               <a:t>median_bmi</a:t>
             </a:r>
             <a:r>
-              <a:rPr lang="en-GB" sz="2800" dirty="0"/>
+              <a:rPr lang="en-GB" sz="2400" dirty="0"/>
               <a:t>)</a:t>
             </a:r>
           </a:p>
           <a:p>
             <a:r>
-              <a:rPr lang="en-GB" sz="2800" dirty="0"/>
+              <a:rPr lang="en-GB" sz="2400" dirty="0"/>
               <a:t>Step 2: Dropping some columns</a:t>
             </a:r>
           </a:p>
           <a:p>
             <a:r>
-              <a:rPr lang="en-GB" sz="2800" dirty="0" err="1"/>
+              <a:rPr lang="en-GB" sz="2400" dirty="0" err="1"/>
               <a:t>df</a:t>
             </a:r>
             <a:r>
-              <a:rPr lang="en-GB" sz="2800" dirty="0"/>
+              <a:rPr lang="en-GB" sz="2400" dirty="0"/>
               <a:t> = </a:t>
             </a:r>
             <a:r>
-              <a:rPr lang="en-GB" sz="2800" dirty="0" err="1"/>
+              <a:rPr lang="en-GB" sz="2400" dirty="0" err="1"/>
               <a:t>df.drop</a:t>
             </a:r>
             <a:r>
-              <a:rPr lang="en-GB" sz="2800" dirty="0"/>
+              <a:rPr lang="en-GB" sz="2400" dirty="0"/>
               <a:t>( ['id', '</a:t>
             </a:r>
             <a:r>
-              <a:rPr lang="en-GB" sz="2800" dirty="0" err="1"/>
+              <a:rPr lang="en-GB" sz="2400" dirty="0" err="1"/>
               <a:t>work_type</a:t>
             </a:r>
             <a:r>
-              <a:rPr lang="en-GB" sz="2800" dirty="0"/>
+              <a:rPr lang="en-GB" sz="2400" dirty="0"/>
               <a:t>'], axis=1)</a:t>
             </a:r>
           </a:p>
@@ -11460,10 +11351,10 @@
       </p:sp>
       <p:pic>
         <p:nvPicPr>
-          <p:cNvPr id="5" name="Picture 4">
-            <a:extLst>
-              <a:ext uri="{FF2B5EF4-FFF2-40B4-BE49-F238E27FC236}">
-                <a16:creationId xmlns:a16="http://schemas.microsoft.com/office/drawing/2014/main" id="{8220BF55-F982-9693-B22D-8393C504F9B6}"/>
+          <p:cNvPr id="4" name="Picture 3">
+            <a:extLst>
+              <a:ext uri="{FF2B5EF4-FFF2-40B4-BE49-F238E27FC236}">
+                <a16:creationId xmlns:a16="http://schemas.microsoft.com/office/drawing/2014/main" id="{261E99A0-E5F0-D732-2211-333F3A759E00}"/>
               </a:ext>
             </a:extLst>
           </p:cNvPr>
@@ -11480,8 +11371,8 @@
         </p:blipFill>
         <p:spPr>
           <a:xfrm>
-            <a:off x="198559" y="4614696"/>
-            <a:ext cx="9586791" cy="2872989"/>
+            <a:off x="371383" y="4546939"/>
+            <a:ext cx="9392455" cy="2814750"/>
           </a:xfrm>
           <a:prstGeom prst="rect">
             <a:avLst/>
@@ -12763,7 +12654,7 @@
         <p:spPr>
           <a:xfrm>
             <a:off x="1448655" y="598267"/>
-            <a:ext cx="7086600" cy="646331"/>
+            <a:ext cx="7086600" cy="1200329"/>
           </a:xfrm>
           <a:prstGeom prst="rect">
             <a:avLst/>
@@ -12779,8 +12670,26 @@
             <a:pPr algn="ctr"/>
             <a:r>
               <a:rPr lang="en-GB" sz="3600" dirty="0"/>
-              <a:t>Standardize Data</a:t>
-            </a:r>
+              <a:t>Standardize Data and </a:t>
+            </a:r>
+            <a:r>
+              <a:rPr lang="en-GB" sz="3600" dirty="0">
+                <a:latin typeface="Calibri" panose="020F0502020204030204" pitchFamily="34" charset="0"/>
+                <a:ea typeface="Calibri" panose="020F0502020204030204" pitchFamily="34" charset="0"/>
+                <a:cs typeface="Calibri" panose="020F0502020204030204" pitchFamily="34" charset="0"/>
+              </a:rPr>
+              <a:t>D</a:t>
+            </a:r>
+            <a:r>
+              <a:rPr lang="en-GB" sz="3600" i="0" dirty="0">
+                <a:effectLst/>
+                <a:latin typeface="Calibri" panose="020F0502020204030204" pitchFamily="34" charset="0"/>
+                <a:ea typeface="Calibri" panose="020F0502020204030204" pitchFamily="34" charset="0"/>
+                <a:cs typeface="Calibri" panose="020F0502020204030204" pitchFamily="34" charset="0"/>
+              </a:rPr>
+              <a:t>ummy encoding</a:t>
+            </a:r>
+            <a:endParaRPr lang="en-GB" sz="3600" dirty="0"/>
           </a:p>
         </p:txBody>
       </p:sp>
@@ -12811,10 +12720,10 @@
       </p:sp>
       <p:pic>
         <p:nvPicPr>
-          <p:cNvPr id="2" name="Picture 1">
-            <a:extLst>
-              <a:ext uri="{FF2B5EF4-FFF2-40B4-BE49-F238E27FC236}">
-                <a16:creationId xmlns:a16="http://schemas.microsoft.com/office/drawing/2014/main" id="{63FF9FB8-3E9C-914A-C693-032292109EB2}"/>
+          <p:cNvPr id="5" name="Picture 4">
+            <a:extLst>
+              <a:ext uri="{FF2B5EF4-FFF2-40B4-BE49-F238E27FC236}">
+                <a16:creationId xmlns:a16="http://schemas.microsoft.com/office/drawing/2014/main" id="{9F86E908-CDF2-1770-A018-2008F1B0F8D6}"/>
               </a:ext>
             </a:extLst>
           </p:cNvPr>
@@ -12831,8 +12740,8 @@
         </p:blipFill>
         <p:spPr>
           <a:xfrm>
-            <a:off x="4936714" y="2060941"/>
-            <a:ext cx="4866593" cy="2109651"/>
+            <a:off x="4512363" y="2483440"/>
+            <a:ext cx="4866593" cy="2109650"/>
           </a:xfrm>
           <a:prstGeom prst="rect">
             <a:avLst/>
@@ -12841,40 +12750,10 @@
       </p:pic>
       <p:pic>
         <p:nvPicPr>
-          <p:cNvPr id="4" name="Picture 3">
-            <a:extLst>
-              <a:ext uri="{FF2B5EF4-FFF2-40B4-BE49-F238E27FC236}">
-                <a16:creationId xmlns:a16="http://schemas.microsoft.com/office/drawing/2014/main" id="{E0C929B9-9AC6-08E7-0D12-2C2BE173FBC5}"/>
-              </a:ext>
-            </a:extLst>
-          </p:cNvPr>
-          <p:cNvPicPr>
-            <a:picLocks noChangeAspect="1"/>
-          </p:cNvPicPr>
-          <p:nvPr/>
-        </p:nvPicPr>
-        <p:blipFill>
-          <a:blip r:embed="rId4"/>
-          <a:stretch>
-            <a:fillRect/>
-          </a:stretch>
-        </p:blipFill>
-        <p:spPr>
-          <a:xfrm>
-            <a:off x="200125" y="2060943"/>
-            <a:ext cx="4608395" cy="2109650"/>
-          </a:xfrm>
-          <a:prstGeom prst="rect">
-            <a:avLst/>
-          </a:prstGeom>
-        </p:spPr>
-      </p:pic>
-      <p:pic>
-        <p:nvPicPr>
-          <p:cNvPr id="6" name="Picture 2" descr="z-score standard deviation">
-            <a:extLst>
-              <a:ext uri="{FF2B5EF4-FFF2-40B4-BE49-F238E27FC236}">
-                <a16:creationId xmlns:a16="http://schemas.microsoft.com/office/drawing/2014/main" id="{4D30D944-07E3-8CC8-5712-72FAA64FA584}"/>
+          <p:cNvPr id="8" name="Picture 2" descr="z-score standard deviation">
+            <a:extLst>
+              <a:ext uri="{FF2B5EF4-FFF2-40B4-BE49-F238E27FC236}">
+                <a16:creationId xmlns:a16="http://schemas.microsoft.com/office/drawing/2014/main" id="{04435160-D634-A023-008E-6E269EEA64D5}"/>
               </a:ext>
             </a:extLst>
           </p:cNvPr>
@@ -12884,7 +12763,7 @@
           <p:nvPr/>
         </p:nvPicPr>
         <p:blipFill>
-          <a:blip r:embed="rId5">
+          <a:blip r:embed="rId4">
             <a:extLst>
               <a:ext uri="{28A0092B-C50C-407E-A947-70E740481C1C}">
                 <a14:useLocalDpi xmlns:a14="http://schemas.microsoft.com/office/drawing/2010/main" val="0"/>
@@ -12898,7 +12777,7 @@
         </p:blipFill>
         <p:spPr bwMode="auto">
           <a:xfrm>
-            <a:off x="6241174" y="5102241"/>
+            <a:off x="832418" y="4196835"/>
             <a:ext cx="2505075" cy="514350"/>
           </a:xfrm>
           <a:prstGeom prst="rect">
@@ -12918,10 +12797,10 @@
       </p:pic>
       <p:sp>
         <p:nvSpPr>
-          <p:cNvPr id="7" name="TextBox 6">
-            <a:extLst>
-              <a:ext uri="{FF2B5EF4-FFF2-40B4-BE49-F238E27FC236}">
-                <a16:creationId xmlns:a16="http://schemas.microsoft.com/office/drawing/2014/main" id="{70F1ABC8-E8FC-BB1A-19ED-E8C1CB475111}"/>
+          <p:cNvPr id="9" name="TextBox 8">
+            <a:extLst>
+              <a:ext uri="{FF2B5EF4-FFF2-40B4-BE49-F238E27FC236}">
+                <a16:creationId xmlns:a16="http://schemas.microsoft.com/office/drawing/2014/main" id="{21FA62FC-B95E-6F93-2270-43A2B7D45874}"/>
               </a:ext>
             </a:extLst>
           </p:cNvPr>
@@ -12930,8 +12809,8 @@
         </p:nvSpPr>
         <p:spPr>
           <a:xfrm>
-            <a:off x="554980" y="4986935"/>
-            <a:ext cx="5139337" cy="923330"/>
+            <a:off x="476890" y="2727886"/>
+            <a:ext cx="3761509" cy="923330"/>
           </a:xfrm>
           <a:prstGeom prst="rect">
             <a:avLst/>
@@ -12944,49 +12823,93 @@
           </a:bodyPr>
           <a:lstStyle/>
           <a:p>
-            <a:pPr marL="285750" indent="-285750" algn="l">
-              <a:buFont typeface="Arial" panose="020B0604020202020204" pitchFamily="34" charset="0"/>
-              <a:buChar char="•"/>
-            </a:pPr>
-            <a:r>
-              <a:rPr lang="en-GB" b="1" cap="all" dirty="0">
-                <a:solidFill>
-                  <a:srgbClr val="04003F"/>
-                </a:solidFill>
-                <a:effectLst/>
-                <a:latin typeface="Montserrat" panose="020F0502020204030204" pitchFamily="2" charset="0"/>
-              </a:rPr>
-              <a:t>K-NEAREST NEIGHBORS (KNN)</a:t>
-            </a:r>
-          </a:p>
-          <a:p>
             <a:pPr marL="285750" indent="-285750">
               <a:buFont typeface="Arial" panose="020B0604020202020204" pitchFamily="34" charset="0"/>
               <a:buChar char="•"/>
             </a:pPr>
             <a:r>
-              <a:rPr lang="en-GB" b="1" cap="all" dirty="0">
-                <a:solidFill>
-                  <a:srgbClr val="04003F"/>
-                </a:solidFill>
-                <a:effectLst/>
-                <a:latin typeface="Montserrat" panose="00000500000000000000" pitchFamily="2" charset="0"/>
-              </a:rPr>
-              <a:t>SUPPORT VECTOR MACHINE (SVM)</a:t>
-            </a:r>
-          </a:p>
-          <a:p>
-            <a:pPr marL="285750" indent="-285750" algn="l">
+              <a:rPr lang="en-GB" dirty="0"/>
+              <a:t>Applies on Numeric columns</a:t>
+            </a:r>
+          </a:p>
+          <a:p>
+            <a:pPr marL="285750" indent="-285750">
               <a:buFont typeface="Arial" panose="020B0604020202020204" pitchFamily="34" charset="0"/>
               <a:buChar char="•"/>
             </a:pPr>
-            <a:endParaRPr lang="en-GB" b="1" cap="all" dirty="0">
-              <a:solidFill>
-                <a:srgbClr val="04003F"/>
-              </a:solidFill>
-              <a:effectLst/>
-              <a:latin typeface="Montserrat" panose="020F0502020204030204" pitchFamily="2" charset="0"/>
-            </a:endParaRPr>
+            <a:r>
+              <a:rPr lang="en-GB" dirty="0"/>
+              <a:t>Transforms the data to have mean of ‘0’ and Standardization of ‘1’</a:t>
+            </a:r>
+          </a:p>
+        </p:txBody>
+      </p:sp>
+      <p:pic>
+        <p:nvPicPr>
+          <p:cNvPr id="10" name="Picture 9">
+            <a:extLst>
+              <a:ext uri="{FF2B5EF4-FFF2-40B4-BE49-F238E27FC236}">
+                <a16:creationId xmlns:a16="http://schemas.microsoft.com/office/drawing/2014/main" id="{A4A41A7B-33B1-F9E6-06AE-497D58F92E6D}"/>
+              </a:ext>
+            </a:extLst>
+          </p:cNvPr>
+          <p:cNvPicPr>
+            <a:picLocks noChangeAspect="1"/>
+          </p:cNvPicPr>
+          <p:nvPr/>
+        </p:nvPicPr>
+        <p:blipFill>
+          <a:blip r:embed="rId5"/>
+          <a:stretch>
+            <a:fillRect/>
+          </a:stretch>
+        </p:blipFill>
+        <p:spPr>
+          <a:xfrm>
+            <a:off x="4888850" y="5438830"/>
+            <a:ext cx="4443879" cy="646331"/>
+          </a:xfrm>
+          <a:prstGeom prst="rect">
+            <a:avLst/>
+          </a:prstGeom>
+        </p:spPr>
+      </p:pic>
+      <p:sp>
+        <p:nvSpPr>
+          <p:cNvPr id="11" name="TextBox 10">
+            <a:extLst>
+              <a:ext uri="{FF2B5EF4-FFF2-40B4-BE49-F238E27FC236}">
+                <a16:creationId xmlns:a16="http://schemas.microsoft.com/office/drawing/2014/main" id="{4FAC40E7-EE1B-BD61-EA9F-E2FA79CE24E0}"/>
+              </a:ext>
+            </a:extLst>
+          </p:cNvPr>
+          <p:cNvSpPr txBox="1"/>
+          <p:nvPr/>
+        </p:nvSpPr>
+        <p:spPr>
+          <a:xfrm>
+            <a:off x="627558" y="5595461"/>
+            <a:ext cx="3460172" cy="646331"/>
+          </a:xfrm>
+          <a:prstGeom prst="rect">
+            <a:avLst/>
+          </a:prstGeom>
+          <a:noFill/>
+        </p:spPr>
+        <p:txBody>
+          <a:bodyPr wrap="square" rtlCol="0">
+            <a:spAutoFit/>
+          </a:bodyPr>
+          <a:lstStyle/>
+          <a:p>
+            <a:pPr marL="285750" indent="-285750">
+              <a:buFont typeface="Arial" panose="020B0604020202020204" pitchFamily="34" charset="0"/>
+              <a:buChar char="•"/>
+            </a:pPr>
+            <a:r>
+              <a:rPr lang="en-GB" dirty="0"/>
+              <a:t> Creates binary columns for     each category </a:t>
+            </a:r>
           </a:p>
         </p:txBody>
       </p:sp>
@@ -13521,10 +13444,10 @@
       </p:sp>
       <p:pic>
         <p:nvPicPr>
-          <p:cNvPr id="2" name="Picture 1">
-            <a:extLst>
-              <a:ext uri="{FF2B5EF4-FFF2-40B4-BE49-F238E27FC236}">
-                <a16:creationId xmlns:a16="http://schemas.microsoft.com/office/drawing/2014/main" id="{DB287A00-4396-259B-6778-90B11634B9D6}"/>
+          <p:cNvPr id="4" name="Picture 3">
+            <a:extLst>
+              <a:ext uri="{FF2B5EF4-FFF2-40B4-BE49-F238E27FC236}">
+                <a16:creationId xmlns:a16="http://schemas.microsoft.com/office/drawing/2014/main" id="{D2B17D0D-C09F-4C72-CFFC-F7FB19487DF1}"/>
               </a:ext>
             </a:extLst>
           </p:cNvPr>
@@ -13541,8 +13464,8 @@
         </p:blipFill>
         <p:spPr>
           <a:xfrm>
-            <a:off x="342901" y="3457549"/>
-            <a:ext cx="4644268" cy="1613820"/>
+            <a:off x="4284530" y="5241648"/>
+            <a:ext cx="5456656" cy="1896113"/>
           </a:xfrm>
           <a:prstGeom prst="rect">
             <a:avLst/>
@@ -13551,10 +13474,10 @@
       </p:pic>
       <p:pic>
         <p:nvPicPr>
-          <p:cNvPr id="5" name="Picture 4">
-            <a:extLst>
-              <a:ext uri="{FF2B5EF4-FFF2-40B4-BE49-F238E27FC236}">
-                <a16:creationId xmlns:a16="http://schemas.microsoft.com/office/drawing/2014/main" id="{90087D73-8155-C0C3-3FE7-F95F65EA020B}"/>
+          <p:cNvPr id="8" name="Picture 7">
+            <a:extLst>
+              <a:ext uri="{FF2B5EF4-FFF2-40B4-BE49-F238E27FC236}">
+                <a16:creationId xmlns:a16="http://schemas.microsoft.com/office/drawing/2014/main" id="{7ECE89BA-4F64-2498-A460-13A97BF3C1FA}"/>
               </a:ext>
             </a:extLst>
           </p:cNvPr>
@@ -13571,8 +13494,8 @@
         </p:blipFill>
         <p:spPr>
           <a:xfrm>
-            <a:off x="5352240" y="3399162"/>
-            <a:ext cx="4221510" cy="1672208"/>
+            <a:off x="4284530" y="2548956"/>
+            <a:ext cx="4594775" cy="1820064"/>
           </a:xfrm>
           <a:prstGeom prst="rect">
             <a:avLst/>
@@ -13581,10 +13504,10 @@
       </p:pic>
       <p:sp>
         <p:nvSpPr>
-          <p:cNvPr id="7" name="TextBox 6">
-            <a:extLst>
-              <a:ext uri="{FF2B5EF4-FFF2-40B4-BE49-F238E27FC236}">
-                <a16:creationId xmlns:a16="http://schemas.microsoft.com/office/drawing/2014/main" id="{F657270A-BE15-2A19-8E0E-DF108633CB1E}"/>
+          <p:cNvPr id="9" name="TextBox 8">
+            <a:extLst>
+              <a:ext uri="{FF2B5EF4-FFF2-40B4-BE49-F238E27FC236}">
+                <a16:creationId xmlns:a16="http://schemas.microsoft.com/office/drawing/2014/main" id="{3056A06A-42DB-2B74-8A1A-93A488B4E6C9}"/>
               </a:ext>
             </a:extLst>
           </p:cNvPr>
@@ -13593,8 +13516,8 @@
         </p:nvSpPr>
         <p:spPr>
           <a:xfrm>
-            <a:off x="-331637" y="2900181"/>
-            <a:ext cx="4611329" cy="523220"/>
+            <a:off x="282197" y="5348359"/>
+            <a:ext cx="3302074" cy="523220"/>
           </a:xfrm>
           <a:prstGeom prst="rect">
             <a:avLst/>
@@ -13610,22 +13533,17 @@
             <a:pPr algn="r"/>
             <a:r>
               <a:rPr lang="en-GB" sz="2800" dirty="0"/>
-              <a:t>Random </a:t>
-            </a:r>
-            <a:r>
-              <a:rPr lang="en-GB" sz="2800" dirty="0" err="1"/>
-              <a:t>overSampler</a:t>
-            </a:r>
-            <a:endParaRPr lang="en-GB" sz="2800" dirty="0"/>
+              <a:t>RandomOverSampler</a:t>
+            </a:r>
           </a:p>
         </p:txBody>
       </p:sp>
       <p:sp>
         <p:nvSpPr>
-          <p:cNvPr id="12" name="TextBox 11">
-            <a:extLst>
-              <a:ext uri="{FF2B5EF4-FFF2-40B4-BE49-F238E27FC236}">
-                <a16:creationId xmlns:a16="http://schemas.microsoft.com/office/drawing/2014/main" id="{0F83C00D-1FF1-8EC6-389A-FC1E2B62099D}"/>
+          <p:cNvPr id="10" name="TextBox 9">
+            <a:extLst>
+              <a:ext uri="{FF2B5EF4-FFF2-40B4-BE49-F238E27FC236}">
+                <a16:creationId xmlns:a16="http://schemas.microsoft.com/office/drawing/2014/main" id="{77C21060-E1C1-4219-E3FE-746D498A58DA}"/>
               </a:ext>
             </a:extLst>
           </p:cNvPr>
@@ -13634,7 +13552,7 @@
         </p:nvSpPr>
         <p:spPr>
           <a:xfrm>
-            <a:off x="6863227" y="2914768"/>
+            <a:off x="494439" y="2833301"/>
             <a:ext cx="1199535" cy="523220"/>
           </a:xfrm>
           <a:prstGeom prst="rect">
@@ -13657,10 +13575,10 @@
       </p:sp>
       <p:pic>
         <p:nvPicPr>
-          <p:cNvPr id="13" name="Picture 12">
-            <a:extLst>
-              <a:ext uri="{FF2B5EF4-FFF2-40B4-BE49-F238E27FC236}">
-                <a16:creationId xmlns:a16="http://schemas.microsoft.com/office/drawing/2014/main" id="{34A6F794-397C-0F7A-7DD6-D233EFBF5F5E}"/>
+          <p:cNvPr id="11" name="Picture 10">
+            <a:extLst>
+              <a:ext uri="{FF2B5EF4-FFF2-40B4-BE49-F238E27FC236}">
+                <a16:creationId xmlns:a16="http://schemas.microsoft.com/office/drawing/2014/main" id="{3454D7FC-1E95-2F69-C2E1-2772B6B5A262}"/>
               </a:ext>
             </a:extLst>
           </p:cNvPr>
@@ -13677,8 +13595,8 @@
         </p:blipFill>
         <p:spPr>
           <a:xfrm>
-            <a:off x="6431584" y="5836164"/>
-            <a:ext cx="2217612" cy="655377"/>
+            <a:off x="6344388" y="4441682"/>
+            <a:ext cx="1336940" cy="476227"/>
           </a:xfrm>
           <a:prstGeom prst="rect">
             <a:avLst/>
@@ -13687,10 +13605,10 @@
       </p:pic>
       <p:pic>
         <p:nvPicPr>
-          <p:cNvPr id="14" name="Picture 13">
-            <a:extLst>
-              <a:ext uri="{FF2B5EF4-FFF2-40B4-BE49-F238E27FC236}">
-                <a16:creationId xmlns:a16="http://schemas.microsoft.com/office/drawing/2014/main" id="{E6D4EA88-1292-5220-A208-356E43C01D81}"/>
+          <p:cNvPr id="15" name="Picture 14">
+            <a:extLst>
+              <a:ext uri="{FF2B5EF4-FFF2-40B4-BE49-F238E27FC236}">
+                <a16:creationId xmlns:a16="http://schemas.microsoft.com/office/drawing/2014/main" id="{4D88A727-898D-9880-891F-D0285DE9EDE6}"/>
               </a:ext>
             </a:extLst>
           </p:cNvPr>
@@ -13707,14 +13625,121 @@
         </p:blipFill>
         <p:spPr>
           <a:xfrm>
-            <a:off x="1335577" y="5836164"/>
-            <a:ext cx="2377646" cy="647756"/>
+            <a:off x="6368851" y="7203863"/>
+            <a:ext cx="1430192" cy="476227"/>
           </a:xfrm>
           <a:prstGeom prst="rect">
             <a:avLst/>
           </a:prstGeom>
         </p:spPr>
       </p:pic>
+      <p:sp>
+        <p:nvSpPr>
+          <p:cNvPr id="16" name="TextBox 15">
+            <a:extLst>
+              <a:ext uri="{FF2B5EF4-FFF2-40B4-BE49-F238E27FC236}">
+                <a16:creationId xmlns:a16="http://schemas.microsoft.com/office/drawing/2014/main" id="{E2F9D77F-A2A2-975B-B8CC-BA7C8409689E}"/>
+              </a:ext>
+            </a:extLst>
+          </p:cNvPr>
+          <p:cNvSpPr txBox="1"/>
+          <p:nvPr/>
+        </p:nvSpPr>
+        <p:spPr>
+          <a:xfrm>
+            <a:off x="95233" y="6350384"/>
+            <a:ext cx="4189297" cy="923330"/>
+          </a:xfrm>
+          <a:prstGeom prst="rect">
+            <a:avLst/>
+          </a:prstGeom>
+          <a:noFill/>
+        </p:spPr>
+        <p:txBody>
+          <a:bodyPr wrap="square" rtlCol="0">
+            <a:spAutoFit/>
+          </a:bodyPr>
+          <a:lstStyle/>
+          <a:p>
+            <a:pPr marL="285750" indent="-285750">
+              <a:buFont typeface="Arial" panose="020B0604020202020204" pitchFamily="34" charset="0"/>
+              <a:buChar char="•"/>
+            </a:pPr>
+            <a:r>
+              <a:rPr lang="en-GB" dirty="0"/>
+              <a:t>No creation of synthetic samples</a:t>
+            </a:r>
+          </a:p>
+          <a:p>
+            <a:pPr marL="285750" indent="-285750">
+              <a:buFont typeface="Arial" panose="020B0604020202020204" pitchFamily="34" charset="0"/>
+              <a:buChar char="•"/>
+            </a:pPr>
+            <a:r>
+              <a:rPr lang="en-GB" dirty="0"/>
+              <a:t>uses existing data, duplicates samples.</a:t>
+            </a:r>
+          </a:p>
+          <a:p>
+            <a:r>
+              <a:rPr lang="en-GB" dirty="0"/>
+              <a:t>                </a:t>
+            </a:r>
+          </a:p>
+        </p:txBody>
+      </p:sp>
+      <p:sp>
+        <p:nvSpPr>
+          <p:cNvPr id="17" name="TextBox 16">
+            <a:extLst>
+              <a:ext uri="{FF2B5EF4-FFF2-40B4-BE49-F238E27FC236}">
+                <a16:creationId xmlns:a16="http://schemas.microsoft.com/office/drawing/2014/main" id="{F402CA93-C411-42CA-8E07-C6D50D2043CF}"/>
+              </a:ext>
+            </a:extLst>
+          </p:cNvPr>
+          <p:cNvSpPr txBox="1"/>
+          <p:nvPr/>
+        </p:nvSpPr>
+        <p:spPr>
+          <a:xfrm>
+            <a:off x="187337" y="3230452"/>
+            <a:ext cx="4385159" cy="1200329"/>
+          </a:xfrm>
+          <a:prstGeom prst="rect">
+            <a:avLst/>
+          </a:prstGeom>
+          <a:noFill/>
+        </p:spPr>
+        <p:txBody>
+          <a:bodyPr wrap="square" rtlCol="0">
+            <a:spAutoFit/>
+          </a:bodyPr>
+          <a:lstStyle/>
+          <a:p>
+            <a:endParaRPr lang="en-GB" dirty="0"/>
+          </a:p>
+          <a:p>
+            <a:pPr marL="285750" indent="-285750">
+              <a:buFont typeface="Arial" panose="020B0604020202020204" pitchFamily="34" charset="0"/>
+              <a:buChar char="•"/>
+            </a:pPr>
+            <a:r>
+              <a:rPr lang="en-GB" dirty="0"/>
+              <a:t>It creates synthetic, diverse samples.</a:t>
+            </a:r>
+          </a:p>
+          <a:p>
+            <a:pPr marL="285750" indent="-285750">
+              <a:buFont typeface="Arial" panose="020B0604020202020204" pitchFamily="34" charset="0"/>
+              <a:buChar char="•"/>
+            </a:pPr>
+            <a:r>
+              <a:rPr lang="en-GB" dirty="0"/>
+              <a:t>Effective in handling class imbalance by introducing new information.</a:t>
+            </a:r>
+          </a:p>
+        </p:txBody>
+      </p:sp>
     </p:spTree>
     <p:extLst>
       <p:ext uri="{BB962C8B-B14F-4D97-AF65-F5344CB8AC3E}">
@@ -15248,8 +15273,8 @@
         </p:nvSpPr>
         <p:spPr>
           <a:xfrm>
-            <a:off x="308753" y="1143553"/>
-            <a:ext cx="9569239" cy="1077218"/>
+            <a:off x="1478101" y="1204958"/>
+            <a:ext cx="5969130" cy="584775"/>
           </a:xfrm>
           <a:prstGeom prst="rect">
             <a:avLst/>
@@ -15264,20 +15289,8 @@
           <a:p>
             <a:pPr algn="ctr"/>
             <a:r>
-              <a:rPr lang="en-GB" sz="3200" dirty="0" err="1"/>
-              <a:t>K_Nearest</a:t>
-            </a:r>
-            <a:r>
               <a:rPr lang="en-GB" sz="3200" dirty="0"/>
-              <a:t> </a:t>
-            </a:r>
-            <a:r>
-              <a:rPr lang="en-GB" sz="3200" dirty="0" err="1"/>
-              <a:t>neighbors</a:t>
-            </a:r>
-            <a:r>
-              <a:rPr lang="en-GB" sz="3200" dirty="0"/>
-              <a:t> Model And Logistic Regression Model</a:t>
+              <a:t>Evaluation of Models</a:t>
             </a:r>
           </a:p>
         </p:txBody>
@@ -15309,102 +15322,290 @@
       </p:sp>
       <p:sp>
         <p:nvSpPr>
-          <p:cNvPr id="4" name="Arrow: Right 5">
-            <a:extLst>
-              <a:ext uri="{FF2B5EF4-FFF2-40B4-BE49-F238E27FC236}">
-                <a16:creationId xmlns:a16="http://schemas.microsoft.com/office/drawing/2014/main" id="{535EED88-5866-123F-58A0-966702E594E9}"/>
-              </a:ext>
-            </a:extLst>
-          </p:cNvPr>
-          <p:cNvSpPr/>
+          <p:cNvPr id="2" name="Title 1">
+            <a:extLst>
+              <a:ext uri="{FF2B5EF4-FFF2-40B4-BE49-F238E27FC236}">
+                <a16:creationId xmlns:a16="http://schemas.microsoft.com/office/drawing/2014/main" id="{4A34A8C2-9497-38DC-9914-B9EB677E6073}"/>
+              </a:ext>
+            </a:extLst>
+          </p:cNvPr>
+          <p:cNvSpPr>
+            <a:spLocks noGrp="1"/>
+          </p:cNvSpPr>
+          <p:nvPr>
+            <p:ph type="title"/>
+          </p:nvPr>
+        </p:nvSpPr>
+        <p:spPr>
+          <a:xfrm>
+            <a:off x="588818" y="322857"/>
+            <a:ext cx="10515600" cy="1325563"/>
+          </a:xfrm>
+        </p:spPr>
+        <p:txBody>
+          <a:bodyPr/>
+          <a:lstStyle/>
+          <a:p>
+            <a:r>
+              <a:rPr lang="en-GB" dirty="0"/>
+              <a:t>Evaluation Of Models</a:t>
+            </a:r>
+          </a:p>
+        </p:txBody>
+      </p:sp>
+      <p:sp>
+        <p:nvSpPr>
+          <p:cNvPr id="5" name="Content Placeholder 2">
+            <a:extLst>
+              <a:ext uri="{FF2B5EF4-FFF2-40B4-BE49-F238E27FC236}">
+                <a16:creationId xmlns:a16="http://schemas.microsoft.com/office/drawing/2014/main" id="{78BF78A8-01EF-3FAA-1E25-C8DEB3374D83}"/>
+              </a:ext>
+            </a:extLst>
+          </p:cNvPr>
+          <p:cNvSpPr txBox="1">
+            <a:spLocks/>
+          </p:cNvSpPr>
           <p:nvPr/>
         </p:nvSpPr>
         <p:spPr>
           <a:xfrm>
-            <a:off x="5955158" y="3786525"/>
-            <a:ext cx="709126" cy="195943"/>
+            <a:off x="2309017" y="2113969"/>
+            <a:ext cx="5138214" cy="850009"/>
           </a:xfrm>
-          <a:prstGeom prst="rightArrow">
+          <a:prstGeom prst="rect">
             <a:avLst/>
           </a:prstGeom>
         </p:spPr>
-        <p:style>
-          <a:lnRef idx="2">
-            <a:schemeClr val="accent1">
-              <a:shade val="15000"/>
-            </a:schemeClr>
-          </a:lnRef>
-          <a:fillRef idx="1">
-            <a:schemeClr val="accent1"/>
-          </a:fillRef>
-          <a:effectRef idx="0">
-            <a:schemeClr val="accent1"/>
-          </a:effectRef>
-          <a:fontRef idx="minor">
-            <a:schemeClr val="lt1"/>
-          </a:fontRef>
-        </p:style>
         <p:txBody>
-          <a:bodyPr rtlCol="0" anchor="ctr"/>
-          <a:lstStyle/>
-          <a:p>
-            <a:pPr algn="ctr"/>
-            <a:endParaRPr lang="en-GB"/>
-          </a:p>
-        </p:txBody>
-      </p:sp>
-      <p:sp>
-        <p:nvSpPr>
-          <p:cNvPr id="8" name="Arrow: Right 6">
-            <a:extLst>
-              <a:ext uri="{FF2B5EF4-FFF2-40B4-BE49-F238E27FC236}">
-                <a16:creationId xmlns:a16="http://schemas.microsoft.com/office/drawing/2014/main" id="{BA981362-93A3-92CE-6DE5-7DF311D012C4}"/>
-              </a:ext>
-            </a:extLst>
-          </p:cNvPr>
-          <p:cNvSpPr/>
-          <p:nvPr/>
-        </p:nvSpPr>
-        <p:spPr>
-          <a:xfrm>
-            <a:off x="5988739" y="5572442"/>
-            <a:ext cx="709126" cy="195943"/>
-          </a:xfrm>
-          <a:prstGeom prst="rightArrow">
-            <a:avLst/>
-          </a:prstGeom>
-        </p:spPr>
-        <p:style>
-          <a:lnRef idx="2">
-            <a:schemeClr val="accent1">
-              <a:shade val="15000"/>
-            </a:schemeClr>
-          </a:lnRef>
-          <a:fillRef idx="1">
-            <a:schemeClr val="accent1"/>
-          </a:fillRef>
-          <a:effectRef idx="0">
-            <a:schemeClr val="accent1"/>
-          </a:effectRef>
-          <a:fontRef idx="minor">
-            <a:schemeClr val="lt1"/>
-          </a:fontRef>
-        </p:style>
-        <p:txBody>
-          <a:bodyPr rtlCol="0" anchor="ctr"/>
-          <a:lstStyle/>
-          <a:p>
-            <a:pPr algn="ctr"/>
-            <a:endParaRPr lang="en-GB"/>
+          <a:bodyPr/>
+          <a:lstStyle>
+            <a:lvl1pPr marL="228600" indent="-228600" algn="l" defTabSz="914400" rtl="0" eaLnBrk="1" latinLnBrk="0" hangingPunct="1">
+              <a:lnSpc>
+                <a:spcPct val="90000"/>
+              </a:lnSpc>
+              <a:spcBef>
+                <a:spcPts val="1000"/>
+              </a:spcBef>
+              <a:buFont typeface="Arial" panose="020B0604020202020204" pitchFamily="34" charset="0"/>
+              <a:buChar char="•"/>
+              <a:defRPr sz="2800" kern="1200">
+                <a:solidFill>
+                  <a:schemeClr val="tx1">
+                    <a:lumMod val="75000"/>
+                    <a:lumOff val="25000"/>
+                  </a:schemeClr>
+                </a:solidFill>
+                <a:latin typeface="+mn-lt"/>
+                <a:ea typeface="+mn-ea"/>
+                <a:cs typeface="+mn-cs"/>
+              </a:defRPr>
+            </a:lvl1pPr>
+            <a:lvl2pPr marL="685800" indent="-228600" algn="l" defTabSz="914400" rtl="0" eaLnBrk="1" latinLnBrk="0" hangingPunct="1">
+              <a:lnSpc>
+                <a:spcPct val="90000"/>
+              </a:lnSpc>
+              <a:spcBef>
+                <a:spcPts val="500"/>
+              </a:spcBef>
+              <a:buFont typeface="Arial" panose="020B0604020202020204" pitchFamily="34" charset="0"/>
+              <a:buChar char="•"/>
+              <a:defRPr sz="2400" kern="1200">
+                <a:solidFill>
+                  <a:schemeClr val="tx1">
+                    <a:lumMod val="75000"/>
+                    <a:lumOff val="25000"/>
+                  </a:schemeClr>
+                </a:solidFill>
+                <a:latin typeface="+mn-lt"/>
+                <a:ea typeface="+mn-ea"/>
+                <a:cs typeface="+mn-cs"/>
+              </a:defRPr>
+            </a:lvl2pPr>
+            <a:lvl3pPr marL="1143000" indent="-228600" algn="l" defTabSz="914400" rtl="0" eaLnBrk="1" latinLnBrk="0" hangingPunct="1">
+              <a:lnSpc>
+                <a:spcPct val="90000"/>
+              </a:lnSpc>
+              <a:spcBef>
+                <a:spcPts val="500"/>
+              </a:spcBef>
+              <a:buFont typeface="Arial" panose="020B0604020202020204" pitchFamily="34" charset="0"/>
+              <a:buChar char="•"/>
+              <a:defRPr sz="2000" kern="1200">
+                <a:solidFill>
+                  <a:schemeClr val="tx1">
+                    <a:lumMod val="75000"/>
+                    <a:lumOff val="25000"/>
+                  </a:schemeClr>
+                </a:solidFill>
+                <a:latin typeface="+mn-lt"/>
+                <a:ea typeface="+mn-ea"/>
+                <a:cs typeface="+mn-cs"/>
+              </a:defRPr>
+            </a:lvl3pPr>
+            <a:lvl4pPr marL="1600200" indent="-228600" algn="l" defTabSz="914400" rtl="0" eaLnBrk="1" latinLnBrk="0" hangingPunct="1">
+              <a:lnSpc>
+                <a:spcPct val="90000"/>
+              </a:lnSpc>
+              <a:spcBef>
+                <a:spcPts val="500"/>
+              </a:spcBef>
+              <a:buFont typeface="Arial" panose="020B0604020202020204" pitchFamily="34" charset="0"/>
+              <a:buChar char="•"/>
+              <a:defRPr sz="1800" kern="1200">
+                <a:solidFill>
+                  <a:schemeClr val="tx1">
+                    <a:lumMod val="75000"/>
+                    <a:lumOff val="25000"/>
+                  </a:schemeClr>
+                </a:solidFill>
+                <a:latin typeface="+mn-lt"/>
+                <a:ea typeface="+mn-ea"/>
+                <a:cs typeface="+mn-cs"/>
+              </a:defRPr>
+            </a:lvl4pPr>
+            <a:lvl5pPr marL="2057400" indent="-228600" algn="l" defTabSz="914400" rtl="0" eaLnBrk="1" latinLnBrk="0" hangingPunct="1">
+              <a:lnSpc>
+                <a:spcPct val="90000"/>
+              </a:lnSpc>
+              <a:spcBef>
+                <a:spcPts val="500"/>
+              </a:spcBef>
+              <a:buFont typeface="Arial" panose="020B0604020202020204" pitchFamily="34" charset="0"/>
+              <a:buChar char="•"/>
+              <a:defRPr sz="1800" kern="1200">
+                <a:solidFill>
+                  <a:schemeClr val="tx1">
+                    <a:lumMod val="75000"/>
+                    <a:lumOff val="25000"/>
+                  </a:schemeClr>
+                </a:solidFill>
+                <a:latin typeface="+mn-lt"/>
+                <a:ea typeface="+mn-ea"/>
+                <a:cs typeface="+mn-cs"/>
+              </a:defRPr>
+            </a:lvl5pPr>
+            <a:lvl6pPr marL="2514600" indent="-228600" algn="l" defTabSz="914400" rtl="0" eaLnBrk="1" latinLnBrk="0" hangingPunct="1">
+              <a:lnSpc>
+                <a:spcPct val="90000"/>
+              </a:lnSpc>
+              <a:spcBef>
+                <a:spcPts val="500"/>
+              </a:spcBef>
+              <a:buFont typeface="Arial" panose="020B0604020202020204" pitchFamily="34" charset="0"/>
+              <a:buChar char="•"/>
+              <a:defRPr sz="1800" kern="1200">
+                <a:solidFill>
+                  <a:schemeClr val="tx1"/>
+                </a:solidFill>
+                <a:latin typeface="+mn-lt"/>
+                <a:ea typeface="+mn-ea"/>
+                <a:cs typeface="+mn-cs"/>
+              </a:defRPr>
+            </a:lvl6pPr>
+            <a:lvl7pPr marL="2971800" indent="-228600" algn="l" defTabSz="914400" rtl="0" eaLnBrk="1" latinLnBrk="0" hangingPunct="1">
+              <a:lnSpc>
+                <a:spcPct val="90000"/>
+              </a:lnSpc>
+              <a:spcBef>
+                <a:spcPts val="500"/>
+              </a:spcBef>
+              <a:buFont typeface="Arial" panose="020B0604020202020204" pitchFamily="34" charset="0"/>
+              <a:buChar char="•"/>
+              <a:defRPr sz="1800" kern="1200">
+                <a:solidFill>
+                  <a:schemeClr val="tx1"/>
+                </a:solidFill>
+                <a:latin typeface="+mn-lt"/>
+                <a:ea typeface="+mn-ea"/>
+                <a:cs typeface="+mn-cs"/>
+              </a:defRPr>
+            </a:lvl7pPr>
+            <a:lvl8pPr marL="3429000" indent="-228600" algn="l" defTabSz="914400" rtl="0" eaLnBrk="1" latinLnBrk="0" hangingPunct="1">
+              <a:lnSpc>
+                <a:spcPct val="90000"/>
+              </a:lnSpc>
+              <a:spcBef>
+                <a:spcPts val="500"/>
+              </a:spcBef>
+              <a:buFont typeface="Arial" panose="020B0604020202020204" pitchFamily="34" charset="0"/>
+              <a:buChar char="•"/>
+              <a:defRPr sz="1800" kern="1200">
+                <a:solidFill>
+                  <a:schemeClr val="tx1"/>
+                </a:solidFill>
+                <a:latin typeface="+mn-lt"/>
+                <a:ea typeface="+mn-ea"/>
+                <a:cs typeface="+mn-cs"/>
+              </a:defRPr>
+            </a:lvl8pPr>
+            <a:lvl9pPr marL="3886200" indent="-228600" algn="l" defTabSz="914400" rtl="0" eaLnBrk="1" latinLnBrk="0" hangingPunct="1">
+              <a:lnSpc>
+                <a:spcPct val="90000"/>
+              </a:lnSpc>
+              <a:spcBef>
+                <a:spcPts val="500"/>
+              </a:spcBef>
+              <a:buFont typeface="Arial" panose="020B0604020202020204" pitchFamily="34" charset="0"/>
+              <a:buChar char="•"/>
+              <a:defRPr sz="1800" kern="1200">
+                <a:solidFill>
+                  <a:schemeClr val="tx1"/>
+                </a:solidFill>
+                <a:latin typeface="+mn-lt"/>
+                <a:ea typeface="+mn-ea"/>
+                <a:cs typeface="+mn-cs"/>
+              </a:defRPr>
+            </a:lvl9pPr>
+          </a:lstStyle>
+          <a:p>
+            <a:pPr marL="0" indent="0">
+              <a:buFont typeface="Arial" panose="020B0604020202020204" pitchFamily="34" charset="0"/>
+              <a:buNone/>
+            </a:pPr>
+            <a:r>
+              <a:rPr lang="en-GB" dirty="0"/>
+              <a:t>Metrices to evaluate Models</a:t>
+            </a:r>
+          </a:p>
+          <a:p>
+            <a:pPr marL="0" indent="0">
+              <a:buFont typeface="Arial" panose="020B0604020202020204" pitchFamily="34" charset="0"/>
+              <a:buNone/>
+            </a:pPr>
+            <a:endParaRPr lang="en-GB" dirty="0"/>
+          </a:p>
+          <a:p>
+            <a:pPr marL="0" indent="0">
+              <a:buFont typeface="Arial" panose="020B0604020202020204" pitchFamily="34" charset="0"/>
+              <a:buNone/>
+            </a:pPr>
+            <a:endParaRPr lang="en-GB" dirty="0"/>
+          </a:p>
+          <a:p>
+            <a:pPr marL="0" indent="0">
+              <a:buFont typeface="Arial" panose="020B0604020202020204" pitchFamily="34" charset="0"/>
+              <a:buNone/>
+            </a:pPr>
+            <a:endParaRPr lang="en-GB" dirty="0"/>
+          </a:p>
+          <a:p>
+            <a:pPr marL="0" indent="0">
+              <a:buFont typeface="Arial" panose="020B0604020202020204" pitchFamily="34" charset="0"/>
+              <a:buNone/>
+            </a:pPr>
+            <a:endParaRPr lang="en-GB" dirty="0"/>
+          </a:p>
+          <a:p>
+            <a:endParaRPr lang="en-GB" dirty="0"/>
           </a:p>
         </p:txBody>
       </p:sp>
       <p:pic>
         <p:nvPicPr>
-          <p:cNvPr id="9" name="Picture 8">
-            <a:extLst>
-              <a:ext uri="{FF2B5EF4-FFF2-40B4-BE49-F238E27FC236}">
-                <a16:creationId xmlns:a16="http://schemas.microsoft.com/office/drawing/2014/main" id="{5FBEFA33-4D01-F6B7-C70D-327A7B97DCE1}"/>
+          <p:cNvPr id="7" name="Picture 6">
+            <a:extLst>
+              <a:ext uri="{FF2B5EF4-FFF2-40B4-BE49-F238E27FC236}">
+                <a16:creationId xmlns:a16="http://schemas.microsoft.com/office/drawing/2014/main" id="{5373135D-56E5-9489-494A-76881ADA6D71}"/>
               </a:ext>
             </a:extLst>
           </p:cNvPr>
@@ -15421,8 +15622,8 @@
         </p:blipFill>
         <p:spPr>
           <a:xfrm>
-            <a:off x="6870045" y="2418105"/>
-            <a:ext cx="2616855" cy="2609929"/>
+            <a:off x="4767701" y="3553897"/>
+            <a:ext cx="5249534" cy="956312"/>
           </a:xfrm>
           <a:prstGeom prst="rect">
             <a:avLst/>
@@ -15431,10 +15632,10 @@
       </p:pic>
       <p:pic>
         <p:nvPicPr>
-          <p:cNvPr id="10" name="Picture 9">
-            <a:extLst>
-              <a:ext uri="{FF2B5EF4-FFF2-40B4-BE49-F238E27FC236}">
-                <a16:creationId xmlns:a16="http://schemas.microsoft.com/office/drawing/2014/main" id="{6D7061EA-40AD-6BCC-0050-9D3A995DD66A}"/>
+          <p:cNvPr id="12" name="Picture 11">
+            <a:extLst>
+              <a:ext uri="{FF2B5EF4-FFF2-40B4-BE49-F238E27FC236}">
+                <a16:creationId xmlns:a16="http://schemas.microsoft.com/office/drawing/2014/main" id="{6DB83A99-444D-1152-8CC6-F57BD636C896}"/>
               </a:ext>
             </a:extLst>
           </p:cNvPr>
@@ -15451,8 +15652,8 @@
         </p:blipFill>
         <p:spPr>
           <a:xfrm>
-            <a:off x="183477" y="2702919"/>
-            <a:ext cx="5575521" cy="3553028"/>
+            <a:off x="732263" y="5115365"/>
+            <a:ext cx="3735350" cy="944150"/>
           </a:xfrm>
           <a:prstGeom prst="rect">
             <a:avLst/>
@@ -15461,10 +15662,10 @@
       </p:pic>
       <p:pic>
         <p:nvPicPr>
-          <p:cNvPr id="11" name="Picture 10">
-            <a:extLst>
-              <a:ext uri="{FF2B5EF4-FFF2-40B4-BE49-F238E27FC236}">
-                <a16:creationId xmlns:a16="http://schemas.microsoft.com/office/drawing/2014/main" id="{CEB02443-4F2C-CB2F-8449-7551097D8B1F}"/>
+          <p:cNvPr id="13" name="Picture 12">
+            <a:extLst>
+              <a:ext uri="{FF2B5EF4-FFF2-40B4-BE49-F238E27FC236}">
+                <a16:creationId xmlns:a16="http://schemas.microsoft.com/office/drawing/2014/main" id="{13E4D700-B8F3-1D25-CAEA-F99A71CD0407}"/>
               </a:ext>
             </a:extLst>
           </p:cNvPr>
@@ -15481,8 +15682,38 @@
         </p:blipFill>
         <p:spPr>
           <a:xfrm>
-            <a:off x="6943259" y="5010930"/>
-            <a:ext cx="2543641" cy="2314225"/>
+            <a:off x="600288" y="3570841"/>
+            <a:ext cx="3650966" cy="988128"/>
+          </a:xfrm>
+          <a:prstGeom prst="rect">
+            <a:avLst/>
+          </a:prstGeom>
+        </p:spPr>
+      </p:pic>
+      <p:pic>
+        <p:nvPicPr>
+          <p:cNvPr id="14" name="Picture 13">
+            <a:extLst>
+              <a:ext uri="{FF2B5EF4-FFF2-40B4-BE49-F238E27FC236}">
+                <a16:creationId xmlns:a16="http://schemas.microsoft.com/office/drawing/2014/main" id="{43D20A3B-7FFA-EF53-4C9F-26520ABF8C8E}"/>
+              </a:ext>
+            </a:extLst>
+          </p:cNvPr>
+          <p:cNvPicPr>
+            <a:picLocks noChangeAspect="1"/>
+          </p:cNvPicPr>
+          <p:nvPr/>
+        </p:nvPicPr>
+        <p:blipFill>
+          <a:blip r:embed="rId6"/>
+          <a:stretch>
+            <a:fillRect/>
+          </a:stretch>
+        </p:blipFill>
+        <p:spPr>
+          <a:xfrm>
+            <a:off x="4791555" y="5208421"/>
+            <a:ext cx="4942903" cy="944150"/>
           </a:xfrm>
           <a:prstGeom prst="rect">
             <a:avLst/>
@@ -16143,36 +16374,6 @@
           </a:p>
         </p:txBody>
       </p:sp>
-      <p:pic>
-        <p:nvPicPr>
-          <p:cNvPr id="4" name="Picture 3">
-            <a:extLst>
-              <a:ext uri="{FF2B5EF4-FFF2-40B4-BE49-F238E27FC236}">
-                <a16:creationId xmlns:a16="http://schemas.microsoft.com/office/drawing/2014/main" id="{C50A6F3A-E6C5-12D1-109D-7E7AEA03EA87}"/>
-              </a:ext>
-            </a:extLst>
-          </p:cNvPr>
-          <p:cNvPicPr>
-            <a:picLocks noChangeAspect="1"/>
-          </p:cNvPicPr>
-          <p:nvPr/>
-        </p:nvPicPr>
-        <p:blipFill>
-          <a:blip r:embed="rId3"/>
-          <a:stretch>
-            <a:fillRect/>
-          </a:stretch>
-        </p:blipFill>
-        <p:spPr>
-          <a:xfrm>
-            <a:off x="733125" y="1618384"/>
-            <a:ext cx="4913965" cy="3329077"/>
-          </a:xfrm>
-          <a:prstGeom prst="rect">
-            <a:avLst/>
-          </a:prstGeom>
-        </p:spPr>
-      </p:pic>
       <p:sp>
         <p:nvSpPr>
           <p:cNvPr id="6" name="Arrow: Right 5">
@@ -16219,66 +16420,6 @@
           </a:p>
         </p:txBody>
       </p:sp>
-      <p:pic>
-        <p:nvPicPr>
-          <p:cNvPr id="7" name="Picture 6">
-            <a:extLst>
-              <a:ext uri="{FF2B5EF4-FFF2-40B4-BE49-F238E27FC236}">
-                <a16:creationId xmlns:a16="http://schemas.microsoft.com/office/drawing/2014/main" id="{39D7F80F-0D9B-2699-D3C6-457C467BED2A}"/>
-              </a:ext>
-            </a:extLst>
-          </p:cNvPr>
-          <p:cNvPicPr>
-            <a:picLocks noChangeAspect="1"/>
-          </p:cNvPicPr>
-          <p:nvPr/>
-        </p:nvPicPr>
-        <p:blipFill>
-          <a:blip r:embed="rId4"/>
-          <a:stretch>
-            <a:fillRect/>
-          </a:stretch>
-        </p:blipFill>
-        <p:spPr>
-          <a:xfrm>
-            <a:off x="6737438" y="1475997"/>
-            <a:ext cx="2212272" cy="1981486"/>
-          </a:xfrm>
-          <a:prstGeom prst="rect">
-            <a:avLst/>
-          </a:prstGeom>
-        </p:spPr>
-      </p:pic>
-      <p:pic>
-        <p:nvPicPr>
-          <p:cNvPr id="8" name="Picture 7">
-            <a:extLst>
-              <a:ext uri="{FF2B5EF4-FFF2-40B4-BE49-F238E27FC236}">
-                <a16:creationId xmlns:a16="http://schemas.microsoft.com/office/drawing/2014/main" id="{A7FAAAC4-C471-F241-04F6-8B7A57FA4CAC}"/>
-              </a:ext>
-            </a:extLst>
-          </p:cNvPr>
-          <p:cNvPicPr>
-            <a:picLocks noChangeAspect="1"/>
-          </p:cNvPicPr>
-          <p:nvPr/>
-        </p:nvPicPr>
-        <p:blipFill>
-          <a:blip r:embed="rId5"/>
-          <a:stretch>
-            <a:fillRect/>
-          </a:stretch>
-        </p:blipFill>
-        <p:spPr>
-          <a:xfrm>
-            <a:off x="6923718" y="3454452"/>
-            <a:ext cx="2047996" cy="1965967"/>
-          </a:xfrm>
-          <a:prstGeom prst="rect">
-            <a:avLst/>
-          </a:prstGeom>
-        </p:spPr>
-      </p:pic>
       <p:sp>
         <p:nvSpPr>
           <p:cNvPr id="9" name="Arrow: Right 10">
@@ -16325,12 +16466,102 @@
           </a:p>
         </p:txBody>
       </p:sp>
+      <p:pic>
+        <p:nvPicPr>
+          <p:cNvPr id="5" name="Picture 4">
+            <a:extLst>
+              <a:ext uri="{FF2B5EF4-FFF2-40B4-BE49-F238E27FC236}">
+                <a16:creationId xmlns:a16="http://schemas.microsoft.com/office/drawing/2014/main" id="{665D1823-6FB1-3041-7DB3-D0311FD7B404}"/>
+              </a:ext>
+            </a:extLst>
+          </p:cNvPr>
+          <p:cNvPicPr>
+            <a:picLocks noChangeAspect="1"/>
+          </p:cNvPicPr>
+          <p:nvPr/>
+        </p:nvPicPr>
+        <p:blipFill>
+          <a:blip r:embed="rId3"/>
+          <a:stretch>
+            <a:fillRect/>
+          </a:stretch>
+        </p:blipFill>
+        <p:spPr>
+          <a:xfrm>
+            <a:off x="334022" y="1989625"/>
+            <a:ext cx="4821970" cy="3127928"/>
+          </a:xfrm>
+          <a:prstGeom prst="rect">
+            <a:avLst/>
+          </a:prstGeom>
+        </p:spPr>
+      </p:pic>
+      <p:pic>
+        <p:nvPicPr>
+          <p:cNvPr id="12" name="Picture 11">
+            <a:extLst>
+              <a:ext uri="{FF2B5EF4-FFF2-40B4-BE49-F238E27FC236}">
+                <a16:creationId xmlns:a16="http://schemas.microsoft.com/office/drawing/2014/main" id="{4E4FCF34-A635-AFAA-78EB-EC67DB483841}"/>
+              </a:ext>
+            </a:extLst>
+          </p:cNvPr>
+          <p:cNvPicPr>
+            <a:picLocks noChangeAspect="1"/>
+          </p:cNvPicPr>
+          <p:nvPr/>
+        </p:nvPicPr>
+        <p:blipFill>
+          <a:blip r:embed="rId4"/>
+          <a:stretch>
+            <a:fillRect/>
+          </a:stretch>
+        </p:blipFill>
+        <p:spPr>
+          <a:xfrm>
+            <a:off x="6759224" y="1750583"/>
+            <a:ext cx="1676887" cy="1579835"/>
+          </a:xfrm>
+          <a:prstGeom prst="rect">
+            <a:avLst/>
+          </a:prstGeom>
+        </p:spPr>
+      </p:pic>
+      <p:pic>
+        <p:nvPicPr>
+          <p:cNvPr id="13" name="Picture 12">
+            <a:extLst>
+              <a:ext uri="{FF2B5EF4-FFF2-40B4-BE49-F238E27FC236}">
+                <a16:creationId xmlns:a16="http://schemas.microsoft.com/office/drawing/2014/main" id="{F9EF9AED-7CD9-E30D-0F86-89EC4218BB5A}"/>
+              </a:ext>
+            </a:extLst>
+          </p:cNvPr>
+          <p:cNvPicPr>
+            <a:picLocks noChangeAspect="1"/>
+          </p:cNvPicPr>
+          <p:nvPr/>
+        </p:nvPicPr>
+        <p:blipFill>
+          <a:blip r:embed="rId5"/>
+          <a:stretch>
+            <a:fillRect/>
+          </a:stretch>
+        </p:blipFill>
+        <p:spPr>
+          <a:xfrm>
+            <a:off x="7002348" y="3525394"/>
+            <a:ext cx="1433763" cy="1704584"/>
+          </a:xfrm>
+          <a:prstGeom prst="rect">
+            <a:avLst/>
+          </a:prstGeom>
+        </p:spPr>
+      </p:pic>
       <p:sp>
         <p:nvSpPr>
-          <p:cNvPr id="10" name="TextBox 9">
-            <a:extLst>
-              <a:ext uri="{FF2B5EF4-FFF2-40B4-BE49-F238E27FC236}">
-                <a16:creationId xmlns:a16="http://schemas.microsoft.com/office/drawing/2014/main" id="{D12E71A1-E474-9438-C9CC-96D23C7B1E10}"/>
+          <p:cNvPr id="14" name="TextBox 13">
+            <a:extLst>
+              <a:ext uri="{FF2B5EF4-FFF2-40B4-BE49-F238E27FC236}">
+                <a16:creationId xmlns:a16="http://schemas.microsoft.com/office/drawing/2014/main" id="{DE4DCEFD-DDAE-6885-60F6-B3DE195B859F}"/>
               </a:ext>
             </a:extLst>
           </p:cNvPr>
@@ -16339,7 +16570,7 @@
         </p:nvSpPr>
         <p:spPr>
           <a:xfrm>
-            <a:off x="147710" y="5456100"/>
+            <a:off x="219208" y="5411458"/>
             <a:ext cx="9755035" cy="923330"/>
           </a:xfrm>
           <a:prstGeom prst="rect">
@@ -16358,18 +16589,22 @@
               <a:buChar char="•"/>
             </a:pPr>
             <a:r>
+              <a:rPr lang="en-GB" b="1" dirty="0"/>
+              <a:t>In Decision Tree Model </a:t>
+            </a:r>
+            <a:r>
               <a:rPr lang="en-GB" dirty="0"/>
-              <a:t>In Decision Tree Model 52 people who actually have Stroke, model  is predicting them as they don’t have stroke while 67 are those who actually do not have stroke and model is predicting them as they have stroke.</a:t>
+              <a:t>51 people who actually have Stroke, model  is predicting them as they don’t have stroke while 55 are those who actually do not have stroke and model is predicting them as they have stroke. </a:t>
             </a:r>
           </a:p>
         </p:txBody>
       </p:sp>
       <p:sp>
         <p:nvSpPr>
-          <p:cNvPr id="11" name="TextBox 10">
-            <a:extLst>
-              <a:ext uri="{FF2B5EF4-FFF2-40B4-BE49-F238E27FC236}">
-                <a16:creationId xmlns:a16="http://schemas.microsoft.com/office/drawing/2014/main" id="{BDBA4C28-D89B-6739-15E0-C90D2BB717D3}"/>
+          <p:cNvPr id="15" name="TextBox 14">
+            <a:extLst>
+              <a:ext uri="{FF2B5EF4-FFF2-40B4-BE49-F238E27FC236}">
+                <a16:creationId xmlns:a16="http://schemas.microsoft.com/office/drawing/2014/main" id="{DE022E67-0DEC-BDCF-9F73-80C49E221E00}"/>
               </a:ext>
             </a:extLst>
           </p:cNvPr>
@@ -16378,8 +16613,8 @@
         </p:nvSpPr>
         <p:spPr>
           <a:xfrm>
-            <a:off x="122957" y="6338671"/>
-            <a:ext cx="9755035" cy="1200329"/>
+            <a:off x="219209" y="6537828"/>
+            <a:ext cx="9291004" cy="1200329"/>
           </a:xfrm>
           <a:prstGeom prst="rect">
             <a:avLst/>
@@ -16397,8 +16632,12 @@
               <a:buChar char="•"/>
             </a:pPr>
             <a:r>
+              <a:rPr lang="en-GB" b="1" dirty="0"/>
+              <a:t>In Random Forest Model </a:t>
+            </a:r>
+            <a:r>
               <a:rPr lang="en-GB" dirty="0"/>
-              <a:t>In Random Forest Model 59 people who actually have Stroke, model  is predicting them as they don’t have stroke while 13 are those who actually do not have stroke and model is predicting them as they have stroke.</a:t>
+              <a:t>57 people who actually have Stroke, model  is predicting them as they don’t have stroke while 18 are those who actually do not have stroke and model is predicting them as they have stroke.</a:t>
             </a:r>
           </a:p>
           <a:p>
@@ -16869,7 +17108,7 @@
         <p:spPr>
           <a:xfrm>
             <a:off x="308753" y="814937"/>
-            <a:ext cx="9569239" cy="584775"/>
+            <a:ext cx="9569239" cy="1077218"/>
           </a:xfrm>
           <a:prstGeom prst="rect">
             <a:avLst/>
@@ -16884,14 +17123,20 @@
           <a:p>
             <a:pPr algn="ctr"/>
             <a:r>
-              <a:rPr lang="en-GB" sz="3200" i="0" dirty="0">
-                <a:solidFill>
-                  <a:srgbClr val="000000"/>
-                </a:solidFill>
-                <a:effectLst/>
-                <a:latin typeface="Helvetica Neue"/>
-              </a:rPr>
-              <a:t>Support Vector Machine (SVM) </a:t>
+              <a:rPr lang="en-GB" sz="3200" dirty="0" err="1"/>
+              <a:t>K_Nearest</a:t>
+            </a:r>
+            <a:r>
+              <a:rPr lang="en-GB" sz="3200" dirty="0"/>
+              <a:t> </a:t>
+            </a:r>
+            <a:r>
+              <a:rPr lang="en-GB" sz="3200" dirty="0" err="1"/>
+              <a:t>neighbors</a:t>
+            </a:r>
+            <a:r>
+              <a:rPr lang="en-GB" sz="3200" dirty="0"/>
+              <a:t> Model And Logistic Regression Model</a:t>
             </a:r>
           </a:p>
         </p:txBody>
@@ -16921,66 +17166,6 @@
           </a:p>
         </p:txBody>
       </p:sp>
-      <p:pic>
-        <p:nvPicPr>
-          <p:cNvPr id="16" name="Picture 15">
-            <a:extLst>
-              <a:ext uri="{FF2B5EF4-FFF2-40B4-BE49-F238E27FC236}">
-                <a16:creationId xmlns:a16="http://schemas.microsoft.com/office/drawing/2014/main" id="{6C05F6DF-CA9B-6F73-4A23-C822330C0EB7}"/>
-              </a:ext>
-            </a:extLst>
-          </p:cNvPr>
-          <p:cNvPicPr>
-            <a:picLocks noChangeAspect="1"/>
-          </p:cNvPicPr>
-          <p:nvPr/>
-        </p:nvPicPr>
-        <p:blipFill>
-          <a:blip r:embed="rId3"/>
-          <a:stretch>
-            <a:fillRect/>
-          </a:stretch>
-        </p:blipFill>
-        <p:spPr>
-          <a:xfrm>
-            <a:off x="308753" y="2271842"/>
-            <a:ext cx="5545544" cy="1929670"/>
-          </a:xfrm>
-          <a:prstGeom prst="rect">
-            <a:avLst/>
-          </a:prstGeom>
-        </p:spPr>
-      </p:pic>
-      <p:pic>
-        <p:nvPicPr>
-          <p:cNvPr id="17" name="Picture 16">
-            <a:extLst>
-              <a:ext uri="{FF2B5EF4-FFF2-40B4-BE49-F238E27FC236}">
-                <a16:creationId xmlns:a16="http://schemas.microsoft.com/office/drawing/2014/main" id="{CC23EE9C-A551-762D-6A73-5F4699ADE886}"/>
-              </a:ext>
-            </a:extLst>
-          </p:cNvPr>
-          <p:cNvPicPr>
-            <a:picLocks noChangeAspect="1"/>
-          </p:cNvPicPr>
-          <p:nvPr/>
-        </p:nvPicPr>
-        <p:blipFill>
-          <a:blip r:embed="rId4"/>
-          <a:stretch>
-            <a:fillRect/>
-          </a:stretch>
-        </p:blipFill>
-        <p:spPr>
-          <a:xfrm>
-            <a:off x="7496139" y="2319902"/>
-            <a:ext cx="2113829" cy="2082189"/>
-          </a:xfrm>
-          <a:prstGeom prst="rect">
-            <a:avLst/>
-          </a:prstGeom>
-        </p:spPr>
-      </p:pic>
       <p:sp>
         <p:nvSpPr>
           <p:cNvPr id="18" name="Arrow: Right 20">
@@ -16995,7 +17180,7 @@
         </p:nvSpPr>
         <p:spPr>
           <a:xfrm>
-            <a:off x="6081249" y="3161215"/>
+            <a:off x="5618506" y="3161215"/>
             <a:ext cx="1238783" cy="338406"/>
           </a:xfrm>
           <a:prstGeom prst="rightArrow">
@@ -17027,701 +17212,12 @@
           </a:p>
         </p:txBody>
       </p:sp>
-      <p:sp>
-        <p:nvSpPr>
-          <p:cNvPr id="19" name="TextBox 18">
-            <a:extLst>
-              <a:ext uri="{FF2B5EF4-FFF2-40B4-BE49-F238E27FC236}">
-                <a16:creationId xmlns:a16="http://schemas.microsoft.com/office/drawing/2014/main" id="{BD3EF26E-BCF3-D032-4332-5709CBEFF155}"/>
-              </a:ext>
-            </a:extLst>
-          </p:cNvPr>
-          <p:cNvSpPr txBox="1"/>
-          <p:nvPr/>
-        </p:nvSpPr>
-        <p:spPr>
-          <a:xfrm>
-            <a:off x="2041394" y="4947075"/>
-            <a:ext cx="5754311" cy="923330"/>
-          </a:xfrm>
-          <a:prstGeom prst="rect">
-            <a:avLst/>
-          </a:prstGeom>
-          <a:noFill/>
-        </p:spPr>
-        <p:txBody>
-          <a:bodyPr wrap="square" rtlCol="0">
-            <a:spAutoFit/>
-          </a:bodyPr>
-          <a:lstStyle/>
-          <a:p>
-            <a:r>
-              <a:rPr lang="en-GB" dirty="0"/>
-              <a:t>SVM with Oversampled Data shows some promising results with a recall for Stroke1 81% and with 12 FN. Though the number of FP is quite High.  </a:t>
-            </a:r>
-          </a:p>
-        </p:txBody>
-      </p:sp>
-    </p:spTree>
-    <p:extLst>
-      <p:ext uri="{BB962C8B-B14F-4D97-AF65-F5344CB8AC3E}">
-        <p14:creationId xmlns:p14="http://schemas.microsoft.com/office/powerpoint/2010/main" val="2888708004"/>
-      </p:ext>
-    </p:extLst>
-  </p:cSld>
-  <p:clrMapOvr>
-    <a:masterClrMapping/>
-  </p:clrMapOvr>
-</p:sld>
-</file>
-
-<file path=ppt/slides/slide18.xml><?xml version="1.0" encoding="utf-8"?>
-<p:sld xmlns:a="http://schemas.openxmlformats.org/drawingml/2006/main" xmlns:r="http://schemas.openxmlformats.org/officeDocument/2006/relationships" xmlns:p="http://schemas.openxmlformats.org/presentationml/2006/main">
-  <p:cSld>
-    <p:bg>
-      <p:bgPr>
-        <a:solidFill>
-          <a:schemeClr val="bg1"/>
-        </a:solidFill>
-        <a:effectLst/>
-      </p:bgPr>
-    </p:bg>
-    <p:spTree>
-      <p:nvGrpSpPr>
-        <p:cNvPr id="1" name="">
-          <a:extLst>
-            <a:ext uri="{FF2B5EF4-FFF2-40B4-BE49-F238E27FC236}">
-              <a16:creationId xmlns:a16="http://schemas.microsoft.com/office/drawing/2014/main" id="{25771B89-78F3-1078-2389-E52B3BBADD7C}"/>
-            </a:ext>
-          </a:extLst>
-        </p:cNvPr>
-        <p:cNvGrpSpPr/>
-        <p:nvPr/>
-      </p:nvGrpSpPr>
-      <p:grpSpPr>
-        <a:xfrm>
-          <a:off x="0" y="0"/>
-          <a:ext cx="0" cy="0"/>
-          <a:chOff x="0" y="0"/>
-          <a:chExt cx="0" cy="0"/>
-        </a:xfrm>
-      </p:grpSpPr>
-      <p:sp>
-        <p:nvSpPr>
-          <p:cNvPr id="27" name="Rectangle 26">
-            <a:extLst>
-              <a:ext uri="{FF2B5EF4-FFF2-40B4-BE49-F238E27FC236}">
-                <a16:creationId xmlns:a16="http://schemas.microsoft.com/office/drawing/2014/main" id="{719AD404-EC56-A956-8381-EC360FC873AD}"/>
-              </a:ext>
-              <a:ext uri="{C183D7F6-B498-43B3-948B-1728B52AA6E4}">
-                <adec:decorative xmlns:adec="http://schemas.microsoft.com/office/drawing/2017/decorative" val="1"/>
-              </a:ext>
-            </a:extLst>
-          </p:cNvPr>
-          <p:cNvSpPr>
-            <a:spLocks noGrp="1" noRot="1" noChangeAspect="1" noMove="1" noResize="1" noEditPoints="1" noAdjustHandles="1" noChangeArrowheads="1" noChangeShapeType="1" noTextEdit="1"/>
-          </p:cNvSpPr>
-          <p:nvPr>
-            <p:extLst>
-              <p:ext uri="{386F3935-93C4-4BCD-93E2-E3B085C9AB24}">
-                <p16:designElem xmlns:p16="http://schemas.microsoft.com/office/powerpoint/2015/main" val="1"/>
-              </p:ext>
-            </p:extLst>
-          </p:nvPr>
-        </p:nvSpPr>
-        <p:spPr>
-          <a:xfrm>
-            <a:off x="0" y="0"/>
-            <a:ext cx="10058400" cy="7772400"/>
-          </a:xfrm>
-          <a:prstGeom prst="rect">
-            <a:avLst/>
-          </a:prstGeom>
-          <a:solidFill>
-            <a:schemeClr val="bg1"/>
-          </a:solidFill>
-          <a:ln>
-            <a:noFill/>
-          </a:ln>
-        </p:spPr>
-        <p:style>
-          <a:lnRef idx="2">
-            <a:schemeClr val="accent1">
-              <a:shade val="50000"/>
-            </a:schemeClr>
-          </a:lnRef>
-          <a:fillRef idx="1">
-            <a:schemeClr val="accent1"/>
-          </a:fillRef>
-          <a:effectRef idx="0">
-            <a:schemeClr val="accent1"/>
-          </a:effectRef>
-          <a:fontRef idx="minor">
-            <a:schemeClr val="lt1"/>
-          </a:fontRef>
-        </p:style>
-        <p:txBody>
-          <a:bodyPr rtlCol="0" anchor="ctr"/>
-          <a:lstStyle/>
-          <a:p>
-            <a:pPr algn="ctr"/>
-            <a:endParaRPr lang="en-US" dirty="0"/>
-          </a:p>
-        </p:txBody>
-      </p:sp>
-      <p:sp>
-        <p:nvSpPr>
-          <p:cNvPr id="29" name="Freeform: Shape 28">
-            <a:extLst>
-              <a:ext uri="{FF2B5EF4-FFF2-40B4-BE49-F238E27FC236}">
-                <a16:creationId xmlns:a16="http://schemas.microsoft.com/office/drawing/2014/main" id="{FB028C8D-A210-553F-8D54-15230B23320F}"/>
-              </a:ext>
-              <a:ext uri="{C183D7F6-B498-43B3-948B-1728B52AA6E4}">
-                <adec:decorative xmlns:adec="http://schemas.microsoft.com/office/drawing/2017/decorative" val="1"/>
-              </a:ext>
-            </a:extLst>
-          </p:cNvPr>
-          <p:cNvSpPr>
-            <a:spLocks noGrp="1" noRot="1" noChangeAspect="1" noMove="1" noResize="1" noEditPoints="1" noAdjustHandles="1" noChangeArrowheads="1" noChangeShapeType="1" noTextEdit="1"/>
-          </p:cNvSpPr>
-          <p:nvPr>
-            <p:extLst>
-              <p:ext uri="{386F3935-93C4-4BCD-93E2-E3B085C9AB24}">
-                <p16:designElem xmlns:p16="http://schemas.microsoft.com/office/powerpoint/2015/main" val="1"/>
-              </p:ext>
-            </p:extLst>
-          </p:nvPr>
-        </p:nvSpPr>
-        <p:spPr>
-          <a:xfrm rot="18900000" flipH="1">
-            <a:off x="-310328" y="-287492"/>
-            <a:ext cx="1507800" cy="1560586"/>
-          </a:xfrm>
-          <a:custGeom>
-            <a:avLst/>
-            <a:gdLst>
-              <a:gd name="connsiteX0" fmla="*/ 0 w 1827638"/>
-              <a:gd name="connsiteY0" fmla="*/ 987379 h 1376989"/>
-              <a:gd name="connsiteX1" fmla="*/ 987379 w 1827638"/>
-              <a:gd name="connsiteY1" fmla="*/ 0 h 1376989"/>
-              <a:gd name="connsiteX2" fmla="*/ 1827638 w 1827638"/>
-              <a:gd name="connsiteY2" fmla="*/ 840260 h 1376989"/>
-              <a:gd name="connsiteX3" fmla="*/ 1827638 w 1827638"/>
-              <a:gd name="connsiteY3" fmla="*/ 1376989 h 1376989"/>
-              <a:gd name="connsiteX4" fmla="*/ 0 w 1827638"/>
-              <a:gd name="connsiteY4" fmla="*/ 1376989 h 1376989"/>
-            </a:gdLst>
-            <a:ahLst/>
-            <a:cxnLst>
-              <a:cxn ang="0">
-                <a:pos x="connsiteX0" y="connsiteY0"/>
-              </a:cxn>
-              <a:cxn ang="0">
-                <a:pos x="connsiteX1" y="connsiteY1"/>
-              </a:cxn>
-              <a:cxn ang="0">
-                <a:pos x="connsiteX2" y="connsiteY2"/>
-              </a:cxn>
-              <a:cxn ang="0">
-                <a:pos x="connsiteX3" y="connsiteY3"/>
-              </a:cxn>
-              <a:cxn ang="0">
-                <a:pos x="connsiteX4" y="connsiteY4"/>
-              </a:cxn>
-            </a:cxnLst>
-            <a:rect l="l" t="t" r="r" b="b"/>
-            <a:pathLst>
-              <a:path w="1827638" h="1376989">
-                <a:moveTo>
-                  <a:pt x="0" y="987379"/>
-                </a:moveTo>
-                <a:lnTo>
-                  <a:pt x="987379" y="0"/>
-                </a:lnTo>
-                <a:lnTo>
-                  <a:pt x="1827638" y="840260"/>
-                </a:lnTo>
-                <a:lnTo>
-                  <a:pt x="1827638" y="1376989"/>
-                </a:lnTo>
-                <a:lnTo>
-                  <a:pt x="0" y="1376989"/>
-                </a:lnTo>
-                <a:close/>
-              </a:path>
-            </a:pathLst>
-          </a:custGeom>
-          <a:solidFill>
-            <a:schemeClr val="accent1">
-              <a:alpha val="30000"/>
-            </a:schemeClr>
-          </a:solidFill>
-          <a:ln>
-            <a:noFill/>
-          </a:ln>
-        </p:spPr>
-        <p:style>
-          <a:lnRef idx="2">
-            <a:schemeClr val="accent1">
-              <a:shade val="50000"/>
-            </a:schemeClr>
-          </a:lnRef>
-          <a:fillRef idx="1">
-            <a:schemeClr val="accent1"/>
-          </a:fillRef>
-          <a:effectRef idx="0">
-            <a:schemeClr val="accent1"/>
-          </a:effectRef>
-          <a:fontRef idx="minor">
-            <a:schemeClr val="lt1"/>
-          </a:fontRef>
-        </p:style>
-        <p:txBody>
-          <a:bodyPr rtlCol="0" anchor="ctr"/>
-          <a:lstStyle/>
-          <a:p>
-            <a:pPr algn="ctr"/>
-            <a:endParaRPr lang="en-US" dirty="0"/>
-          </a:p>
-        </p:txBody>
-      </p:sp>
-      <p:sp>
-        <p:nvSpPr>
-          <p:cNvPr id="31" name="Rectangle 30">
-            <a:extLst>
-              <a:ext uri="{FF2B5EF4-FFF2-40B4-BE49-F238E27FC236}">
-                <a16:creationId xmlns:a16="http://schemas.microsoft.com/office/drawing/2014/main" id="{B51533BF-0111-11BD-DD70-6E53B41D825A}"/>
-              </a:ext>
-              <a:ext uri="{C183D7F6-B498-43B3-948B-1728B52AA6E4}">
-                <adec:decorative xmlns:adec="http://schemas.microsoft.com/office/drawing/2017/decorative" val="1"/>
-              </a:ext>
-            </a:extLst>
-          </p:cNvPr>
-          <p:cNvSpPr>
-            <a:spLocks noGrp="1" noRot="1" noChangeAspect="1" noMove="1" noResize="1" noEditPoints="1" noAdjustHandles="1" noChangeArrowheads="1" noChangeShapeType="1" noTextEdit="1"/>
-          </p:cNvSpPr>
-          <p:nvPr>
-            <p:extLst>
-              <p:ext uri="{386F3935-93C4-4BCD-93E2-E3B085C9AB24}">
-                <p16:designElem xmlns:p16="http://schemas.microsoft.com/office/powerpoint/2015/main" val="1"/>
-              </p:ext>
-            </p:extLst>
-          </p:nvPr>
-        </p:nvSpPr>
-        <p:spPr>
-          <a:xfrm rot="18900000" flipH="1">
-            <a:off x="735603" y="478432"/>
-            <a:ext cx="532429" cy="731417"/>
-          </a:xfrm>
-          <a:prstGeom prst="rect">
-            <a:avLst/>
-          </a:prstGeom>
-          <a:solidFill>
-            <a:schemeClr val="accent1">
-              <a:alpha val="30000"/>
-            </a:schemeClr>
-          </a:solidFill>
-          <a:ln>
-            <a:noFill/>
-          </a:ln>
-        </p:spPr>
-        <p:style>
-          <a:lnRef idx="2">
-            <a:schemeClr val="accent1">
-              <a:shade val="50000"/>
-            </a:schemeClr>
-          </a:lnRef>
-          <a:fillRef idx="1">
-            <a:schemeClr val="accent1"/>
-          </a:fillRef>
-          <a:effectRef idx="0">
-            <a:schemeClr val="accent1"/>
-          </a:effectRef>
-          <a:fontRef idx="minor">
-            <a:schemeClr val="lt1"/>
-          </a:fontRef>
-        </p:style>
-        <p:txBody>
-          <a:bodyPr rtlCol="0" anchor="ctr"/>
-          <a:lstStyle/>
-          <a:p>
-            <a:pPr algn="ctr"/>
-            <a:endParaRPr lang="en-US"/>
-          </a:p>
-        </p:txBody>
-      </p:sp>
-      <p:sp>
-        <p:nvSpPr>
-          <p:cNvPr id="33" name="Rectangle 32">
-            <a:extLst>
-              <a:ext uri="{FF2B5EF4-FFF2-40B4-BE49-F238E27FC236}">
-                <a16:creationId xmlns:a16="http://schemas.microsoft.com/office/drawing/2014/main" id="{04FD91C9-485D-30B6-4EBA-F726CEE6C2E7}"/>
-              </a:ext>
-              <a:ext uri="{C183D7F6-B498-43B3-948B-1728B52AA6E4}">
-                <adec:decorative xmlns:adec="http://schemas.microsoft.com/office/drawing/2017/decorative" val="1"/>
-              </a:ext>
-            </a:extLst>
-          </p:cNvPr>
-          <p:cNvSpPr>
-            <a:spLocks noGrp="1" noRot="1" noChangeAspect="1" noMove="1" noResize="1" noEditPoints="1" noAdjustHandles="1" noChangeArrowheads="1" noChangeShapeType="1" noTextEdit="1"/>
-          </p:cNvSpPr>
-          <p:nvPr>
-            <p:extLst>
-              <p:ext uri="{386F3935-93C4-4BCD-93E2-E3B085C9AB24}">
-                <p16:designElem xmlns:p16="http://schemas.microsoft.com/office/powerpoint/2015/main" val="1"/>
-              </p:ext>
-            </p:extLst>
-          </p:nvPr>
-        </p:nvSpPr>
-        <p:spPr>
-          <a:xfrm rot="18900000" flipH="1">
-            <a:off x="8285872" y="742492"/>
-            <a:ext cx="567165" cy="779134"/>
-          </a:xfrm>
-          <a:prstGeom prst="rect">
-            <a:avLst/>
-          </a:prstGeom>
-          <a:solidFill>
-            <a:schemeClr val="accent4">
-              <a:alpha val="30000"/>
-            </a:schemeClr>
-          </a:solidFill>
-          <a:ln>
-            <a:noFill/>
-          </a:ln>
-        </p:spPr>
-        <p:style>
-          <a:lnRef idx="2">
-            <a:schemeClr val="accent1">
-              <a:shade val="50000"/>
-            </a:schemeClr>
-          </a:lnRef>
-          <a:fillRef idx="1">
-            <a:schemeClr val="accent1"/>
-          </a:fillRef>
-          <a:effectRef idx="0">
-            <a:schemeClr val="accent1"/>
-          </a:effectRef>
-          <a:fontRef idx="minor">
-            <a:schemeClr val="lt1"/>
-          </a:fontRef>
-        </p:style>
-        <p:txBody>
-          <a:bodyPr rtlCol="0" anchor="ctr"/>
-          <a:lstStyle/>
-          <a:p>
-            <a:pPr algn="ctr"/>
-            <a:endParaRPr lang="en-US"/>
-          </a:p>
-        </p:txBody>
-      </p:sp>
-      <p:sp>
-        <p:nvSpPr>
-          <p:cNvPr id="35" name="Freeform: Shape 34">
-            <a:extLst>
-              <a:ext uri="{FF2B5EF4-FFF2-40B4-BE49-F238E27FC236}">
-                <a16:creationId xmlns:a16="http://schemas.microsoft.com/office/drawing/2014/main" id="{3A207A45-550B-69DF-3581-86563D3EA77F}"/>
-              </a:ext>
-              <a:ext uri="{C183D7F6-B498-43B3-948B-1728B52AA6E4}">
-                <adec:decorative xmlns:adec="http://schemas.microsoft.com/office/drawing/2017/decorative" val="1"/>
-              </a:ext>
-            </a:extLst>
-          </p:cNvPr>
-          <p:cNvSpPr>
-            <a:spLocks noGrp="1" noRot="1" noChangeAspect="1" noMove="1" noResize="1" noEditPoints="1" noAdjustHandles="1" noChangeArrowheads="1" noChangeShapeType="1" noTextEdit="1"/>
-          </p:cNvSpPr>
-          <p:nvPr>
-            <p:extLst>
-              <p:ext uri="{386F3935-93C4-4BCD-93E2-E3B085C9AB24}">
-                <p16:designElem xmlns:p16="http://schemas.microsoft.com/office/powerpoint/2015/main" val="1"/>
-              </p:ext>
-            </p:extLst>
-          </p:nvPr>
-        </p:nvSpPr>
-        <p:spPr>
-          <a:xfrm rot="10800000" flipH="1">
-            <a:off x="7719230" y="0"/>
-            <a:ext cx="2339170" cy="1678281"/>
-          </a:xfrm>
-          <a:custGeom>
-            <a:avLst/>
-            <a:gdLst>
-              <a:gd name="connsiteX0" fmla="*/ 2835357 w 2835357"/>
-              <a:gd name="connsiteY0" fmla="*/ 1480837 h 1480837"/>
-              <a:gd name="connsiteX1" fmla="*/ 0 w 2835357"/>
-              <a:gd name="connsiteY1" fmla="*/ 1480837 h 1480837"/>
-              <a:gd name="connsiteX2" fmla="*/ 1552727 w 2835357"/>
-              <a:gd name="connsiteY2" fmla="*/ 0 h 1480837"/>
-              <a:gd name="connsiteX3" fmla="*/ 2835357 w 2835357"/>
-              <a:gd name="connsiteY3" fmla="*/ 1223245 h 1480837"/>
-            </a:gdLst>
-            <a:ahLst/>
-            <a:cxnLst>
-              <a:cxn ang="0">
-                <a:pos x="connsiteX0" y="connsiteY0"/>
-              </a:cxn>
-              <a:cxn ang="0">
-                <a:pos x="connsiteX1" y="connsiteY1"/>
-              </a:cxn>
-              <a:cxn ang="0">
-                <a:pos x="connsiteX2" y="connsiteY2"/>
-              </a:cxn>
-              <a:cxn ang="0">
-                <a:pos x="connsiteX3" y="connsiteY3"/>
-              </a:cxn>
-            </a:cxnLst>
-            <a:rect l="l" t="t" r="r" b="b"/>
-            <a:pathLst>
-              <a:path w="2835357" h="1480837">
-                <a:moveTo>
-                  <a:pt x="2835357" y="1480837"/>
-                </a:moveTo>
-                <a:lnTo>
-                  <a:pt x="0" y="1480837"/>
-                </a:lnTo>
-                <a:lnTo>
-                  <a:pt x="1552727" y="0"/>
-                </a:lnTo>
-                <a:lnTo>
-                  <a:pt x="2835357" y="1223245"/>
-                </a:lnTo>
-                <a:close/>
-              </a:path>
-            </a:pathLst>
-          </a:custGeom>
-          <a:solidFill>
-            <a:schemeClr val="accent4">
-              <a:alpha val="30000"/>
-            </a:schemeClr>
-          </a:solidFill>
-          <a:ln>
-            <a:noFill/>
-          </a:ln>
-        </p:spPr>
-        <p:style>
-          <a:lnRef idx="2">
-            <a:schemeClr val="accent1">
-              <a:shade val="50000"/>
-            </a:schemeClr>
-          </a:lnRef>
-          <a:fillRef idx="1">
-            <a:schemeClr val="accent1"/>
-          </a:fillRef>
-          <a:effectRef idx="0">
-            <a:schemeClr val="accent1"/>
-          </a:effectRef>
-          <a:fontRef idx="minor">
-            <a:schemeClr val="lt1"/>
-          </a:fontRef>
-        </p:style>
-        <p:txBody>
-          <a:bodyPr wrap="square" rtlCol="0" anchor="ctr">
-            <a:noAutofit/>
-          </a:bodyPr>
-          <a:lstStyle/>
-          <a:p>
-            <a:pPr algn="ctr"/>
-            <a:endParaRPr lang="en-US" dirty="0"/>
-          </a:p>
-        </p:txBody>
-      </p:sp>
-      <p:sp>
-        <p:nvSpPr>
-          <p:cNvPr id="37" name="Isosceles Triangle 36">
-            <a:extLst>
-              <a:ext uri="{FF2B5EF4-FFF2-40B4-BE49-F238E27FC236}">
-                <a16:creationId xmlns:a16="http://schemas.microsoft.com/office/drawing/2014/main" id="{A6C14D16-CF93-A95A-986D-92E1B9B065EF}"/>
-              </a:ext>
-              <a:ext uri="{C183D7F6-B498-43B3-948B-1728B52AA6E4}">
-                <adec:decorative xmlns:adec="http://schemas.microsoft.com/office/drawing/2017/decorative" val="1"/>
-              </a:ext>
-            </a:extLst>
-          </p:cNvPr>
-          <p:cNvSpPr>
-            <a:spLocks noGrp="1" noRot="1" noChangeAspect="1" noMove="1" noResize="1" noEditPoints="1" noAdjustHandles="1" noChangeArrowheads="1" noChangeShapeType="1" noTextEdit="1"/>
-          </p:cNvSpPr>
-          <p:nvPr>
-            <p:extLst>
-              <p:ext uri="{386F3935-93C4-4BCD-93E2-E3B085C9AB24}">
-                <p16:designElem xmlns:p16="http://schemas.microsoft.com/office/powerpoint/2015/main" val="1"/>
-              </p:ext>
-            </p:extLst>
-          </p:nvPr>
-        </p:nvSpPr>
-        <p:spPr>
-          <a:xfrm flipH="1">
-            <a:off x="6580483" y="6930901"/>
-            <a:ext cx="1232974" cy="841499"/>
-          </a:xfrm>
-          <a:prstGeom prst="triangle">
-            <a:avLst/>
-          </a:prstGeom>
-          <a:solidFill>
-            <a:schemeClr val="accent1">
-              <a:alpha val="30000"/>
-            </a:schemeClr>
-          </a:solidFill>
-          <a:ln>
-            <a:noFill/>
-          </a:ln>
-        </p:spPr>
-        <p:style>
-          <a:lnRef idx="2">
-            <a:schemeClr val="accent1">
-              <a:shade val="50000"/>
-            </a:schemeClr>
-          </a:lnRef>
-          <a:fillRef idx="1">
-            <a:schemeClr val="accent1"/>
-          </a:fillRef>
-          <a:effectRef idx="0">
-            <a:schemeClr val="accent1"/>
-          </a:effectRef>
-          <a:fontRef idx="minor">
-            <a:schemeClr val="lt1"/>
-          </a:fontRef>
-        </p:style>
-        <p:txBody>
-          <a:bodyPr rtlCol="0" anchor="ctr"/>
-          <a:lstStyle/>
-          <a:p>
-            <a:pPr algn="ctr"/>
-            <a:endParaRPr lang="en-US"/>
-          </a:p>
-        </p:txBody>
-      </p:sp>
-      <p:sp>
-        <p:nvSpPr>
-          <p:cNvPr id="39" name="Isosceles Triangle 38">
-            <a:extLst>
-              <a:ext uri="{FF2B5EF4-FFF2-40B4-BE49-F238E27FC236}">
-                <a16:creationId xmlns:a16="http://schemas.microsoft.com/office/drawing/2014/main" id="{752A1C17-3FE1-5971-3B19-C6A942101EFD}"/>
-              </a:ext>
-              <a:ext uri="{C183D7F6-B498-43B3-948B-1728B52AA6E4}">
-                <adec:decorative xmlns:adec="http://schemas.microsoft.com/office/drawing/2017/decorative" val="1"/>
-              </a:ext>
-            </a:extLst>
-          </p:cNvPr>
-          <p:cNvSpPr>
-            <a:spLocks noGrp="1" noRot="1" noChangeAspect="1" noMove="1" noResize="1" noEditPoints="1" noAdjustHandles="1" noChangeArrowheads="1" noChangeShapeType="1" noTextEdit="1"/>
-          </p:cNvSpPr>
-          <p:nvPr>
-            <p:extLst>
-              <p:ext uri="{386F3935-93C4-4BCD-93E2-E3B085C9AB24}">
-                <p16:designElem xmlns:p16="http://schemas.microsoft.com/office/powerpoint/2015/main" val="1"/>
-              </p:ext>
-            </p:extLst>
-          </p:nvPr>
-        </p:nvSpPr>
-        <p:spPr>
-          <a:xfrm flipH="1">
-            <a:off x="6273366" y="7313562"/>
-            <a:ext cx="672294" cy="458838"/>
-          </a:xfrm>
-          <a:prstGeom prst="triangle">
-            <a:avLst/>
-          </a:prstGeom>
-          <a:solidFill>
-            <a:schemeClr val="accent1">
-              <a:alpha val="30000"/>
-            </a:schemeClr>
-          </a:solidFill>
-          <a:ln>
-            <a:noFill/>
-          </a:ln>
-        </p:spPr>
-        <p:style>
-          <a:lnRef idx="2">
-            <a:schemeClr val="accent1">
-              <a:shade val="50000"/>
-            </a:schemeClr>
-          </a:lnRef>
-          <a:fillRef idx="1">
-            <a:schemeClr val="accent1"/>
-          </a:fillRef>
-          <a:effectRef idx="0">
-            <a:schemeClr val="accent1"/>
-          </a:effectRef>
-          <a:fontRef idx="minor">
-            <a:schemeClr val="lt1"/>
-          </a:fontRef>
-        </p:style>
-        <p:txBody>
-          <a:bodyPr rtlCol="0" anchor="ctr"/>
-          <a:lstStyle/>
-          <a:p>
-            <a:pPr algn="ctr"/>
-            <a:endParaRPr lang="en-US"/>
-          </a:p>
-        </p:txBody>
-      </p:sp>
-      <p:sp>
-        <p:nvSpPr>
-          <p:cNvPr id="3" name="Picture Placeholder 2">
-            <a:extLst>
-              <a:ext uri="{FF2B5EF4-FFF2-40B4-BE49-F238E27FC236}">
-                <a16:creationId xmlns:a16="http://schemas.microsoft.com/office/drawing/2014/main" id="{C6C5F52C-B3E8-F44E-AD27-F062435C97E1}"/>
-              </a:ext>
-            </a:extLst>
-          </p:cNvPr>
-          <p:cNvSpPr>
-            <a:spLocks noGrp="1"/>
-          </p:cNvSpPr>
-          <p:nvPr>
-            <p:ph type="pic" sz="quarter" idx="11"/>
-          </p:nvPr>
-        </p:nvSpPr>
-        <p:spPr/>
-        <p:txBody>
-          <a:bodyPr/>
-          <a:lstStyle/>
-          <a:p>
-            <a:endParaRPr lang="en-US"/>
-          </a:p>
-        </p:txBody>
-      </p:sp>
-      <p:sp>
-        <p:nvSpPr>
-          <p:cNvPr id="2" name="TextBox 1">
-            <a:extLst>
-              <a:ext uri="{FF2B5EF4-FFF2-40B4-BE49-F238E27FC236}">
-                <a16:creationId xmlns:a16="http://schemas.microsoft.com/office/drawing/2014/main" id="{5C6D6D19-40D6-AFA6-B06A-CC5797480E68}"/>
-              </a:ext>
-            </a:extLst>
-          </p:cNvPr>
-          <p:cNvSpPr txBox="1"/>
-          <p:nvPr/>
-        </p:nvSpPr>
-        <p:spPr>
-          <a:xfrm>
-            <a:off x="333506" y="800209"/>
-            <a:ext cx="9569239" cy="584775"/>
-          </a:xfrm>
-          <a:prstGeom prst="rect">
-            <a:avLst/>
-          </a:prstGeom>
-          <a:noFill/>
-        </p:spPr>
-        <p:txBody>
-          <a:bodyPr wrap="square" rtlCol="0">
-            <a:spAutoFit/>
-          </a:bodyPr>
-          <a:lstStyle/>
-          <a:p>
-            <a:pPr algn="ctr"/>
-            <a:r>
-              <a:rPr lang="en-GB" sz="3200" dirty="0"/>
-              <a:t>Decision Tree Model And Random Forest Model</a:t>
-            </a:r>
-          </a:p>
-        </p:txBody>
-      </p:sp>
       <p:pic>
         <p:nvPicPr>
-          <p:cNvPr id="4" name="Picture 3">
-            <a:extLst>
-              <a:ext uri="{FF2B5EF4-FFF2-40B4-BE49-F238E27FC236}">
-                <a16:creationId xmlns:a16="http://schemas.microsoft.com/office/drawing/2014/main" id="{9AD562D1-94B8-2D39-AD0A-6CDEC757A29A}"/>
+          <p:cNvPr id="2" name="Picture 1">
+            <a:extLst>
+              <a:ext uri="{FF2B5EF4-FFF2-40B4-BE49-F238E27FC236}">
+                <a16:creationId xmlns:a16="http://schemas.microsoft.com/office/drawing/2014/main" id="{58A5F330-39D2-3D35-DAA7-5FD67B112930}"/>
               </a:ext>
             </a:extLst>
           </p:cNvPr>
@@ -17738,8 +17234,68 @@
         </p:blipFill>
         <p:spPr>
           <a:xfrm>
-            <a:off x="733125" y="1618384"/>
-            <a:ext cx="4913965" cy="3329077"/>
+            <a:off x="529595" y="2608020"/>
+            <a:ext cx="4243818" cy="3123978"/>
+          </a:xfrm>
+          <a:prstGeom prst="rect">
+            <a:avLst/>
+          </a:prstGeom>
+        </p:spPr>
+      </p:pic>
+      <p:pic>
+        <p:nvPicPr>
+          <p:cNvPr id="4" name="Picture 3">
+            <a:extLst>
+              <a:ext uri="{FF2B5EF4-FFF2-40B4-BE49-F238E27FC236}">
+                <a16:creationId xmlns:a16="http://schemas.microsoft.com/office/drawing/2014/main" id="{EB711DD9-C270-7C5F-8751-62C8576EE663}"/>
+              </a:ext>
+            </a:extLst>
+          </p:cNvPr>
+          <p:cNvPicPr>
+            <a:picLocks noChangeAspect="1"/>
+          </p:cNvPicPr>
+          <p:nvPr/>
+        </p:nvPicPr>
+        <p:blipFill>
+          <a:blip r:embed="rId4"/>
+          <a:stretch>
+            <a:fillRect/>
+          </a:stretch>
+        </p:blipFill>
+        <p:spPr>
+          <a:xfrm>
+            <a:off x="7564582" y="4367481"/>
+            <a:ext cx="1862091" cy="2167686"/>
+          </a:xfrm>
+          <a:prstGeom prst="rect">
+            <a:avLst/>
+          </a:prstGeom>
+        </p:spPr>
+      </p:pic>
+      <p:pic>
+        <p:nvPicPr>
+          <p:cNvPr id="5" name="Picture 4">
+            <a:extLst>
+              <a:ext uri="{FF2B5EF4-FFF2-40B4-BE49-F238E27FC236}">
+                <a16:creationId xmlns:a16="http://schemas.microsoft.com/office/drawing/2014/main" id="{04ED5590-897C-F7CE-3F65-2AD8DCB4654A}"/>
+              </a:ext>
+            </a:extLst>
+          </p:cNvPr>
+          <p:cNvPicPr>
+            <a:picLocks noChangeAspect="1"/>
+          </p:cNvPicPr>
+          <p:nvPr/>
+        </p:nvPicPr>
+        <p:blipFill>
+          <a:blip r:embed="rId5"/>
+          <a:stretch>
+            <a:fillRect/>
+          </a:stretch>
+        </p:blipFill>
+        <p:spPr>
+          <a:xfrm>
+            <a:off x="7564582" y="1705602"/>
+            <a:ext cx="1786525" cy="2241505"/>
           </a:xfrm>
           <a:prstGeom prst="rect">
             <a:avLst/>
@@ -17748,10 +17304,10 @@
       </p:pic>
       <p:sp>
         <p:nvSpPr>
-          <p:cNvPr id="6" name="Arrow: Right 5">
-            <a:extLst>
-              <a:ext uri="{FF2B5EF4-FFF2-40B4-BE49-F238E27FC236}">
-                <a16:creationId xmlns:a16="http://schemas.microsoft.com/office/drawing/2014/main" id="{F9B0E4F8-7F82-0561-FAC8-B6A07A97764E}"/>
+          <p:cNvPr id="7" name="Arrow: Right 20">
+            <a:extLst>
+              <a:ext uri="{FF2B5EF4-FFF2-40B4-BE49-F238E27FC236}">
+                <a16:creationId xmlns:a16="http://schemas.microsoft.com/office/drawing/2014/main" id="{ED145A00-D596-CDF3-4477-97DB04DA0FC2}"/>
               </a:ext>
             </a:extLst>
           </p:cNvPr>
@@ -17760,8 +17316,8 @@
         </p:nvSpPr>
         <p:spPr>
           <a:xfrm>
-            <a:off x="5734214" y="2733643"/>
-            <a:ext cx="930935" cy="149324"/>
+            <a:off x="5650591" y="4949906"/>
+            <a:ext cx="1238783" cy="338406"/>
           </a:xfrm>
           <a:prstGeom prst="rightArrow">
             <a:avLst/>
@@ -17792,118 +17348,12 @@
           </a:p>
         </p:txBody>
       </p:sp>
-      <p:pic>
-        <p:nvPicPr>
-          <p:cNvPr id="7" name="Picture 6">
-            <a:extLst>
-              <a:ext uri="{FF2B5EF4-FFF2-40B4-BE49-F238E27FC236}">
-                <a16:creationId xmlns:a16="http://schemas.microsoft.com/office/drawing/2014/main" id="{DAC8BDED-72F8-13D0-8E49-E06BBA25C9DD}"/>
-              </a:ext>
-            </a:extLst>
-          </p:cNvPr>
-          <p:cNvPicPr>
-            <a:picLocks noChangeAspect="1"/>
-          </p:cNvPicPr>
-          <p:nvPr/>
-        </p:nvPicPr>
-        <p:blipFill>
-          <a:blip r:embed="rId4"/>
-          <a:stretch>
-            <a:fillRect/>
-          </a:stretch>
-        </p:blipFill>
-        <p:spPr>
-          <a:xfrm>
-            <a:off x="6737438" y="1475997"/>
-            <a:ext cx="2212272" cy="1981486"/>
-          </a:xfrm>
-          <a:prstGeom prst="rect">
-            <a:avLst/>
-          </a:prstGeom>
-        </p:spPr>
-      </p:pic>
-      <p:pic>
-        <p:nvPicPr>
-          <p:cNvPr id="8" name="Picture 7">
-            <a:extLst>
-              <a:ext uri="{FF2B5EF4-FFF2-40B4-BE49-F238E27FC236}">
-                <a16:creationId xmlns:a16="http://schemas.microsoft.com/office/drawing/2014/main" id="{E99A1F55-C470-D2D8-969B-7158BE808805}"/>
-              </a:ext>
-            </a:extLst>
-          </p:cNvPr>
-          <p:cNvPicPr>
-            <a:picLocks noChangeAspect="1"/>
-          </p:cNvPicPr>
-          <p:nvPr/>
-        </p:nvPicPr>
-        <p:blipFill>
-          <a:blip r:embed="rId5"/>
-          <a:stretch>
-            <a:fillRect/>
-          </a:stretch>
-        </p:blipFill>
-        <p:spPr>
-          <a:xfrm>
-            <a:off x="6923718" y="3454452"/>
-            <a:ext cx="2047996" cy="1965967"/>
-          </a:xfrm>
-          <a:prstGeom prst="rect">
-            <a:avLst/>
-          </a:prstGeom>
-        </p:spPr>
-      </p:pic>
-      <p:sp>
-        <p:nvSpPr>
-          <p:cNvPr id="9" name="Arrow: Right 10">
-            <a:extLst>
-              <a:ext uri="{FF2B5EF4-FFF2-40B4-BE49-F238E27FC236}">
-                <a16:creationId xmlns:a16="http://schemas.microsoft.com/office/drawing/2014/main" id="{F5905672-9F34-93EA-CF1A-8E933E0B9490}"/>
-              </a:ext>
-            </a:extLst>
-          </p:cNvPr>
-          <p:cNvSpPr/>
-          <p:nvPr/>
-        </p:nvSpPr>
-        <p:spPr>
-          <a:xfrm>
-            <a:off x="5798855" y="3724781"/>
-            <a:ext cx="930935" cy="149324"/>
-          </a:xfrm>
-          <a:prstGeom prst="rightArrow">
-            <a:avLst/>
-          </a:prstGeom>
-        </p:spPr>
-        <p:style>
-          <a:lnRef idx="2">
-            <a:schemeClr val="accent1">
-              <a:shade val="15000"/>
-            </a:schemeClr>
-          </a:lnRef>
-          <a:fillRef idx="1">
-            <a:schemeClr val="accent1"/>
-          </a:fillRef>
-          <a:effectRef idx="0">
-            <a:schemeClr val="accent1"/>
-          </a:effectRef>
-          <a:fontRef idx="minor">
-            <a:schemeClr val="lt1"/>
-          </a:fontRef>
-        </p:style>
-        <p:txBody>
-          <a:bodyPr rtlCol="0" anchor="ctr"/>
-          <a:lstStyle/>
-          <a:p>
-            <a:pPr algn="ctr"/>
-            <a:endParaRPr lang="en-GB"/>
-          </a:p>
-        </p:txBody>
-      </p:sp>
       <p:sp>
         <p:nvSpPr>
           <p:cNvPr id="10" name="TextBox 9">
             <a:extLst>
               <a:ext uri="{FF2B5EF4-FFF2-40B4-BE49-F238E27FC236}">
-                <a16:creationId xmlns:a16="http://schemas.microsoft.com/office/drawing/2014/main" id="{6B0162B6-1551-B150-781C-8B2AFDB1537D}"/>
+                <a16:creationId xmlns:a16="http://schemas.microsoft.com/office/drawing/2014/main" id="{47A9BE98-C96E-3B41-928A-CE985A8C8E3E}"/>
               </a:ext>
             </a:extLst>
           </p:cNvPr>
@@ -17912,8 +17362,8 @@
         </p:nvSpPr>
         <p:spPr>
           <a:xfrm>
-            <a:off x="147710" y="5456100"/>
-            <a:ext cx="9755035" cy="923330"/>
+            <a:off x="567790" y="6051002"/>
+            <a:ext cx="6083577" cy="1292662"/>
           </a:xfrm>
           <a:prstGeom prst="rect">
             <a:avLst/>
@@ -17926,52 +17376,19 @@
           </a:bodyPr>
           <a:lstStyle/>
           <a:p>
-            <a:pPr marL="285750" indent="-285750">
-              <a:buFont typeface="Arial" panose="020B0604020202020204" pitchFamily="34" charset="0"/>
-              <a:buChar char="•"/>
-            </a:pPr>
+            <a:r>
+              <a:rPr lang="en-GB" sz="1400" b="1" dirty="0"/>
+              <a:t>KNN Model(Smote), </a:t>
+            </a:r>
+            <a:r>
+              <a:rPr lang="en-GB" sz="1400" dirty="0"/>
+              <a:t>with  30 people who actually have Stroke, model  is predicting them as they don’t have stroke while 228 are those who actually do not have stroke and model is predicting them as they have stroke. </a:t>
+            </a:r>
+          </a:p>
+          <a:p>
             <a:r>
               <a:rPr lang="en-GB" dirty="0"/>
-              <a:t>In Decision Tree Model 52 people who actually have Stroke, model  is predicting them as they don’t have stroke while 67 are those who actually do not have stroke and model is predicting them as they have stroke.</a:t>
-            </a:r>
-          </a:p>
-        </p:txBody>
-      </p:sp>
-      <p:sp>
-        <p:nvSpPr>
-          <p:cNvPr id="11" name="TextBox 10">
-            <a:extLst>
-              <a:ext uri="{FF2B5EF4-FFF2-40B4-BE49-F238E27FC236}">
-                <a16:creationId xmlns:a16="http://schemas.microsoft.com/office/drawing/2014/main" id="{81282414-83C4-FDFB-E63C-2C3D854D911A}"/>
-              </a:ext>
-            </a:extLst>
-          </p:cNvPr>
-          <p:cNvSpPr txBox="1"/>
-          <p:nvPr/>
-        </p:nvSpPr>
-        <p:spPr>
-          <a:xfrm>
-            <a:off x="122957" y="6338671"/>
-            <a:ext cx="9755035" cy="1200329"/>
-          </a:xfrm>
-          <a:prstGeom prst="rect">
-            <a:avLst/>
-          </a:prstGeom>
-          <a:noFill/>
-        </p:spPr>
-        <p:txBody>
-          <a:bodyPr wrap="square" rtlCol="0">
-            <a:spAutoFit/>
-          </a:bodyPr>
-          <a:lstStyle/>
-          <a:p>
-            <a:pPr marL="285750" indent="-285750">
-              <a:buFont typeface="Arial" panose="020B0604020202020204" pitchFamily="34" charset="0"/>
-              <a:buChar char="•"/>
-            </a:pPr>
-            <a:r>
-              <a:rPr lang="en-GB" dirty="0"/>
-              <a:t>In Random Forest Model 59 people who actually have Stroke, model  is predicting them as they don’t have stroke while 13 are those who actually do not have stroke and model is predicting them as they have stroke.</a:t>
+              <a:t>Logistic Regression Model (Oversampled): FN is 16 ,FP is 309</a:t>
             </a:r>
           </a:p>
           <a:p>
@@ -17982,7 +17399,7 @@
     </p:spTree>
     <p:extLst>
       <p:ext uri="{BB962C8B-B14F-4D97-AF65-F5344CB8AC3E}">
-        <p14:creationId xmlns:p14="http://schemas.microsoft.com/office/powerpoint/2010/main" val="3151952891"/>
+        <p14:creationId xmlns:p14="http://schemas.microsoft.com/office/powerpoint/2010/main" val="2888708004"/>
       </p:ext>
     </p:extLst>
   </p:cSld>
@@ -17992,7 +17409,7 @@
 </p:sld>
 </file>
 
-<file path=ppt/slides/slide19.xml><?xml version="1.0" encoding="utf-8"?>
+<file path=ppt/slides/slide18.xml><?xml version="1.0" encoding="utf-8"?>
 <p:sld xmlns:a="http://schemas.openxmlformats.org/drawingml/2006/main" xmlns:r="http://schemas.openxmlformats.org/officeDocument/2006/relationships" xmlns:p="http://schemas.openxmlformats.org/presentationml/2006/main">
   <p:cSld>
     <p:bg>
@@ -18494,66 +17911,6 @@
           </a:p>
         </p:txBody>
       </p:sp>
-      <p:pic>
-        <p:nvPicPr>
-          <p:cNvPr id="16" name="Picture 15">
-            <a:extLst>
-              <a:ext uri="{FF2B5EF4-FFF2-40B4-BE49-F238E27FC236}">
-                <a16:creationId xmlns:a16="http://schemas.microsoft.com/office/drawing/2014/main" id="{41A21678-87BA-5B8C-8D23-B8B711E81B73}"/>
-              </a:ext>
-            </a:extLst>
-          </p:cNvPr>
-          <p:cNvPicPr>
-            <a:picLocks noChangeAspect="1"/>
-          </p:cNvPicPr>
-          <p:nvPr/>
-        </p:nvPicPr>
-        <p:blipFill>
-          <a:blip r:embed="rId3"/>
-          <a:stretch>
-            <a:fillRect/>
-          </a:stretch>
-        </p:blipFill>
-        <p:spPr>
-          <a:xfrm>
-            <a:off x="308753" y="2271842"/>
-            <a:ext cx="5545544" cy="1929670"/>
-          </a:xfrm>
-          <a:prstGeom prst="rect">
-            <a:avLst/>
-          </a:prstGeom>
-        </p:spPr>
-      </p:pic>
-      <p:pic>
-        <p:nvPicPr>
-          <p:cNvPr id="17" name="Picture 16">
-            <a:extLst>
-              <a:ext uri="{FF2B5EF4-FFF2-40B4-BE49-F238E27FC236}">
-                <a16:creationId xmlns:a16="http://schemas.microsoft.com/office/drawing/2014/main" id="{1DB68035-A77C-F69E-C40C-BCA8299775E5}"/>
-              </a:ext>
-            </a:extLst>
-          </p:cNvPr>
-          <p:cNvPicPr>
-            <a:picLocks noChangeAspect="1"/>
-          </p:cNvPicPr>
-          <p:nvPr/>
-        </p:nvPicPr>
-        <p:blipFill>
-          <a:blip r:embed="rId4"/>
-          <a:stretch>
-            <a:fillRect/>
-          </a:stretch>
-        </p:blipFill>
-        <p:spPr>
-          <a:xfrm>
-            <a:off x="7496139" y="2319902"/>
-            <a:ext cx="2113829" cy="2082189"/>
-          </a:xfrm>
-          <a:prstGeom prst="rect">
-            <a:avLst/>
-          </a:prstGeom>
-        </p:spPr>
-      </p:pic>
       <p:sp>
         <p:nvSpPr>
           <p:cNvPr id="18" name="Arrow: Right 20">
@@ -18568,7 +17925,7 @@
         </p:nvSpPr>
         <p:spPr>
           <a:xfrm>
-            <a:off x="6081249" y="3161215"/>
+            <a:off x="5864682" y="3522160"/>
             <a:ext cx="1238783" cy="338406"/>
           </a:xfrm>
           <a:prstGeom prst="rightArrow">
@@ -18602,10 +17959,10 @@
       </p:sp>
       <p:sp>
         <p:nvSpPr>
-          <p:cNvPr id="19" name="TextBox 18">
-            <a:extLst>
-              <a:ext uri="{FF2B5EF4-FFF2-40B4-BE49-F238E27FC236}">
-                <a16:creationId xmlns:a16="http://schemas.microsoft.com/office/drawing/2014/main" id="{CED22466-95B4-A975-053C-E5CAD3B7C2EE}"/>
+          <p:cNvPr id="2" name="TextBox 1">
+            <a:extLst>
+              <a:ext uri="{FF2B5EF4-FFF2-40B4-BE49-F238E27FC236}">
+                <a16:creationId xmlns:a16="http://schemas.microsoft.com/office/drawing/2014/main" id="{CC1D5DB6-9EDE-F3E8-F893-0FAEF03EE8F4}"/>
               </a:ext>
             </a:extLst>
           </p:cNvPr>
@@ -18614,8 +17971,8 @@
         </p:nvSpPr>
         <p:spPr>
           <a:xfrm>
-            <a:off x="2041394" y="4947075"/>
-            <a:ext cx="5754311" cy="923330"/>
+            <a:off x="1957899" y="5608161"/>
+            <a:ext cx="6705600" cy="923330"/>
           </a:xfrm>
           <a:prstGeom prst="rect">
             <a:avLst/>
@@ -18629,12 +17986,76 @@
           <a:lstStyle/>
           <a:p>
             <a:r>
+              <a:rPr lang="en-GB" b="1" dirty="0"/>
+              <a:t>SVM with Oversampled Data </a:t>
+            </a:r>
+            <a:r>
               <a:rPr lang="en-GB" dirty="0"/>
-              <a:t>SVM with Oversampled Data shows some promising results with a recall for Stroke1 81% and with 12 FN. Though the number of FP is quite High.  </a:t>
+              <a:t>shows some promising results with a recall for Stroke1 77% and with 14 FN. Though the number of FP is High.  </a:t>
             </a:r>
           </a:p>
         </p:txBody>
       </p:sp>
+      <p:pic>
+        <p:nvPicPr>
+          <p:cNvPr id="4" name="Picture 3">
+            <a:extLst>
+              <a:ext uri="{FF2B5EF4-FFF2-40B4-BE49-F238E27FC236}">
+                <a16:creationId xmlns:a16="http://schemas.microsoft.com/office/drawing/2014/main" id="{6E3FB56E-170C-F886-5758-E3F33C2D73A1}"/>
+              </a:ext>
+            </a:extLst>
+          </p:cNvPr>
+          <p:cNvPicPr>
+            <a:picLocks noChangeAspect="1"/>
+          </p:cNvPicPr>
+          <p:nvPr/>
+        </p:nvPicPr>
+        <p:blipFill>
+          <a:blip r:embed="rId3"/>
+          <a:stretch>
+            <a:fillRect/>
+          </a:stretch>
+        </p:blipFill>
+        <p:spPr>
+          <a:xfrm>
+            <a:off x="308753" y="2632328"/>
+            <a:ext cx="5029199" cy="1842222"/>
+          </a:xfrm>
+          <a:prstGeom prst="rect">
+            <a:avLst/>
+          </a:prstGeom>
+        </p:spPr>
+      </p:pic>
+      <p:pic>
+        <p:nvPicPr>
+          <p:cNvPr id="5" name="Picture 4">
+            <a:extLst>
+              <a:ext uri="{FF2B5EF4-FFF2-40B4-BE49-F238E27FC236}">
+                <a16:creationId xmlns:a16="http://schemas.microsoft.com/office/drawing/2014/main" id="{77C6D20E-DB41-EA7B-8F85-119C52A19290}"/>
+              </a:ext>
+            </a:extLst>
+          </p:cNvPr>
+          <p:cNvPicPr>
+            <a:picLocks noChangeAspect="1"/>
+          </p:cNvPicPr>
+          <p:nvPr/>
+        </p:nvPicPr>
+        <p:blipFill>
+          <a:blip r:embed="rId4"/>
+          <a:stretch>
+            <a:fillRect/>
+          </a:stretch>
+        </p:blipFill>
+        <p:spPr>
+          <a:xfrm>
+            <a:off x="7333382" y="2242252"/>
+            <a:ext cx="2325382" cy="2857506"/>
+          </a:xfrm>
+          <a:prstGeom prst="rect">
+            <a:avLst/>
+          </a:prstGeom>
+        </p:spPr>
+      </p:pic>
     </p:spTree>
     <p:extLst>
       <p:ext uri="{BB962C8B-B14F-4D97-AF65-F5344CB8AC3E}">
@@ -18648,721 +18069,7 @@
 </p:sld>
 </file>
 
-<file path=ppt/slides/slide2.xml><?xml version="1.0" encoding="utf-8"?>
-<p:sld xmlns:a="http://schemas.openxmlformats.org/drawingml/2006/main" xmlns:r="http://schemas.openxmlformats.org/officeDocument/2006/relationships" xmlns:p="http://schemas.openxmlformats.org/presentationml/2006/main">
-  <p:cSld>
-    <p:bg>
-      <p:bgPr>
-        <a:solidFill>
-          <a:schemeClr val="bg1"/>
-        </a:solidFill>
-        <a:effectLst/>
-      </p:bgPr>
-    </p:bg>
-    <p:spTree>
-      <p:nvGrpSpPr>
-        <p:cNvPr id="1" name="">
-          <a:extLst>
-            <a:ext uri="{FF2B5EF4-FFF2-40B4-BE49-F238E27FC236}">
-              <a16:creationId xmlns:a16="http://schemas.microsoft.com/office/drawing/2014/main" id="{02984243-06AA-7503-EAE6-C43F12132B68}"/>
-            </a:ext>
-          </a:extLst>
-        </p:cNvPr>
-        <p:cNvGrpSpPr/>
-        <p:nvPr/>
-      </p:nvGrpSpPr>
-      <p:grpSpPr>
-        <a:xfrm>
-          <a:off x="0" y="0"/>
-          <a:ext cx="0" cy="0"/>
-          <a:chOff x="0" y="0"/>
-          <a:chExt cx="0" cy="0"/>
-        </a:xfrm>
-      </p:grpSpPr>
-      <p:sp>
-        <p:nvSpPr>
-          <p:cNvPr id="27" name="Rectangle 26">
-            <a:extLst>
-              <a:ext uri="{FF2B5EF4-FFF2-40B4-BE49-F238E27FC236}">
-                <a16:creationId xmlns:a16="http://schemas.microsoft.com/office/drawing/2014/main" id="{73CDEEF2-1AB3-80D1-CDA4-608C51A8E1C7}"/>
-              </a:ext>
-              <a:ext uri="{C183D7F6-B498-43B3-948B-1728B52AA6E4}">
-                <adec:decorative xmlns:adec="http://schemas.microsoft.com/office/drawing/2017/decorative" val="1"/>
-              </a:ext>
-            </a:extLst>
-          </p:cNvPr>
-          <p:cNvSpPr>
-            <a:spLocks noGrp="1" noRot="1" noChangeAspect="1" noMove="1" noResize="1" noEditPoints="1" noAdjustHandles="1" noChangeArrowheads="1" noChangeShapeType="1" noTextEdit="1"/>
-          </p:cNvSpPr>
-          <p:nvPr>
-            <p:extLst>
-              <p:ext uri="{386F3935-93C4-4BCD-93E2-E3B085C9AB24}">
-                <p16:designElem xmlns:p16="http://schemas.microsoft.com/office/powerpoint/2015/main" val="1"/>
-              </p:ext>
-            </p:extLst>
-          </p:nvPr>
-        </p:nvSpPr>
-        <p:spPr>
-          <a:xfrm>
-            <a:off x="0" y="0"/>
-            <a:ext cx="10058400" cy="7772400"/>
-          </a:xfrm>
-          <a:prstGeom prst="rect">
-            <a:avLst/>
-          </a:prstGeom>
-          <a:solidFill>
-            <a:schemeClr val="bg1"/>
-          </a:solidFill>
-          <a:ln>
-            <a:noFill/>
-          </a:ln>
-        </p:spPr>
-        <p:style>
-          <a:lnRef idx="2">
-            <a:schemeClr val="accent1">
-              <a:shade val="50000"/>
-            </a:schemeClr>
-          </a:lnRef>
-          <a:fillRef idx="1">
-            <a:schemeClr val="accent1"/>
-          </a:fillRef>
-          <a:effectRef idx="0">
-            <a:schemeClr val="accent1"/>
-          </a:effectRef>
-          <a:fontRef idx="minor">
-            <a:schemeClr val="lt1"/>
-          </a:fontRef>
-        </p:style>
-        <p:txBody>
-          <a:bodyPr rtlCol="0" anchor="ctr"/>
-          <a:lstStyle/>
-          <a:p>
-            <a:pPr algn="ctr"/>
-            <a:endParaRPr lang="en-US" dirty="0"/>
-          </a:p>
-        </p:txBody>
-      </p:sp>
-      <p:sp>
-        <p:nvSpPr>
-          <p:cNvPr id="29" name="Freeform: Shape 28">
-            <a:extLst>
-              <a:ext uri="{FF2B5EF4-FFF2-40B4-BE49-F238E27FC236}">
-                <a16:creationId xmlns:a16="http://schemas.microsoft.com/office/drawing/2014/main" id="{7C7D98AB-74B6-9E79-6551-31459B530EA0}"/>
-              </a:ext>
-              <a:ext uri="{C183D7F6-B498-43B3-948B-1728B52AA6E4}">
-                <adec:decorative xmlns:adec="http://schemas.microsoft.com/office/drawing/2017/decorative" val="1"/>
-              </a:ext>
-            </a:extLst>
-          </p:cNvPr>
-          <p:cNvSpPr>
-            <a:spLocks noGrp="1" noRot="1" noChangeAspect="1" noMove="1" noResize="1" noEditPoints="1" noAdjustHandles="1" noChangeArrowheads="1" noChangeShapeType="1" noTextEdit="1"/>
-          </p:cNvSpPr>
-          <p:nvPr>
-            <p:extLst>
-              <p:ext uri="{386F3935-93C4-4BCD-93E2-E3B085C9AB24}">
-                <p16:designElem xmlns:p16="http://schemas.microsoft.com/office/powerpoint/2015/main" val="1"/>
-              </p:ext>
-            </p:extLst>
-          </p:nvPr>
-        </p:nvSpPr>
-        <p:spPr>
-          <a:xfrm rot="18900000" flipH="1">
-            <a:off x="-310328" y="-287492"/>
-            <a:ext cx="1507800" cy="1560586"/>
-          </a:xfrm>
-          <a:custGeom>
-            <a:avLst/>
-            <a:gdLst>
-              <a:gd name="connsiteX0" fmla="*/ 0 w 1827638"/>
-              <a:gd name="connsiteY0" fmla="*/ 987379 h 1376989"/>
-              <a:gd name="connsiteX1" fmla="*/ 987379 w 1827638"/>
-              <a:gd name="connsiteY1" fmla="*/ 0 h 1376989"/>
-              <a:gd name="connsiteX2" fmla="*/ 1827638 w 1827638"/>
-              <a:gd name="connsiteY2" fmla="*/ 840260 h 1376989"/>
-              <a:gd name="connsiteX3" fmla="*/ 1827638 w 1827638"/>
-              <a:gd name="connsiteY3" fmla="*/ 1376989 h 1376989"/>
-              <a:gd name="connsiteX4" fmla="*/ 0 w 1827638"/>
-              <a:gd name="connsiteY4" fmla="*/ 1376989 h 1376989"/>
-            </a:gdLst>
-            <a:ahLst/>
-            <a:cxnLst>
-              <a:cxn ang="0">
-                <a:pos x="connsiteX0" y="connsiteY0"/>
-              </a:cxn>
-              <a:cxn ang="0">
-                <a:pos x="connsiteX1" y="connsiteY1"/>
-              </a:cxn>
-              <a:cxn ang="0">
-                <a:pos x="connsiteX2" y="connsiteY2"/>
-              </a:cxn>
-              <a:cxn ang="0">
-                <a:pos x="connsiteX3" y="connsiteY3"/>
-              </a:cxn>
-              <a:cxn ang="0">
-                <a:pos x="connsiteX4" y="connsiteY4"/>
-              </a:cxn>
-            </a:cxnLst>
-            <a:rect l="l" t="t" r="r" b="b"/>
-            <a:pathLst>
-              <a:path w="1827638" h="1376989">
-                <a:moveTo>
-                  <a:pt x="0" y="987379"/>
-                </a:moveTo>
-                <a:lnTo>
-                  <a:pt x="987379" y="0"/>
-                </a:lnTo>
-                <a:lnTo>
-                  <a:pt x="1827638" y="840260"/>
-                </a:lnTo>
-                <a:lnTo>
-                  <a:pt x="1827638" y="1376989"/>
-                </a:lnTo>
-                <a:lnTo>
-                  <a:pt x="0" y="1376989"/>
-                </a:lnTo>
-                <a:close/>
-              </a:path>
-            </a:pathLst>
-          </a:custGeom>
-          <a:solidFill>
-            <a:schemeClr val="accent1">
-              <a:alpha val="30000"/>
-            </a:schemeClr>
-          </a:solidFill>
-          <a:ln>
-            <a:noFill/>
-          </a:ln>
-        </p:spPr>
-        <p:style>
-          <a:lnRef idx="2">
-            <a:schemeClr val="accent1">
-              <a:shade val="50000"/>
-            </a:schemeClr>
-          </a:lnRef>
-          <a:fillRef idx="1">
-            <a:schemeClr val="accent1"/>
-          </a:fillRef>
-          <a:effectRef idx="0">
-            <a:schemeClr val="accent1"/>
-          </a:effectRef>
-          <a:fontRef idx="minor">
-            <a:schemeClr val="lt1"/>
-          </a:fontRef>
-        </p:style>
-        <p:txBody>
-          <a:bodyPr rtlCol="0" anchor="ctr"/>
-          <a:lstStyle/>
-          <a:p>
-            <a:pPr algn="ctr"/>
-            <a:endParaRPr lang="en-US" dirty="0"/>
-          </a:p>
-        </p:txBody>
-      </p:sp>
-      <p:sp>
-        <p:nvSpPr>
-          <p:cNvPr id="31" name="Rectangle 30">
-            <a:extLst>
-              <a:ext uri="{FF2B5EF4-FFF2-40B4-BE49-F238E27FC236}">
-                <a16:creationId xmlns:a16="http://schemas.microsoft.com/office/drawing/2014/main" id="{E02A97E4-FFF3-59F6-2E50-A49A1B875210}"/>
-              </a:ext>
-              <a:ext uri="{C183D7F6-B498-43B3-948B-1728B52AA6E4}">
-                <adec:decorative xmlns:adec="http://schemas.microsoft.com/office/drawing/2017/decorative" val="1"/>
-              </a:ext>
-            </a:extLst>
-          </p:cNvPr>
-          <p:cNvSpPr>
-            <a:spLocks noGrp="1" noRot="1" noChangeAspect="1" noMove="1" noResize="1" noEditPoints="1" noAdjustHandles="1" noChangeArrowheads="1" noChangeShapeType="1" noTextEdit="1"/>
-          </p:cNvSpPr>
-          <p:nvPr>
-            <p:extLst>
-              <p:ext uri="{386F3935-93C4-4BCD-93E2-E3B085C9AB24}">
-                <p16:designElem xmlns:p16="http://schemas.microsoft.com/office/powerpoint/2015/main" val="1"/>
-              </p:ext>
-            </p:extLst>
-          </p:nvPr>
-        </p:nvSpPr>
-        <p:spPr>
-          <a:xfrm rot="18900000" flipH="1">
-            <a:off x="735603" y="478432"/>
-            <a:ext cx="532429" cy="731417"/>
-          </a:xfrm>
-          <a:prstGeom prst="rect">
-            <a:avLst/>
-          </a:prstGeom>
-          <a:solidFill>
-            <a:schemeClr val="accent1">
-              <a:alpha val="30000"/>
-            </a:schemeClr>
-          </a:solidFill>
-          <a:ln>
-            <a:noFill/>
-          </a:ln>
-        </p:spPr>
-        <p:style>
-          <a:lnRef idx="2">
-            <a:schemeClr val="accent1">
-              <a:shade val="50000"/>
-            </a:schemeClr>
-          </a:lnRef>
-          <a:fillRef idx="1">
-            <a:schemeClr val="accent1"/>
-          </a:fillRef>
-          <a:effectRef idx="0">
-            <a:schemeClr val="accent1"/>
-          </a:effectRef>
-          <a:fontRef idx="minor">
-            <a:schemeClr val="lt1"/>
-          </a:fontRef>
-        </p:style>
-        <p:txBody>
-          <a:bodyPr rtlCol="0" anchor="ctr"/>
-          <a:lstStyle/>
-          <a:p>
-            <a:pPr algn="ctr"/>
-            <a:endParaRPr lang="en-US"/>
-          </a:p>
-        </p:txBody>
-      </p:sp>
-      <p:sp>
-        <p:nvSpPr>
-          <p:cNvPr id="33" name="Rectangle 32">
-            <a:extLst>
-              <a:ext uri="{FF2B5EF4-FFF2-40B4-BE49-F238E27FC236}">
-                <a16:creationId xmlns:a16="http://schemas.microsoft.com/office/drawing/2014/main" id="{7D5189F2-CEF8-E33C-1F6D-25FADC8721D8}"/>
-              </a:ext>
-              <a:ext uri="{C183D7F6-B498-43B3-948B-1728B52AA6E4}">
-                <adec:decorative xmlns:adec="http://schemas.microsoft.com/office/drawing/2017/decorative" val="1"/>
-              </a:ext>
-            </a:extLst>
-          </p:cNvPr>
-          <p:cNvSpPr>
-            <a:spLocks noGrp="1" noRot="1" noChangeAspect="1" noMove="1" noResize="1" noEditPoints="1" noAdjustHandles="1" noChangeArrowheads="1" noChangeShapeType="1" noTextEdit="1"/>
-          </p:cNvSpPr>
-          <p:nvPr>
-            <p:extLst>
-              <p:ext uri="{386F3935-93C4-4BCD-93E2-E3B085C9AB24}">
-                <p16:designElem xmlns:p16="http://schemas.microsoft.com/office/powerpoint/2015/main" val="1"/>
-              </p:ext>
-            </p:extLst>
-          </p:nvPr>
-        </p:nvSpPr>
-        <p:spPr>
-          <a:xfrm rot="18900000" flipH="1">
-            <a:off x="8285872" y="742492"/>
-            <a:ext cx="567165" cy="779134"/>
-          </a:xfrm>
-          <a:prstGeom prst="rect">
-            <a:avLst/>
-          </a:prstGeom>
-          <a:solidFill>
-            <a:schemeClr val="accent4">
-              <a:alpha val="30000"/>
-            </a:schemeClr>
-          </a:solidFill>
-          <a:ln>
-            <a:noFill/>
-          </a:ln>
-        </p:spPr>
-        <p:style>
-          <a:lnRef idx="2">
-            <a:schemeClr val="accent1">
-              <a:shade val="50000"/>
-            </a:schemeClr>
-          </a:lnRef>
-          <a:fillRef idx="1">
-            <a:schemeClr val="accent1"/>
-          </a:fillRef>
-          <a:effectRef idx="0">
-            <a:schemeClr val="accent1"/>
-          </a:effectRef>
-          <a:fontRef idx="minor">
-            <a:schemeClr val="lt1"/>
-          </a:fontRef>
-        </p:style>
-        <p:txBody>
-          <a:bodyPr rtlCol="0" anchor="ctr"/>
-          <a:lstStyle/>
-          <a:p>
-            <a:pPr algn="ctr"/>
-            <a:endParaRPr lang="en-US"/>
-          </a:p>
-        </p:txBody>
-      </p:sp>
-      <p:sp>
-        <p:nvSpPr>
-          <p:cNvPr id="35" name="Freeform: Shape 34">
-            <a:extLst>
-              <a:ext uri="{FF2B5EF4-FFF2-40B4-BE49-F238E27FC236}">
-                <a16:creationId xmlns:a16="http://schemas.microsoft.com/office/drawing/2014/main" id="{88944EF9-2B55-2555-0F0D-1F9070FAB8F6}"/>
-              </a:ext>
-              <a:ext uri="{C183D7F6-B498-43B3-948B-1728B52AA6E4}">
-                <adec:decorative xmlns:adec="http://schemas.microsoft.com/office/drawing/2017/decorative" val="1"/>
-              </a:ext>
-            </a:extLst>
-          </p:cNvPr>
-          <p:cNvSpPr>
-            <a:spLocks noGrp="1" noRot="1" noChangeAspect="1" noMove="1" noResize="1" noEditPoints="1" noAdjustHandles="1" noChangeArrowheads="1" noChangeShapeType="1" noTextEdit="1"/>
-          </p:cNvSpPr>
-          <p:nvPr>
-            <p:extLst>
-              <p:ext uri="{386F3935-93C4-4BCD-93E2-E3B085C9AB24}">
-                <p16:designElem xmlns:p16="http://schemas.microsoft.com/office/powerpoint/2015/main" val="1"/>
-              </p:ext>
-            </p:extLst>
-          </p:nvPr>
-        </p:nvSpPr>
-        <p:spPr>
-          <a:xfrm rot="10800000" flipH="1">
-            <a:off x="7719230" y="0"/>
-            <a:ext cx="2339170" cy="1678281"/>
-          </a:xfrm>
-          <a:custGeom>
-            <a:avLst/>
-            <a:gdLst>
-              <a:gd name="connsiteX0" fmla="*/ 2835357 w 2835357"/>
-              <a:gd name="connsiteY0" fmla="*/ 1480837 h 1480837"/>
-              <a:gd name="connsiteX1" fmla="*/ 0 w 2835357"/>
-              <a:gd name="connsiteY1" fmla="*/ 1480837 h 1480837"/>
-              <a:gd name="connsiteX2" fmla="*/ 1552727 w 2835357"/>
-              <a:gd name="connsiteY2" fmla="*/ 0 h 1480837"/>
-              <a:gd name="connsiteX3" fmla="*/ 2835357 w 2835357"/>
-              <a:gd name="connsiteY3" fmla="*/ 1223245 h 1480837"/>
-            </a:gdLst>
-            <a:ahLst/>
-            <a:cxnLst>
-              <a:cxn ang="0">
-                <a:pos x="connsiteX0" y="connsiteY0"/>
-              </a:cxn>
-              <a:cxn ang="0">
-                <a:pos x="connsiteX1" y="connsiteY1"/>
-              </a:cxn>
-              <a:cxn ang="0">
-                <a:pos x="connsiteX2" y="connsiteY2"/>
-              </a:cxn>
-              <a:cxn ang="0">
-                <a:pos x="connsiteX3" y="connsiteY3"/>
-              </a:cxn>
-            </a:cxnLst>
-            <a:rect l="l" t="t" r="r" b="b"/>
-            <a:pathLst>
-              <a:path w="2835357" h="1480837">
-                <a:moveTo>
-                  <a:pt x="2835357" y="1480837"/>
-                </a:moveTo>
-                <a:lnTo>
-                  <a:pt x="0" y="1480837"/>
-                </a:lnTo>
-                <a:lnTo>
-                  <a:pt x="1552727" y="0"/>
-                </a:lnTo>
-                <a:lnTo>
-                  <a:pt x="2835357" y="1223245"/>
-                </a:lnTo>
-                <a:close/>
-              </a:path>
-            </a:pathLst>
-          </a:custGeom>
-          <a:solidFill>
-            <a:schemeClr val="accent4">
-              <a:alpha val="30000"/>
-            </a:schemeClr>
-          </a:solidFill>
-          <a:ln>
-            <a:noFill/>
-          </a:ln>
-        </p:spPr>
-        <p:style>
-          <a:lnRef idx="2">
-            <a:schemeClr val="accent1">
-              <a:shade val="50000"/>
-            </a:schemeClr>
-          </a:lnRef>
-          <a:fillRef idx="1">
-            <a:schemeClr val="accent1"/>
-          </a:fillRef>
-          <a:effectRef idx="0">
-            <a:schemeClr val="accent1"/>
-          </a:effectRef>
-          <a:fontRef idx="minor">
-            <a:schemeClr val="lt1"/>
-          </a:fontRef>
-        </p:style>
-        <p:txBody>
-          <a:bodyPr wrap="square" rtlCol="0" anchor="ctr">
-            <a:noAutofit/>
-          </a:bodyPr>
-          <a:lstStyle/>
-          <a:p>
-            <a:pPr algn="ctr"/>
-            <a:endParaRPr lang="en-US" dirty="0"/>
-          </a:p>
-        </p:txBody>
-      </p:sp>
-      <p:sp>
-        <p:nvSpPr>
-          <p:cNvPr id="37" name="Isosceles Triangle 36">
-            <a:extLst>
-              <a:ext uri="{FF2B5EF4-FFF2-40B4-BE49-F238E27FC236}">
-                <a16:creationId xmlns:a16="http://schemas.microsoft.com/office/drawing/2014/main" id="{39D0DBA3-22C1-A7AD-5B65-E017A98F619A}"/>
-              </a:ext>
-              <a:ext uri="{C183D7F6-B498-43B3-948B-1728B52AA6E4}">
-                <adec:decorative xmlns:adec="http://schemas.microsoft.com/office/drawing/2017/decorative" val="1"/>
-              </a:ext>
-            </a:extLst>
-          </p:cNvPr>
-          <p:cNvSpPr>
-            <a:spLocks noGrp="1" noRot="1" noChangeAspect="1" noMove="1" noResize="1" noEditPoints="1" noAdjustHandles="1" noChangeArrowheads="1" noChangeShapeType="1" noTextEdit="1"/>
-          </p:cNvSpPr>
-          <p:nvPr>
-            <p:extLst>
-              <p:ext uri="{386F3935-93C4-4BCD-93E2-E3B085C9AB24}">
-                <p16:designElem xmlns:p16="http://schemas.microsoft.com/office/powerpoint/2015/main" val="1"/>
-              </p:ext>
-            </p:extLst>
-          </p:nvPr>
-        </p:nvSpPr>
-        <p:spPr>
-          <a:xfrm flipH="1">
-            <a:off x="6580483" y="6930901"/>
-            <a:ext cx="1232974" cy="841499"/>
-          </a:xfrm>
-          <a:prstGeom prst="triangle">
-            <a:avLst/>
-          </a:prstGeom>
-          <a:solidFill>
-            <a:schemeClr val="accent1">
-              <a:alpha val="30000"/>
-            </a:schemeClr>
-          </a:solidFill>
-          <a:ln>
-            <a:noFill/>
-          </a:ln>
-        </p:spPr>
-        <p:style>
-          <a:lnRef idx="2">
-            <a:schemeClr val="accent1">
-              <a:shade val="50000"/>
-            </a:schemeClr>
-          </a:lnRef>
-          <a:fillRef idx="1">
-            <a:schemeClr val="accent1"/>
-          </a:fillRef>
-          <a:effectRef idx="0">
-            <a:schemeClr val="accent1"/>
-          </a:effectRef>
-          <a:fontRef idx="minor">
-            <a:schemeClr val="lt1"/>
-          </a:fontRef>
-        </p:style>
-        <p:txBody>
-          <a:bodyPr rtlCol="0" anchor="ctr"/>
-          <a:lstStyle/>
-          <a:p>
-            <a:pPr algn="ctr"/>
-            <a:endParaRPr lang="en-US"/>
-          </a:p>
-        </p:txBody>
-      </p:sp>
-      <p:sp>
-        <p:nvSpPr>
-          <p:cNvPr id="39" name="Isosceles Triangle 38">
-            <a:extLst>
-              <a:ext uri="{FF2B5EF4-FFF2-40B4-BE49-F238E27FC236}">
-                <a16:creationId xmlns:a16="http://schemas.microsoft.com/office/drawing/2014/main" id="{11E4C121-B4D1-7C55-C58B-079744362B58}"/>
-              </a:ext>
-              <a:ext uri="{C183D7F6-B498-43B3-948B-1728B52AA6E4}">
-                <adec:decorative xmlns:adec="http://schemas.microsoft.com/office/drawing/2017/decorative" val="1"/>
-              </a:ext>
-            </a:extLst>
-          </p:cNvPr>
-          <p:cNvSpPr>
-            <a:spLocks noGrp="1" noRot="1" noChangeAspect="1" noMove="1" noResize="1" noEditPoints="1" noAdjustHandles="1" noChangeArrowheads="1" noChangeShapeType="1" noTextEdit="1"/>
-          </p:cNvSpPr>
-          <p:nvPr>
-            <p:extLst>
-              <p:ext uri="{386F3935-93C4-4BCD-93E2-E3B085C9AB24}">
-                <p16:designElem xmlns:p16="http://schemas.microsoft.com/office/powerpoint/2015/main" val="1"/>
-              </p:ext>
-            </p:extLst>
-          </p:nvPr>
-        </p:nvSpPr>
-        <p:spPr>
-          <a:xfrm flipH="1">
-            <a:off x="6273366" y="7313562"/>
-            <a:ext cx="672294" cy="458838"/>
-          </a:xfrm>
-          <a:prstGeom prst="triangle">
-            <a:avLst/>
-          </a:prstGeom>
-          <a:solidFill>
-            <a:schemeClr val="accent1">
-              <a:alpha val="30000"/>
-            </a:schemeClr>
-          </a:solidFill>
-          <a:ln>
-            <a:noFill/>
-          </a:ln>
-        </p:spPr>
-        <p:style>
-          <a:lnRef idx="2">
-            <a:schemeClr val="accent1">
-              <a:shade val="50000"/>
-            </a:schemeClr>
-          </a:lnRef>
-          <a:fillRef idx="1">
-            <a:schemeClr val="accent1"/>
-          </a:fillRef>
-          <a:effectRef idx="0">
-            <a:schemeClr val="accent1"/>
-          </a:effectRef>
-          <a:fontRef idx="minor">
-            <a:schemeClr val="lt1"/>
-          </a:fontRef>
-        </p:style>
-        <p:txBody>
-          <a:bodyPr rtlCol="0" anchor="ctr"/>
-          <a:lstStyle/>
-          <a:p>
-            <a:pPr algn="ctr"/>
-            <a:endParaRPr lang="en-US"/>
-          </a:p>
-        </p:txBody>
-      </p:sp>
-      <p:sp>
-        <p:nvSpPr>
-          <p:cNvPr id="6" name="TextBox 5">
-            <a:extLst>
-              <a:ext uri="{FF2B5EF4-FFF2-40B4-BE49-F238E27FC236}">
-                <a16:creationId xmlns:a16="http://schemas.microsoft.com/office/drawing/2014/main" id="{4F82D9C0-7538-351C-DD92-6383E4364DC0}"/>
-              </a:ext>
-            </a:extLst>
-          </p:cNvPr>
-          <p:cNvSpPr txBox="1"/>
-          <p:nvPr/>
-        </p:nvSpPr>
-        <p:spPr>
-          <a:xfrm>
-            <a:off x="1528411" y="1573218"/>
-            <a:ext cx="7086600" cy="584775"/>
-          </a:xfrm>
-          <a:prstGeom prst="rect">
-            <a:avLst/>
-          </a:prstGeom>
-          <a:noFill/>
-        </p:spPr>
-        <p:txBody>
-          <a:bodyPr wrap="square" rtlCol="0">
-            <a:spAutoFit/>
-          </a:bodyPr>
-          <a:lstStyle/>
-          <a:p>
-            <a:pPr algn="ctr"/>
-            <a:r>
-              <a:rPr lang="en-US" sz="3200" b="1" dirty="0">
-                <a:latin typeface="+mj-lt"/>
-              </a:rPr>
-              <a:t>Table of Content</a:t>
-            </a:r>
-          </a:p>
-        </p:txBody>
-      </p:sp>
-      <p:sp>
-        <p:nvSpPr>
-          <p:cNvPr id="7" name="TextBox 6">
-            <a:extLst>
-              <a:ext uri="{FF2B5EF4-FFF2-40B4-BE49-F238E27FC236}">
-                <a16:creationId xmlns:a16="http://schemas.microsoft.com/office/drawing/2014/main" id="{716ECDE0-EB0A-BB9E-DDD2-7D61E6AD8FDA}"/>
-              </a:ext>
-            </a:extLst>
-          </p:cNvPr>
-          <p:cNvSpPr txBox="1"/>
-          <p:nvPr/>
-        </p:nvSpPr>
-        <p:spPr>
-          <a:xfrm>
-            <a:off x="2158869" y="2762815"/>
-            <a:ext cx="6886575" cy="2677656"/>
-          </a:xfrm>
-          <a:prstGeom prst="rect">
-            <a:avLst/>
-          </a:prstGeom>
-          <a:noFill/>
-        </p:spPr>
-        <p:txBody>
-          <a:bodyPr wrap="square" rtlCol="0">
-            <a:spAutoFit/>
-          </a:bodyPr>
-          <a:lstStyle/>
-          <a:p>
-            <a:pPr marL="342900" indent="-342900">
-              <a:buAutoNum type="arabicPeriod"/>
-            </a:pPr>
-            <a:r>
-              <a:rPr lang="en-US" sz="2800" dirty="0"/>
-              <a:t>Introduction</a:t>
-            </a:r>
-          </a:p>
-          <a:p>
-            <a:pPr marL="342900" indent="-342900">
-              <a:buAutoNum type="arabicPeriod"/>
-            </a:pPr>
-            <a:r>
-              <a:rPr lang="en-US" sz="2800" dirty="0"/>
-              <a:t>Data Cleaning – SQL</a:t>
-            </a:r>
-          </a:p>
-          <a:p>
-            <a:pPr marL="342900" indent="-342900">
-              <a:buAutoNum type="arabicPeriod"/>
-            </a:pPr>
-            <a:r>
-              <a:rPr lang="en-US" sz="2800" dirty="0"/>
-              <a:t>Visualization – Python Matplotlib &amp; Pandas </a:t>
-            </a:r>
-          </a:p>
-          <a:p>
-            <a:pPr marL="342900" indent="-342900">
-              <a:buAutoNum type="arabicPeriod"/>
-            </a:pPr>
-            <a:r>
-              <a:rPr lang="en-US" sz="2800" dirty="0"/>
-              <a:t>Supervised Machine Learning Models</a:t>
-            </a:r>
-          </a:p>
-          <a:p>
-            <a:pPr marL="342900" indent="-342900">
-              <a:buAutoNum type="arabicPeriod"/>
-            </a:pPr>
-            <a:r>
-              <a:rPr lang="en-US" sz="2800" dirty="0"/>
-              <a:t>Model Optimizations </a:t>
-            </a:r>
-          </a:p>
-          <a:p>
-            <a:pPr marL="342900" indent="-342900">
-              <a:buAutoNum type="arabicPeriod"/>
-            </a:pPr>
-            <a:r>
-              <a:rPr lang="en-US" sz="2800" dirty="0"/>
-              <a:t>Result &amp; Conclusion</a:t>
-            </a:r>
-          </a:p>
-        </p:txBody>
-      </p:sp>
-    </p:spTree>
-    <p:extLst>
-      <p:ext uri="{BB962C8B-B14F-4D97-AF65-F5344CB8AC3E}">
-        <p14:creationId xmlns:p14="http://schemas.microsoft.com/office/powerpoint/2010/main" val="523771182"/>
-      </p:ext>
-    </p:extLst>
-  </p:cSld>
-  <p:clrMapOvr>
-    <a:masterClrMapping/>
-  </p:clrMapOvr>
-</p:sld>
-</file>
-
-<file path=ppt/slides/slide20.xml><?xml version="1.0" encoding="utf-8"?>
+<file path=ppt/slides/slide19.xml><?xml version="1.0" encoding="utf-8"?>
 <p:sld xmlns:a="http://schemas.openxmlformats.org/drawingml/2006/main" xmlns:r="http://schemas.openxmlformats.org/officeDocument/2006/relationships" xmlns:p="http://schemas.openxmlformats.org/presentationml/2006/main">
   <p:cSld>
     <p:bg>
@@ -20502,7 +19209,721 @@
 </p:sld>
 </file>
 
-<file path=ppt/slides/slide21.xml><?xml version="1.0" encoding="utf-8"?>
+<file path=ppt/slides/slide2.xml><?xml version="1.0" encoding="utf-8"?>
+<p:sld xmlns:a="http://schemas.openxmlformats.org/drawingml/2006/main" xmlns:r="http://schemas.openxmlformats.org/officeDocument/2006/relationships" xmlns:p="http://schemas.openxmlformats.org/presentationml/2006/main">
+  <p:cSld>
+    <p:bg>
+      <p:bgPr>
+        <a:solidFill>
+          <a:schemeClr val="bg1"/>
+        </a:solidFill>
+        <a:effectLst/>
+      </p:bgPr>
+    </p:bg>
+    <p:spTree>
+      <p:nvGrpSpPr>
+        <p:cNvPr id="1" name="">
+          <a:extLst>
+            <a:ext uri="{FF2B5EF4-FFF2-40B4-BE49-F238E27FC236}">
+              <a16:creationId xmlns:a16="http://schemas.microsoft.com/office/drawing/2014/main" id="{02984243-06AA-7503-EAE6-C43F12132B68}"/>
+            </a:ext>
+          </a:extLst>
+        </p:cNvPr>
+        <p:cNvGrpSpPr/>
+        <p:nvPr/>
+      </p:nvGrpSpPr>
+      <p:grpSpPr>
+        <a:xfrm>
+          <a:off x="0" y="0"/>
+          <a:ext cx="0" cy="0"/>
+          <a:chOff x="0" y="0"/>
+          <a:chExt cx="0" cy="0"/>
+        </a:xfrm>
+      </p:grpSpPr>
+      <p:sp>
+        <p:nvSpPr>
+          <p:cNvPr id="27" name="Rectangle 26">
+            <a:extLst>
+              <a:ext uri="{FF2B5EF4-FFF2-40B4-BE49-F238E27FC236}">
+                <a16:creationId xmlns:a16="http://schemas.microsoft.com/office/drawing/2014/main" id="{73CDEEF2-1AB3-80D1-CDA4-608C51A8E1C7}"/>
+              </a:ext>
+              <a:ext uri="{C183D7F6-B498-43B3-948B-1728B52AA6E4}">
+                <adec:decorative xmlns:adec="http://schemas.microsoft.com/office/drawing/2017/decorative" val="1"/>
+              </a:ext>
+            </a:extLst>
+          </p:cNvPr>
+          <p:cNvSpPr>
+            <a:spLocks noGrp="1" noRot="1" noChangeAspect="1" noMove="1" noResize="1" noEditPoints="1" noAdjustHandles="1" noChangeArrowheads="1" noChangeShapeType="1" noTextEdit="1"/>
+          </p:cNvSpPr>
+          <p:nvPr>
+            <p:extLst>
+              <p:ext uri="{386F3935-93C4-4BCD-93E2-E3B085C9AB24}">
+                <p16:designElem xmlns:p16="http://schemas.microsoft.com/office/powerpoint/2015/main" val="1"/>
+              </p:ext>
+            </p:extLst>
+          </p:nvPr>
+        </p:nvSpPr>
+        <p:spPr>
+          <a:xfrm>
+            <a:off x="0" y="0"/>
+            <a:ext cx="10058400" cy="7772400"/>
+          </a:xfrm>
+          <a:prstGeom prst="rect">
+            <a:avLst/>
+          </a:prstGeom>
+          <a:solidFill>
+            <a:schemeClr val="bg1"/>
+          </a:solidFill>
+          <a:ln>
+            <a:noFill/>
+          </a:ln>
+        </p:spPr>
+        <p:style>
+          <a:lnRef idx="2">
+            <a:schemeClr val="accent1">
+              <a:shade val="50000"/>
+            </a:schemeClr>
+          </a:lnRef>
+          <a:fillRef idx="1">
+            <a:schemeClr val="accent1"/>
+          </a:fillRef>
+          <a:effectRef idx="0">
+            <a:schemeClr val="accent1"/>
+          </a:effectRef>
+          <a:fontRef idx="minor">
+            <a:schemeClr val="lt1"/>
+          </a:fontRef>
+        </p:style>
+        <p:txBody>
+          <a:bodyPr rtlCol="0" anchor="ctr"/>
+          <a:lstStyle/>
+          <a:p>
+            <a:pPr algn="ctr"/>
+            <a:endParaRPr lang="en-US" dirty="0"/>
+          </a:p>
+        </p:txBody>
+      </p:sp>
+      <p:sp>
+        <p:nvSpPr>
+          <p:cNvPr id="29" name="Freeform: Shape 28">
+            <a:extLst>
+              <a:ext uri="{FF2B5EF4-FFF2-40B4-BE49-F238E27FC236}">
+                <a16:creationId xmlns:a16="http://schemas.microsoft.com/office/drawing/2014/main" id="{7C7D98AB-74B6-9E79-6551-31459B530EA0}"/>
+              </a:ext>
+              <a:ext uri="{C183D7F6-B498-43B3-948B-1728B52AA6E4}">
+                <adec:decorative xmlns:adec="http://schemas.microsoft.com/office/drawing/2017/decorative" val="1"/>
+              </a:ext>
+            </a:extLst>
+          </p:cNvPr>
+          <p:cNvSpPr>
+            <a:spLocks noGrp="1" noRot="1" noChangeAspect="1" noMove="1" noResize="1" noEditPoints="1" noAdjustHandles="1" noChangeArrowheads="1" noChangeShapeType="1" noTextEdit="1"/>
+          </p:cNvSpPr>
+          <p:nvPr>
+            <p:extLst>
+              <p:ext uri="{386F3935-93C4-4BCD-93E2-E3B085C9AB24}">
+                <p16:designElem xmlns:p16="http://schemas.microsoft.com/office/powerpoint/2015/main" val="1"/>
+              </p:ext>
+            </p:extLst>
+          </p:nvPr>
+        </p:nvSpPr>
+        <p:spPr>
+          <a:xfrm rot="18900000" flipH="1">
+            <a:off x="-310328" y="-287492"/>
+            <a:ext cx="1507800" cy="1560586"/>
+          </a:xfrm>
+          <a:custGeom>
+            <a:avLst/>
+            <a:gdLst>
+              <a:gd name="connsiteX0" fmla="*/ 0 w 1827638"/>
+              <a:gd name="connsiteY0" fmla="*/ 987379 h 1376989"/>
+              <a:gd name="connsiteX1" fmla="*/ 987379 w 1827638"/>
+              <a:gd name="connsiteY1" fmla="*/ 0 h 1376989"/>
+              <a:gd name="connsiteX2" fmla="*/ 1827638 w 1827638"/>
+              <a:gd name="connsiteY2" fmla="*/ 840260 h 1376989"/>
+              <a:gd name="connsiteX3" fmla="*/ 1827638 w 1827638"/>
+              <a:gd name="connsiteY3" fmla="*/ 1376989 h 1376989"/>
+              <a:gd name="connsiteX4" fmla="*/ 0 w 1827638"/>
+              <a:gd name="connsiteY4" fmla="*/ 1376989 h 1376989"/>
+            </a:gdLst>
+            <a:ahLst/>
+            <a:cxnLst>
+              <a:cxn ang="0">
+                <a:pos x="connsiteX0" y="connsiteY0"/>
+              </a:cxn>
+              <a:cxn ang="0">
+                <a:pos x="connsiteX1" y="connsiteY1"/>
+              </a:cxn>
+              <a:cxn ang="0">
+                <a:pos x="connsiteX2" y="connsiteY2"/>
+              </a:cxn>
+              <a:cxn ang="0">
+                <a:pos x="connsiteX3" y="connsiteY3"/>
+              </a:cxn>
+              <a:cxn ang="0">
+                <a:pos x="connsiteX4" y="connsiteY4"/>
+              </a:cxn>
+            </a:cxnLst>
+            <a:rect l="l" t="t" r="r" b="b"/>
+            <a:pathLst>
+              <a:path w="1827638" h="1376989">
+                <a:moveTo>
+                  <a:pt x="0" y="987379"/>
+                </a:moveTo>
+                <a:lnTo>
+                  <a:pt x="987379" y="0"/>
+                </a:lnTo>
+                <a:lnTo>
+                  <a:pt x="1827638" y="840260"/>
+                </a:lnTo>
+                <a:lnTo>
+                  <a:pt x="1827638" y="1376989"/>
+                </a:lnTo>
+                <a:lnTo>
+                  <a:pt x="0" y="1376989"/>
+                </a:lnTo>
+                <a:close/>
+              </a:path>
+            </a:pathLst>
+          </a:custGeom>
+          <a:solidFill>
+            <a:schemeClr val="accent1">
+              <a:alpha val="30000"/>
+            </a:schemeClr>
+          </a:solidFill>
+          <a:ln>
+            <a:noFill/>
+          </a:ln>
+        </p:spPr>
+        <p:style>
+          <a:lnRef idx="2">
+            <a:schemeClr val="accent1">
+              <a:shade val="50000"/>
+            </a:schemeClr>
+          </a:lnRef>
+          <a:fillRef idx="1">
+            <a:schemeClr val="accent1"/>
+          </a:fillRef>
+          <a:effectRef idx="0">
+            <a:schemeClr val="accent1"/>
+          </a:effectRef>
+          <a:fontRef idx="minor">
+            <a:schemeClr val="lt1"/>
+          </a:fontRef>
+        </p:style>
+        <p:txBody>
+          <a:bodyPr rtlCol="0" anchor="ctr"/>
+          <a:lstStyle/>
+          <a:p>
+            <a:pPr algn="ctr"/>
+            <a:endParaRPr lang="en-US" dirty="0"/>
+          </a:p>
+        </p:txBody>
+      </p:sp>
+      <p:sp>
+        <p:nvSpPr>
+          <p:cNvPr id="31" name="Rectangle 30">
+            <a:extLst>
+              <a:ext uri="{FF2B5EF4-FFF2-40B4-BE49-F238E27FC236}">
+                <a16:creationId xmlns:a16="http://schemas.microsoft.com/office/drawing/2014/main" id="{E02A97E4-FFF3-59F6-2E50-A49A1B875210}"/>
+              </a:ext>
+              <a:ext uri="{C183D7F6-B498-43B3-948B-1728B52AA6E4}">
+                <adec:decorative xmlns:adec="http://schemas.microsoft.com/office/drawing/2017/decorative" val="1"/>
+              </a:ext>
+            </a:extLst>
+          </p:cNvPr>
+          <p:cNvSpPr>
+            <a:spLocks noGrp="1" noRot="1" noChangeAspect="1" noMove="1" noResize="1" noEditPoints="1" noAdjustHandles="1" noChangeArrowheads="1" noChangeShapeType="1" noTextEdit="1"/>
+          </p:cNvSpPr>
+          <p:nvPr>
+            <p:extLst>
+              <p:ext uri="{386F3935-93C4-4BCD-93E2-E3B085C9AB24}">
+                <p16:designElem xmlns:p16="http://schemas.microsoft.com/office/powerpoint/2015/main" val="1"/>
+              </p:ext>
+            </p:extLst>
+          </p:nvPr>
+        </p:nvSpPr>
+        <p:spPr>
+          <a:xfrm rot="18900000" flipH="1">
+            <a:off x="735603" y="478432"/>
+            <a:ext cx="532429" cy="731417"/>
+          </a:xfrm>
+          <a:prstGeom prst="rect">
+            <a:avLst/>
+          </a:prstGeom>
+          <a:solidFill>
+            <a:schemeClr val="accent1">
+              <a:alpha val="30000"/>
+            </a:schemeClr>
+          </a:solidFill>
+          <a:ln>
+            <a:noFill/>
+          </a:ln>
+        </p:spPr>
+        <p:style>
+          <a:lnRef idx="2">
+            <a:schemeClr val="accent1">
+              <a:shade val="50000"/>
+            </a:schemeClr>
+          </a:lnRef>
+          <a:fillRef idx="1">
+            <a:schemeClr val="accent1"/>
+          </a:fillRef>
+          <a:effectRef idx="0">
+            <a:schemeClr val="accent1"/>
+          </a:effectRef>
+          <a:fontRef idx="minor">
+            <a:schemeClr val="lt1"/>
+          </a:fontRef>
+        </p:style>
+        <p:txBody>
+          <a:bodyPr rtlCol="0" anchor="ctr"/>
+          <a:lstStyle/>
+          <a:p>
+            <a:pPr algn="ctr"/>
+            <a:endParaRPr lang="en-US"/>
+          </a:p>
+        </p:txBody>
+      </p:sp>
+      <p:sp>
+        <p:nvSpPr>
+          <p:cNvPr id="33" name="Rectangle 32">
+            <a:extLst>
+              <a:ext uri="{FF2B5EF4-FFF2-40B4-BE49-F238E27FC236}">
+                <a16:creationId xmlns:a16="http://schemas.microsoft.com/office/drawing/2014/main" id="{7D5189F2-CEF8-E33C-1F6D-25FADC8721D8}"/>
+              </a:ext>
+              <a:ext uri="{C183D7F6-B498-43B3-948B-1728B52AA6E4}">
+                <adec:decorative xmlns:adec="http://schemas.microsoft.com/office/drawing/2017/decorative" val="1"/>
+              </a:ext>
+            </a:extLst>
+          </p:cNvPr>
+          <p:cNvSpPr>
+            <a:spLocks noGrp="1" noRot="1" noChangeAspect="1" noMove="1" noResize="1" noEditPoints="1" noAdjustHandles="1" noChangeArrowheads="1" noChangeShapeType="1" noTextEdit="1"/>
+          </p:cNvSpPr>
+          <p:nvPr>
+            <p:extLst>
+              <p:ext uri="{386F3935-93C4-4BCD-93E2-E3B085C9AB24}">
+                <p16:designElem xmlns:p16="http://schemas.microsoft.com/office/powerpoint/2015/main" val="1"/>
+              </p:ext>
+            </p:extLst>
+          </p:nvPr>
+        </p:nvSpPr>
+        <p:spPr>
+          <a:xfrm rot="18900000" flipH="1">
+            <a:off x="8285872" y="742492"/>
+            <a:ext cx="567165" cy="779134"/>
+          </a:xfrm>
+          <a:prstGeom prst="rect">
+            <a:avLst/>
+          </a:prstGeom>
+          <a:solidFill>
+            <a:schemeClr val="accent4">
+              <a:alpha val="30000"/>
+            </a:schemeClr>
+          </a:solidFill>
+          <a:ln>
+            <a:noFill/>
+          </a:ln>
+        </p:spPr>
+        <p:style>
+          <a:lnRef idx="2">
+            <a:schemeClr val="accent1">
+              <a:shade val="50000"/>
+            </a:schemeClr>
+          </a:lnRef>
+          <a:fillRef idx="1">
+            <a:schemeClr val="accent1"/>
+          </a:fillRef>
+          <a:effectRef idx="0">
+            <a:schemeClr val="accent1"/>
+          </a:effectRef>
+          <a:fontRef idx="minor">
+            <a:schemeClr val="lt1"/>
+          </a:fontRef>
+        </p:style>
+        <p:txBody>
+          <a:bodyPr rtlCol="0" anchor="ctr"/>
+          <a:lstStyle/>
+          <a:p>
+            <a:pPr algn="ctr"/>
+            <a:endParaRPr lang="en-US"/>
+          </a:p>
+        </p:txBody>
+      </p:sp>
+      <p:sp>
+        <p:nvSpPr>
+          <p:cNvPr id="35" name="Freeform: Shape 34">
+            <a:extLst>
+              <a:ext uri="{FF2B5EF4-FFF2-40B4-BE49-F238E27FC236}">
+                <a16:creationId xmlns:a16="http://schemas.microsoft.com/office/drawing/2014/main" id="{88944EF9-2B55-2555-0F0D-1F9070FAB8F6}"/>
+              </a:ext>
+              <a:ext uri="{C183D7F6-B498-43B3-948B-1728B52AA6E4}">
+                <adec:decorative xmlns:adec="http://schemas.microsoft.com/office/drawing/2017/decorative" val="1"/>
+              </a:ext>
+            </a:extLst>
+          </p:cNvPr>
+          <p:cNvSpPr>
+            <a:spLocks noGrp="1" noRot="1" noChangeAspect="1" noMove="1" noResize="1" noEditPoints="1" noAdjustHandles="1" noChangeArrowheads="1" noChangeShapeType="1" noTextEdit="1"/>
+          </p:cNvSpPr>
+          <p:nvPr>
+            <p:extLst>
+              <p:ext uri="{386F3935-93C4-4BCD-93E2-E3B085C9AB24}">
+                <p16:designElem xmlns:p16="http://schemas.microsoft.com/office/powerpoint/2015/main" val="1"/>
+              </p:ext>
+            </p:extLst>
+          </p:nvPr>
+        </p:nvSpPr>
+        <p:spPr>
+          <a:xfrm rot="10800000" flipH="1">
+            <a:off x="7719230" y="0"/>
+            <a:ext cx="2339170" cy="1678281"/>
+          </a:xfrm>
+          <a:custGeom>
+            <a:avLst/>
+            <a:gdLst>
+              <a:gd name="connsiteX0" fmla="*/ 2835357 w 2835357"/>
+              <a:gd name="connsiteY0" fmla="*/ 1480837 h 1480837"/>
+              <a:gd name="connsiteX1" fmla="*/ 0 w 2835357"/>
+              <a:gd name="connsiteY1" fmla="*/ 1480837 h 1480837"/>
+              <a:gd name="connsiteX2" fmla="*/ 1552727 w 2835357"/>
+              <a:gd name="connsiteY2" fmla="*/ 0 h 1480837"/>
+              <a:gd name="connsiteX3" fmla="*/ 2835357 w 2835357"/>
+              <a:gd name="connsiteY3" fmla="*/ 1223245 h 1480837"/>
+            </a:gdLst>
+            <a:ahLst/>
+            <a:cxnLst>
+              <a:cxn ang="0">
+                <a:pos x="connsiteX0" y="connsiteY0"/>
+              </a:cxn>
+              <a:cxn ang="0">
+                <a:pos x="connsiteX1" y="connsiteY1"/>
+              </a:cxn>
+              <a:cxn ang="0">
+                <a:pos x="connsiteX2" y="connsiteY2"/>
+              </a:cxn>
+              <a:cxn ang="0">
+                <a:pos x="connsiteX3" y="connsiteY3"/>
+              </a:cxn>
+            </a:cxnLst>
+            <a:rect l="l" t="t" r="r" b="b"/>
+            <a:pathLst>
+              <a:path w="2835357" h="1480837">
+                <a:moveTo>
+                  <a:pt x="2835357" y="1480837"/>
+                </a:moveTo>
+                <a:lnTo>
+                  <a:pt x="0" y="1480837"/>
+                </a:lnTo>
+                <a:lnTo>
+                  <a:pt x="1552727" y="0"/>
+                </a:lnTo>
+                <a:lnTo>
+                  <a:pt x="2835357" y="1223245"/>
+                </a:lnTo>
+                <a:close/>
+              </a:path>
+            </a:pathLst>
+          </a:custGeom>
+          <a:solidFill>
+            <a:schemeClr val="accent4">
+              <a:alpha val="30000"/>
+            </a:schemeClr>
+          </a:solidFill>
+          <a:ln>
+            <a:noFill/>
+          </a:ln>
+        </p:spPr>
+        <p:style>
+          <a:lnRef idx="2">
+            <a:schemeClr val="accent1">
+              <a:shade val="50000"/>
+            </a:schemeClr>
+          </a:lnRef>
+          <a:fillRef idx="1">
+            <a:schemeClr val="accent1"/>
+          </a:fillRef>
+          <a:effectRef idx="0">
+            <a:schemeClr val="accent1"/>
+          </a:effectRef>
+          <a:fontRef idx="minor">
+            <a:schemeClr val="lt1"/>
+          </a:fontRef>
+        </p:style>
+        <p:txBody>
+          <a:bodyPr wrap="square" rtlCol="0" anchor="ctr">
+            <a:noAutofit/>
+          </a:bodyPr>
+          <a:lstStyle/>
+          <a:p>
+            <a:pPr algn="ctr"/>
+            <a:endParaRPr lang="en-US" dirty="0"/>
+          </a:p>
+        </p:txBody>
+      </p:sp>
+      <p:sp>
+        <p:nvSpPr>
+          <p:cNvPr id="37" name="Isosceles Triangle 36">
+            <a:extLst>
+              <a:ext uri="{FF2B5EF4-FFF2-40B4-BE49-F238E27FC236}">
+                <a16:creationId xmlns:a16="http://schemas.microsoft.com/office/drawing/2014/main" id="{39D0DBA3-22C1-A7AD-5B65-E017A98F619A}"/>
+              </a:ext>
+              <a:ext uri="{C183D7F6-B498-43B3-948B-1728B52AA6E4}">
+                <adec:decorative xmlns:adec="http://schemas.microsoft.com/office/drawing/2017/decorative" val="1"/>
+              </a:ext>
+            </a:extLst>
+          </p:cNvPr>
+          <p:cNvSpPr>
+            <a:spLocks noGrp="1" noRot="1" noChangeAspect="1" noMove="1" noResize="1" noEditPoints="1" noAdjustHandles="1" noChangeArrowheads="1" noChangeShapeType="1" noTextEdit="1"/>
+          </p:cNvSpPr>
+          <p:nvPr>
+            <p:extLst>
+              <p:ext uri="{386F3935-93C4-4BCD-93E2-E3B085C9AB24}">
+                <p16:designElem xmlns:p16="http://schemas.microsoft.com/office/powerpoint/2015/main" val="1"/>
+              </p:ext>
+            </p:extLst>
+          </p:nvPr>
+        </p:nvSpPr>
+        <p:spPr>
+          <a:xfrm flipH="1">
+            <a:off x="6580483" y="6930901"/>
+            <a:ext cx="1232974" cy="841499"/>
+          </a:xfrm>
+          <a:prstGeom prst="triangle">
+            <a:avLst/>
+          </a:prstGeom>
+          <a:solidFill>
+            <a:schemeClr val="accent1">
+              <a:alpha val="30000"/>
+            </a:schemeClr>
+          </a:solidFill>
+          <a:ln>
+            <a:noFill/>
+          </a:ln>
+        </p:spPr>
+        <p:style>
+          <a:lnRef idx="2">
+            <a:schemeClr val="accent1">
+              <a:shade val="50000"/>
+            </a:schemeClr>
+          </a:lnRef>
+          <a:fillRef idx="1">
+            <a:schemeClr val="accent1"/>
+          </a:fillRef>
+          <a:effectRef idx="0">
+            <a:schemeClr val="accent1"/>
+          </a:effectRef>
+          <a:fontRef idx="minor">
+            <a:schemeClr val="lt1"/>
+          </a:fontRef>
+        </p:style>
+        <p:txBody>
+          <a:bodyPr rtlCol="0" anchor="ctr"/>
+          <a:lstStyle/>
+          <a:p>
+            <a:pPr algn="ctr"/>
+            <a:endParaRPr lang="en-US"/>
+          </a:p>
+        </p:txBody>
+      </p:sp>
+      <p:sp>
+        <p:nvSpPr>
+          <p:cNvPr id="39" name="Isosceles Triangle 38">
+            <a:extLst>
+              <a:ext uri="{FF2B5EF4-FFF2-40B4-BE49-F238E27FC236}">
+                <a16:creationId xmlns:a16="http://schemas.microsoft.com/office/drawing/2014/main" id="{11E4C121-B4D1-7C55-C58B-079744362B58}"/>
+              </a:ext>
+              <a:ext uri="{C183D7F6-B498-43B3-948B-1728B52AA6E4}">
+                <adec:decorative xmlns:adec="http://schemas.microsoft.com/office/drawing/2017/decorative" val="1"/>
+              </a:ext>
+            </a:extLst>
+          </p:cNvPr>
+          <p:cNvSpPr>
+            <a:spLocks noGrp="1" noRot="1" noChangeAspect="1" noMove="1" noResize="1" noEditPoints="1" noAdjustHandles="1" noChangeArrowheads="1" noChangeShapeType="1" noTextEdit="1"/>
+          </p:cNvSpPr>
+          <p:nvPr>
+            <p:extLst>
+              <p:ext uri="{386F3935-93C4-4BCD-93E2-E3B085C9AB24}">
+                <p16:designElem xmlns:p16="http://schemas.microsoft.com/office/powerpoint/2015/main" val="1"/>
+              </p:ext>
+            </p:extLst>
+          </p:nvPr>
+        </p:nvSpPr>
+        <p:spPr>
+          <a:xfrm flipH="1">
+            <a:off x="6273366" y="7313562"/>
+            <a:ext cx="672294" cy="458838"/>
+          </a:xfrm>
+          <a:prstGeom prst="triangle">
+            <a:avLst/>
+          </a:prstGeom>
+          <a:solidFill>
+            <a:schemeClr val="accent1">
+              <a:alpha val="30000"/>
+            </a:schemeClr>
+          </a:solidFill>
+          <a:ln>
+            <a:noFill/>
+          </a:ln>
+        </p:spPr>
+        <p:style>
+          <a:lnRef idx="2">
+            <a:schemeClr val="accent1">
+              <a:shade val="50000"/>
+            </a:schemeClr>
+          </a:lnRef>
+          <a:fillRef idx="1">
+            <a:schemeClr val="accent1"/>
+          </a:fillRef>
+          <a:effectRef idx="0">
+            <a:schemeClr val="accent1"/>
+          </a:effectRef>
+          <a:fontRef idx="minor">
+            <a:schemeClr val="lt1"/>
+          </a:fontRef>
+        </p:style>
+        <p:txBody>
+          <a:bodyPr rtlCol="0" anchor="ctr"/>
+          <a:lstStyle/>
+          <a:p>
+            <a:pPr algn="ctr"/>
+            <a:endParaRPr lang="en-US"/>
+          </a:p>
+        </p:txBody>
+      </p:sp>
+      <p:sp>
+        <p:nvSpPr>
+          <p:cNvPr id="6" name="TextBox 5">
+            <a:extLst>
+              <a:ext uri="{FF2B5EF4-FFF2-40B4-BE49-F238E27FC236}">
+                <a16:creationId xmlns:a16="http://schemas.microsoft.com/office/drawing/2014/main" id="{4F82D9C0-7538-351C-DD92-6383E4364DC0}"/>
+              </a:ext>
+            </a:extLst>
+          </p:cNvPr>
+          <p:cNvSpPr txBox="1"/>
+          <p:nvPr/>
+        </p:nvSpPr>
+        <p:spPr>
+          <a:xfrm>
+            <a:off x="1528411" y="1573218"/>
+            <a:ext cx="7086600" cy="584775"/>
+          </a:xfrm>
+          <a:prstGeom prst="rect">
+            <a:avLst/>
+          </a:prstGeom>
+          <a:noFill/>
+        </p:spPr>
+        <p:txBody>
+          <a:bodyPr wrap="square" rtlCol="0">
+            <a:spAutoFit/>
+          </a:bodyPr>
+          <a:lstStyle/>
+          <a:p>
+            <a:pPr algn="ctr"/>
+            <a:r>
+              <a:rPr lang="en-US" sz="3200" b="1" dirty="0">
+                <a:latin typeface="+mj-lt"/>
+              </a:rPr>
+              <a:t>Table of Content</a:t>
+            </a:r>
+          </a:p>
+        </p:txBody>
+      </p:sp>
+      <p:sp>
+        <p:nvSpPr>
+          <p:cNvPr id="7" name="TextBox 6">
+            <a:extLst>
+              <a:ext uri="{FF2B5EF4-FFF2-40B4-BE49-F238E27FC236}">
+                <a16:creationId xmlns:a16="http://schemas.microsoft.com/office/drawing/2014/main" id="{716ECDE0-EB0A-BB9E-DDD2-7D61E6AD8FDA}"/>
+              </a:ext>
+            </a:extLst>
+          </p:cNvPr>
+          <p:cNvSpPr txBox="1"/>
+          <p:nvPr/>
+        </p:nvSpPr>
+        <p:spPr>
+          <a:xfrm>
+            <a:off x="2158869" y="2762815"/>
+            <a:ext cx="6886575" cy="2677656"/>
+          </a:xfrm>
+          <a:prstGeom prst="rect">
+            <a:avLst/>
+          </a:prstGeom>
+          <a:noFill/>
+        </p:spPr>
+        <p:txBody>
+          <a:bodyPr wrap="square" rtlCol="0">
+            <a:spAutoFit/>
+          </a:bodyPr>
+          <a:lstStyle/>
+          <a:p>
+            <a:pPr marL="342900" indent="-342900">
+              <a:buAutoNum type="arabicPeriod"/>
+            </a:pPr>
+            <a:r>
+              <a:rPr lang="en-US" sz="2800" dirty="0"/>
+              <a:t>Introduction</a:t>
+            </a:r>
+          </a:p>
+          <a:p>
+            <a:pPr marL="342900" indent="-342900">
+              <a:buAutoNum type="arabicPeriod"/>
+            </a:pPr>
+            <a:r>
+              <a:rPr lang="en-US" sz="2800" dirty="0"/>
+              <a:t>Data Cleaning – SQL</a:t>
+            </a:r>
+          </a:p>
+          <a:p>
+            <a:pPr marL="342900" indent="-342900">
+              <a:buAutoNum type="arabicPeriod"/>
+            </a:pPr>
+            <a:r>
+              <a:rPr lang="en-US" sz="2800" dirty="0"/>
+              <a:t>Visualization – Python Matplotlib &amp; Pandas </a:t>
+            </a:r>
+          </a:p>
+          <a:p>
+            <a:pPr marL="342900" indent="-342900">
+              <a:buAutoNum type="arabicPeriod"/>
+            </a:pPr>
+            <a:r>
+              <a:rPr lang="en-US" sz="2800" dirty="0"/>
+              <a:t>Supervised Machine Learning Models</a:t>
+            </a:r>
+          </a:p>
+          <a:p>
+            <a:pPr marL="342900" indent="-342900">
+              <a:buAutoNum type="arabicPeriod"/>
+            </a:pPr>
+            <a:r>
+              <a:rPr lang="en-US" sz="2800" dirty="0"/>
+              <a:t>Model Optimizations </a:t>
+            </a:r>
+          </a:p>
+          <a:p>
+            <a:pPr marL="342900" indent="-342900">
+              <a:buAutoNum type="arabicPeriod"/>
+            </a:pPr>
+            <a:r>
+              <a:rPr lang="en-US" sz="2800" dirty="0"/>
+              <a:t>Result &amp; Conclusion</a:t>
+            </a:r>
+          </a:p>
+        </p:txBody>
+      </p:sp>
+    </p:spTree>
+    <p:extLst>
+      <p:ext uri="{BB962C8B-B14F-4D97-AF65-F5344CB8AC3E}">
+        <p14:creationId xmlns:p14="http://schemas.microsoft.com/office/powerpoint/2010/main" val="523771182"/>
+      </p:ext>
+    </p:extLst>
+  </p:cSld>
+  <p:clrMapOvr>
+    <a:masterClrMapping/>
+  </p:clrMapOvr>
+</p:sld>
+</file>
+
+<file path=ppt/slides/slide20.xml><?xml version="1.0" encoding="utf-8"?>
 <p:sld xmlns:a="http://schemas.openxmlformats.org/drawingml/2006/main" xmlns:r="http://schemas.openxmlformats.org/officeDocument/2006/relationships" xmlns:p="http://schemas.openxmlformats.org/presentationml/2006/main">
   <p:cSld>
     <p:bg>
@@ -21479,7 +20900,7 @@
 </p:sld>
 </file>
 
-<file path=ppt/slides/slide22.xml><?xml version="1.0" encoding="utf-8"?>
+<file path=ppt/slides/slide21.xml><?xml version="1.0" encoding="utf-8"?>
 <p:sld xmlns:a="http://schemas.openxmlformats.org/drawingml/2006/main" xmlns:r="http://schemas.openxmlformats.org/officeDocument/2006/relationships" xmlns:p="http://schemas.openxmlformats.org/presentationml/2006/main">
   <p:cSld>
     <p:bg>
@@ -22451,7 +21872,7 @@
 </p:sld>
 </file>
 
-<file path=ppt/slides/slide23.xml><?xml version="1.0" encoding="utf-8"?>
+<file path=ppt/slides/slide22.xml><?xml version="1.0" encoding="utf-8"?>
 <p:sld xmlns:a="http://schemas.openxmlformats.org/drawingml/2006/main" xmlns:r="http://schemas.openxmlformats.org/officeDocument/2006/relationships" xmlns:p="http://schemas.openxmlformats.org/presentationml/2006/main">
   <p:cSld>
     <p:bg>
@@ -23358,7 +22779,7 @@
 </p:sld>
 </file>
 
-<file path=ppt/slides/slide24.xml><?xml version="1.0" encoding="utf-8"?>
+<file path=ppt/slides/slide23.xml><?xml version="1.0" encoding="utf-8"?>
 <p:sld xmlns:a="http://schemas.openxmlformats.org/drawingml/2006/main" xmlns:r="http://schemas.openxmlformats.org/officeDocument/2006/relationships" xmlns:p="http://schemas.openxmlformats.org/presentationml/2006/main">
   <p:cSld>
     <p:bg>
@@ -24023,7 +23444,7 @@
 </p:sld>
 </file>
 
-<file path=ppt/slides/slide25.xml><?xml version="1.0" encoding="utf-8"?>
+<file path=ppt/slides/slide24.xml><?xml version="1.0" encoding="utf-8"?>
 <p:sld xmlns:a="http://schemas.openxmlformats.org/drawingml/2006/main" xmlns:r="http://schemas.openxmlformats.org/officeDocument/2006/relationships" xmlns:p="http://schemas.openxmlformats.org/presentationml/2006/main">
   <p:cSld>
     <p:bg>
@@ -32682,15 +32103,6 @@
 </file>
 
 <file path=customXml/item1.xml><?xml version="1.0" encoding="utf-8"?>
-<?mso-contentType ?>
-<FormTemplates xmlns="http://schemas.microsoft.com/sharepoint/v3/contenttype/forms">
-  <Display>DocumentLibraryForm</Display>
-  <Edit>DocumentLibraryForm</Edit>
-  <New>DocumentLibraryForm</New>
-</FormTemplates>
-</file>
-
-<file path=customXml/item2.xml><?xml version="1.0" encoding="utf-8"?>
 <ct:contentTypeSchema xmlns:ct="http://schemas.microsoft.com/office/2006/metadata/contentType" xmlns:ma="http://schemas.microsoft.com/office/2006/metadata/properties/metaAttributes" ct:_="" ma:_="" ma:contentTypeName="Document" ma:contentTypeID="0x01010079F111ED35F8CC479449609E8A0923A6" ma:contentTypeVersion="12" ma:contentTypeDescription="Create a new document." ma:contentTypeScope="" ma:versionID="426e97fa315356fffbdcd9876fe988c2">
   <xsd:schema xmlns:xsd="http://www.w3.org/2001/XMLSchema" xmlns:xs="http://www.w3.org/2001/XMLSchema" xmlns:p="http://schemas.microsoft.com/office/2006/metadata/properties" xmlns:ns2="71af3243-3dd4-4a8d-8c0d-dd76da1f02a5" xmlns:ns3="16c05727-aa75-4e4a-9b5f-8a80a1165891" targetNamespace="http://schemas.microsoft.com/office/2006/metadata/properties" ma:root="true" ma:fieldsID="14b8f0def80e6d70ce3def20c90759ae" ns2:_="" ns3:_="">
     <xsd:import namespace="71af3243-3dd4-4a8d-8c0d-dd76da1f02a5"/>
@@ -32911,6 +32323,15 @@
 </ct:contentTypeSchema>
 </file>
 
+<file path=customXml/item2.xml><?xml version="1.0" encoding="utf-8"?>
+<?mso-contentType ?>
+<FormTemplates xmlns="http://schemas.microsoft.com/sharepoint/v3/contenttype/forms">
+  <Display>DocumentLibraryForm</Display>
+  <Edit>DocumentLibraryForm</Edit>
+  <New>DocumentLibraryForm</New>
+</FormTemplates>
+</file>
+
 <file path=customXml/item3.xml><?xml version="1.0" encoding="utf-8"?>
 <p:properties xmlns:p="http://schemas.microsoft.com/office/2006/metadata/properties" xmlns:xsi="http://www.w3.org/2001/XMLSchema-instance" xmlns:pc="http://schemas.microsoft.com/office/infopath/2007/PartnerControls">
   <documentManagement>
@@ -32921,14 +32342,6 @@
 </file>
 
 <file path=customXml/itemProps1.xml><?xml version="1.0" encoding="utf-8"?>
-<ds:datastoreItem xmlns:ds="http://schemas.openxmlformats.org/officeDocument/2006/customXml" ds:itemID="{D9EAC644-7B36-4B02-AE6A-271637DE6193}">
-  <ds:schemaRefs>
-    <ds:schemaRef ds:uri="http://schemas.microsoft.com/sharepoint/v3/contenttype/forms"/>
-  </ds:schemaRefs>
-</ds:datastoreItem>
-</file>
-
-<file path=customXml/itemProps2.xml><?xml version="1.0" encoding="utf-8"?>
 <ds:datastoreItem xmlns:ds="http://schemas.openxmlformats.org/officeDocument/2006/customXml" ds:itemID="{5D82FBE3-5E95-4B7A-88C0-B7BB58A96823}">
   <ds:schemaRefs>
     <ds:schemaRef ds:uri="http://schemas.microsoft.com/office/2006/metadata/contentType"/>
@@ -32947,6 +32360,14 @@
 </ds:datastoreItem>
 </file>
 
+<file path=customXml/itemProps2.xml><?xml version="1.0" encoding="utf-8"?>
+<ds:datastoreItem xmlns:ds="http://schemas.openxmlformats.org/officeDocument/2006/customXml" ds:itemID="{D9EAC644-7B36-4B02-AE6A-271637DE6193}">
+  <ds:schemaRefs>
+    <ds:schemaRef ds:uri="http://schemas.microsoft.com/sharepoint/v3/contenttype/forms"/>
+  </ds:schemaRefs>
+</ds:datastoreItem>
+</file>
+
 <file path=customXml/itemProps3.xml><?xml version="1.0" encoding="utf-8"?>
 <ds:datastoreItem xmlns:ds="http://schemas.openxmlformats.org/officeDocument/2006/customXml" ds:itemID="{581AEECB-7CBF-41B6-B304-895A4D5BDF0F}">
   <ds:schemaRefs>

</xml_diff>